<commit_message>
Add frame transfer flowchart
Change-Id: I34935a3e540079b77505a694ecea07f1de73258b
Signed-off-by: Ilia Gaisinsky <apalon83@gmail.com>
</commit_message>
<xml_diff>
--- a/JudgesForumPresentation.pptx
+++ b/JudgesForumPresentation.pptx
@@ -5571,6 +5571,13 @@
   <p:clrMapOvr>
     <a:masterClrMapping/>
   </p:clrMapOvr>
+  <p:timing>
+    <p:tnLst>
+      <p:par>
+        <p:cTn id="1" dur="indefinite" restart="never" nodeType="tmRoot"/>
+      </p:par>
+    </p:tnLst>
+  </p:timing>
 </p:sld>
 </file>
 
@@ -5593,26 +5600,6 @@
       </p:grpSpPr>
       <p:sp>
         <p:nvSpPr>
-          <p:cNvPr id="2" name="Content Placeholder 1"/>
-          <p:cNvSpPr>
-            <a:spLocks noGrp="1"/>
-          </p:cNvSpPr>
-          <p:nvPr>
-            <p:ph idx="1"/>
-          </p:nvPr>
-        </p:nvSpPr>
-        <p:spPr/>
-        <p:txBody>
-          <a:bodyPr/>
-          <a:lstStyle/>
-          <a:p>
-            <a:pPr algn="r" rtl="1"/>
-            <a:endParaRPr lang="en-US" dirty="0"/>
-          </a:p>
-        </p:txBody>
-      </p:sp>
-      <p:sp>
-        <p:nvSpPr>
           <p:cNvPr id="3" name="Title 2"/>
           <p:cNvSpPr>
             <a:spLocks noGrp="1"/>
@@ -5628,6 +5615,25 @@
           <a:p>
             <a:pPr rtl="1"/>
             <a:endParaRPr lang="en-US" dirty="0"/>
+          </a:p>
+        </p:txBody>
+      </p:sp>
+      <p:sp>
+        <p:nvSpPr>
+          <p:cNvPr id="5" name="Content Placeholder 4"/>
+          <p:cNvSpPr>
+            <a:spLocks noGrp="1"/>
+          </p:cNvSpPr>
+          <p:nvPr>
+            <p:ph idx="1"/>
+          </p:nvPr>
+        </p:nvSpPr>
+        <p:spPr/>
+        <p:txBody>
+          <a:bodyPr/>
+          <a:lstStyle/>
+          <a:p>
+            <a:endParaRPr lang="en-US"/>
           </a:p>
         </p:txBody>
       </p:sp>
@@ -5641,6 +5647,13 @@
   <p:clrMapOvr>
     <a:masterClrMapping/>
   </p:clrMapOvr>
+  <p:timing>
+    <p:tnLst>
+      <p:par>
+        <p:cTn id="1" dur="indefinite" restart="never" nodeType="tmRoot"/>
+      </p:par>
+    </p:tnLst>
+  </p:timing>
 </p:sld>
 </file>
 
@@ -5711,6 +5724,13 @@
   <p:clrMapOvr>
     <a:masterClrMapping/>
   </p:clrMapOvr>
+  <p:timing>
+    <p:tnLst>
+      <p:par>
+        <p:cTn id="1" dur="indefinite" restart="never" nodeType="tmRoot"/>
+      </p:par>
+    </p:tnLst>
+  </p:timing>
 </p:sld>
 </file>
 
@@ -5781,6 +5801,13 @@
   <p:clrMapOvr>
     <a:masterClrMapping/>
   </p:clrMapOvr>
+  <p:timing>
+    <p:tnLst>
+      <p:par>
+        <p:cTn id="1" dur="indefinite" restart="never" nodeType="tmRoot"/>
+      </p:par>
+    </p:tnLst>
+  </p:timing>
 </p:sld>
 </file>
 

</xml_diff>

<commit_message>
Presentation: changes from yesterday
Change-Id: I91c995d88cd87e70620235b1370e82fc00a00bd3
Signed-off-by: Andrey Shamis <lolnik@gmail.com>
</commit_message>
<xml_diff>
--- a/JudgesForumPresentation.pptx
+++ b/JudgesForumPresentation.pptx
@@ -1792,11 +1792,11 @@
           <c:showBubbleSize val="0"/>
         </c:dLbls>
         <c:gapWidth val="150"/>
-        <c:axId val="98103296"/>
-        <c:axId val="88709888"/>
+        <c:axId val="46718976"/>
+        <c:axId val="92379904"/>
       </c:barChart>
       <c:catAx>
-        <c:axId val="98103296"/>
+        <c:axId val="46718976"/>
         <c:scaling>
           <c:orientation val="minMax"/>
         </c:scaling>
@@ -1806,7 +1806,7 @@
         <c:majorTickMark val="none"/>
         <c:minorTickMark val="none"/>
         <c:tickLblPos val="nextTo"/>
-        <c:crossAx val="88709888"/>
+        <c:crossAx val="92379904"/>
         <c:crosses val="autoZero"/>
         <c:auto val="1"/>
         <c:lblAlgn val="ctr"/>
@@ -1814,7 +1814,7 @@
         <c:noMultiLvlLbl val="0"/>
       </c:catAx>
       <c:valAx>
-        <c:axId val="88709888"/>
+        <c:axId val="92379904"/>
         <c:scaling>
           <c:orientation val="minMax"/>
         </c:scaling>
@@ -1825,7 +1825,7 @@
         <c:majorTickMark val="none"/>
         <c:minorTickMark val="none"/>
         <c:tickLblPos val="nextTo"/>
-        <c:crossAx val="98103296"/>
+        <c:crossAx val="46718976"/>
         <c:crosses val="autoZero"/>
         <c:crossBetween val="between"/>
       </c:valAx>
@@ -7622,7 +7622,7 @@
           <a:graphicData uri="http://schemas.openxmlformats.org/presentationml/2006/ole">
             <mc:AlternateContent xmlns:mc="http://schemas.openxmlformats.org/markup-compatibility/2006">
               <mc:Choice xmlns:v="urn:schemas-microsoft-com:vml" Requires="v">
-                <p:oleObj spid="_x0000_s3124" name="Visio" r:id="rId3" imgW="9147060" imgH="7289860" progId="Visio.Drawing.11">
+                <p:oleObj spid="_x0000_s3125" name="Visio" r:id="rId3" imgW="9147060" imgH="7289860" progId="Visio.Drawing.11">
                   <p:embed/>
                 </p:oleObj>
               </mc:Choice>
@@ -7737,7 +7737,7 @@
           <a:graphicData uri="http://schemas.openxmlformats.org/presentationml/2006/ole">
             <mc:AlternateContent xmlns:mc="http://schemas.openxmlformats.org/markup-compatibility/2006">
               <mc:Choice xmlns:v="urn:schemas-microsoft-com:vml" Requires="v">
-                <p:oleObj spid="_x0000_s2102" name="Visio" r:id="rId3" imgW="9147060" imgH="7289860" progId="Visio.Drawing.11">
+                <p:oleObj spid="_x0000_s2103" name="Visio" r:id="rId3" imgW="9147060" imgH="7289860" progId="Visio.Drawing.11">
                   <p:embed/>
                 </p:oleObj>
               </mc:Choice>
@@ -7941,8 +7941,8 @@
         </p:blipFill>
         <p:spPr bwMode="auto">
           <a:xfrm>
-            <a:off x="1785937" y="2286000"/>
-            <a:ext cx="5572125" cy="3914775"/>
+            <a:off x="1447800" y="2133600"/>
+            <a:ext cx="6182212" cy="4343400"/>
           </a:xfrm>
           <a:prstGeom prst="rect">
             <a:avLst/>
@@ -9025,7 +9025,6 @@
               <a:rPr lang="en-US" dirty="0" smtClean="0"/>
               <a:t>Saving simulation</a:t>
             </a:r>
-            <a:endParaRPr lang="en-US" dirty="0" smtClean="0"/>
           </a:p>
           <a:p>
             <a:pPr marL="0" indent="0" algn="l">
@@ -9044,11 +9043,7 @@
             <a:pPr lvl="1"/>
             <a:r>
               <a:rPr lang="en-US" dirty="0" smtClean="0"/>
-              <a:t>Algorithms </a:t>
-            </a:r>
-            <a:r>
-              <a:rPr lang="en-US" dirty="0" smtClean="0"/>
-              <a:t>flow</a:t>
+              <a:t>Algorithms flow</a:t>
             </a:r>
           </a:p>
           <a:p>
@@ -9301,7 +9296,7 @@
           <a:graphicData uri="http://schemas.openxmlformats.org/presentationml/2006/ole">
             <mc:AlternateContent xmlns:mc="http://schemas.openxmlformats.org/markup-compatibility/2006">
               <mc:Choice xmlns:v="urn:schemas-microsoft-com:vml" Requires="v">
-                <p:oleObj spid="_x0000_s1078" name="Visio" r:id="rId3" imgW="9147060" imgH="7289860" progId="Visio.Drawing.11">
+                <p:oleObj spid="_x0000_s1079" name="Visio" r:id="rId3" imgW="9147060" imgH="7289860" progId="Visio.Drawing.11">
                   <p:embed/>
                 </p:oleObj>
               </mc:Choice>

</xml_diff>

<commit_message>
Presentation before send to Martin
Change-Id: I327f919d9d2d058c9780c5f43a251c7852f8b717
Signed-off-by: Andrey Shamis <lolnik@gmail.com>
</commit_message>
<xml_diff>
--- a/JudgesForumPresentation.pptx
+++ b/JudgesForumPresentation.pptx
@@ -12,29 +12,29 @@
   </p:handoutMasterIdLst>
   <p:sldIdLst>
     <p:sldId id="256" r:id="rId2"/>
-    <p:sldId id="299" r:id="rId3"/>
-    <p:sldId id="331" r:id="rId4"/>
-    <p:sldId id="300" r:id="rId5"/>
-    <p:sldId id="301" r:id="rId6"/>
-    <p:sldId id="310" r:id="rId7"/>
-    <p:sldId id="314" r:id="rId8"/>
+    <p:sldId id="331" r:id="rId3"/>
+    <p:sldId id="300" r:id="rId4"/>
+    <p:sldId id="301" r:id="rId5"/>
+    <p:sldId id="310" r:id="rId6"/>
+    <p:sldId id="314" r:id="rId7"/>
+    <p:sldId id="334" r:id="rId8"/>
     <p:sldId id="313" r:id="rId9"/>
-    <p:sldId id="302" r:id="rId10"/>
-    <p:sldId id="303" r:id="rId11"/>
-    <p:sldId id="304" r:id="rId12"/>
-    <p:sldId id="305" r:id="rId13"/>
-    <p:sldId id="323" r:id="rId14"/>
-    <p:sldId id="324" r:id="rId15"/>
-    <p:sldId id="325" r:id="rId16"/>
-    <p:sldId id="318" r:id="rId17"/>
-    <p:sldId id="326" r:id="rId18"/>
-    <p:sldId id="327" r:id="rId19"/>
-    <p:sldId id="329" r:id="rId20"/>
-    <p:sldId id="330" r:id="rId21"/>
-    <p:sldId id="311" r:id="rId22"/>
-    <p:sldId id="328" r:id="rId23"/>
-    <p:sldId id="312" r:id="rId24"/>
-    <p:sldId id="315" r:id="rId25"/>
+    <p:sldId id="304" r:id="rId10"/>
+    <p:sldId id="302" r:id="rId11"/>
+    <p:sldId id="303" r:id="rId12"/>
+    <p:sldId id="336" r:id="rId13"/>
+    <p:sldId id="337" r:id="rId14"/>
+    <p:sldId id="338" r:id="rId15"/>
+    <p:sldId id="324" r:id="rId16"/>
+    <p:sldId id="325" r:id="rId17"/>
+    <p:sldId id="318" r:id="rId18"/>
+    <p:sldId id="326" r:id="rId19"/>
+    <p:sldId id="327" r:id="rId20"/>
+    <p:sldId id="329" r:id="rId21"/>
+    <p:sldId id="330" r:id="rId22"/>
+    <p:sldId id="311" r:id="rId23"/>
+    <p:sldId id="328" r:id="rId24"/>
+    <p:sldId id="339" r:id="rId25"/>
     <p:sldId id="309" r:id="rId26"/>
     <p:sldId id="320" r:id="rId27"/>
     <p:sldId id="321" r:id="rId28"/>
@@ -1800,11 +1800,11 @@
           <c:showBubbleSize val="0"/>
         </c:dLbls>
         <c:gapWidth val="150"/>
-        <c:axId val="47390720"/>
-        <c:axId val="86620928"/>
+        <c:axId val="89334784"/>
+        <c:axId val="51533440"/>
       </c:barChart>
       <c:catAx>
-        <c:axId val="47390720"/>
+        <c:axId val="89334784"/>
         <c:scaling>
           <c:orientation val="minMax"/>
         </c:scaling>
@@ -1814,7 +1814,7 @@
         <c:majorTickMark val="none"/>
         <c:minorTickMark val="none"/>
         <c:tickLblPos val="nextTo"/>
-        <c:crossAx val="86620928"/>
+        <c:crossAx val="51533440"/>
         <c:crosses val="autoZero"/>
         <c:auto val="1"/>
         <c:lblAlgn val="ctr"/>
@@ -1822,7 +1822,7 @@
         <c:noMultiLvlLbl val="0"/>
       </c:catAx>
       <c:valAx>
-        <c:axId val="86620928"/>
+        <c:axId val="51533440"/>
         <c:scaling>
           <c:orientation val="minMax"/>
         </c:scaling>
@@ -1833,14 +1833,23 @@
         <c:majorTickMark val="none"/>
         <c:minorTickMark val="none"/>
         <c:tickLblPos val="nextTo"/>
-        <c:crossAx val="47390720"/>
+        <c:crossAx val="89334784"/>
         <c:crosses val="autoZero"/>
         <c:crossBetween val="between"/>
       </c:valAx>
     </c:plotArea>
     <c:legend>
       <c:legendPos val="r"/>
-      <c:layout/>
+      <c:layout>
+        <c:manualLayout>
+          <c:xMode val="edge"/>
+          <c:yMode val="edge"/>
+          <c:x val="0.93238422280548261"/>
+          <c:y val="2.0497930547143151E-2"/>
+          <c:w val="5.6504666083406242E-2"/>
+          <c:h val="0.90355516858469609"/>
+        </c:manualLayout>
+      </c:layout>
       <c:overlay val="0"/>
     </c:legend>
     <c:plotVisOnly val="1"/>
@@ -1868,6 +1877,26 @@
   </mc:AlternateContent>
   <c:chart>
     <c:title>
+      <c:tx>
+        <c:rich>
+          <a:bodyPr/>
+          <a:lstStyle/>
+          <a:p>
+            <a:pPr>
+              <a:defRPr/>
+            </a:pPr>
+            <a:r>
+              <a:rPr lang="en-US" dirty="0"/>
+              <a:t>Speed </a:t>
+            </a:r>
+            <a:r>
+              <a:rPr lang="en-US" dirty="0" err="1" smtClean="0"/>
+              <a:t>MBps</a:t>
+            </a:r>
+            <a:endParaRPr lang="en-US" dirty="0"/>
+          </a:p>
+        </c:rich>
+      </c:tx>
       <c:layout/>
       <c:overlay val="0"/>
     </c:title>
@@ -2229,6 +2258,26 @@
   </mc:AlternateContent>
   <c:chart>
     <c:title>
+      <c:tx>
+        <c:rich>
+          <a:bodyPr/>
+          <a:lstStyle/>
+          <a:p>
+            <a:pPr>
+              <a:defRPr/>
+            </a:pPr>
+            <a:r>
+              <a:rPr lang="en-US" dirty="0"/>
+              <a:t>Speed </a:t>
+            </a:r>
+            <a:r>
+              <a:rPr lang="en-US" dirty="0" err="1" smtClean="0"/>
+              <a:t>MBps</a:t>
+            </a:r>
+            <a:endParaRPr lang="en-US" dirty="0"/>
+          </a:p>
+        </c:rich>
+      </c:tx>
       <c:layout/>
       <c:overlay val="0"/>
     </c:title>
@@ -7729,49 +7778,106 @@
         </p:nvSpPr>
         <p:spPr/>
         <p:txBody>
-          <a:bodyPr/>
+          <a:bodyPr>
+            <a:normAutofit lnSpcReduction="10000"/>
+          </a:bodyPr>
           <a:lstStyle/>
           <a:p>
             <a:pPr algn="l"/>
             <a:r>
               <a:rPr lang="en-US" dirty="0" smtClean="0"/>
-              <a:t>Preferred channel selection</a:t>
-            </a:r>
-          </a:p>
-          <a:p>
-            <a:pPr algn="l"/>
+              <a:t>IEEE80211</a:t>
+            </a:r>
+          </a:p>
+          <a:p>
+            <a:pPr lvl="1"/>
             <a:r>
               <a:rPr lang="en-US" dirty="0" smtClean="0"/>
-              <a:t>Calculation of RSSI regarding to Distance</a:t>
-            </a:r>
-          </a:p>
-          <a:p>
-            <a:pPr algn="l"/>
+              <a:t>Passive scan</a:t>
+            </a:r>
+          </a:p>
+          <a:p>
+            <a:pPr lvl="1"/>
             <a:r>
               <a:rPr lang="en-US" dirty="0" smtClean="0"/>
-              <a:t>Signal to Noise Ratio (SNR) – Packet Loss </a:t>
-            </a:r>
-          </a:p>
-          <a:p>
+              <a:t>Beacon sending</a:t>
+            </a:r>
+          </a:p>
+          <a:p>
+            <a:pPr lvl="1"/>
+            <a:r>
+              <a:rPr lang="en-US" dirty="0" smtClean="0"/>
+              <a:t>Acknowledgment</a:t>
+            </a:r>
+          </a:p>
+          <a:p>
+            <a:pPr lvl="1"/>
+            <a:r>
+              <a:rPr lang="en-US" dirty="0" smtClean="0"/>
+              <a:t>Connect/Disconnect flow</a:t>
+            </a:r>
+          </a:p>
+          <a:p>
+            <a:pPr lvl="1"/>
+            <a:r>
+              <a:rPr lang="en-US" dirty="0" smtClean="0"/>
+              <a:t>Keep Alive </a:t>
+            </a:r>
+            <a:r>
+              <a:rPr lang="en-US" dirty="0" smtClean="0"/>
+              <a:t>mechanism</a:t>
+            </a:r>
+          </a:p>
+          <a:p>
+            <a:pPr lvl="1"/>
             <a:r>
               <a:rPr lang="en-US" dirty="0"/>
-              <a:t>Calculation of transmit rate regarding to RSSI</a:t>
-            </a:r>
-          </a:p>
-          <a:p>
-            <a:pPr algn="l"/>
+              <a:t>Support of </a:t>
+            </a:r>
+            <a:r>
+              <a:rPr lang="en-US" dirty="0" smtClean="0"/>
+              <a:t>standards - </a:t>
+            </a:r>
+            <a:r>
+              <a:rPr lang="en-US" dirty="0"/>
+              <a:t>Band A, Band </a:t>
+            </a:r>
+            <a:r>
+              <a:rPr lang="en-US" dirty="0" smtClean="0"/>
+              <a:t>N</a:t>
+            </a:r>
             <a:endParaRPr lang="en-US" dirty="0" smtClean="0"/>
           </a:p>
           <a:p>
-            <a:pPr algn="l"/>
+            <a:pPr lvl="1"/>
+            <a:r>
+              <a:rPr lang="en-US" dirty="0" smtClean="0"/>
+              <a:t>Connection </a:t>
+            </a:r>
+            <a:r>
+              <a:rPr lang="en-US" dirty="0" smtClean="0"/>
+              <a:t>establishment negotiation</a:t>
+            </a:r>
+          </a:p>
+          <a:p>
+            <a:pPr lvl="1"/>
+            <a:r>
+              <a:rPr lang="en-US" dirty="0" smtClean="0"/>
+              <a:t>Base Service Set</a:t>
+            </a:r>
+          </a:p>
+          <a:p>
+            <a:pPr lvl="1"/>
+            <a:r>
+              <a:rPr lang="en-US" dirty="0" smtClean="0"/>
+              <a:t>Tunneled Direct Link Setup </a:t>
+            </a:r>
             <a:endParaRPr lang="en-US" dirty="0" smtClean="0"/>
           </a:p>
           <a:p>
-            <a:pPr algn="l"/>
             <a:endParaRPr lang="en-US" dirty="0" smtClean="0"/>
           </a:p>
           <a:p>
-            <a:pPr algn="l"/>
             <a:endParaRPr lang="en-US" dirty="0"/>
           </a:p>
         </p:txBody>
@@ -7794,7 +7900,7 @@
             <a:pPr rtl="1"/>
             <a:r>
               <a:rPr lang="en-US" dirty="0" smtClean="0"/>
-              <a:t>Used Algorithms</a:t>
+              <a:t>Supported Protocols</a:t>
             </a:r>
             <a:endParaRPr lang="en-US" dirty="0"/>
           </a:p>
@@ -7842,130 +7948,33 @@
         </p:nvSpPr>
         <p:spPr/>
         <p:txBody>
-          <a:bodyPr>
-            <a:normAutofit fontScale="70000" lnSpcReduction="20000"/>
-          </a:bodyPr>
+          <a:bodyPr/>
           <a:lstStyle/>
           <a:p>
-            <a:pPr algn="l"/>
             <a:r>
               <a:rPr lang="en-US" dirty="0" smtClean="0"/>
-              <a:t>Statistic and information</a:t>
-            </a:r>
-          </a:p>
-          <a:p>
-            <a:pPr algn="l"/>
+              <a:t>Calculation </a:t>
+            </a:r>
+            <a:r>
+              <a:rPr lang="en-US" dirty="0"/>
+              <a:t>of </a:t>
+            </a:r>
+            <a:r>
+              <a:rPr lang="en-US" sz="2000" b="1" i="1" dirty="0"/>
+              <a:t>Received Signal Strength Indication</a:t>
+            </a:r>
+            <a:r>
+              <a:rPr lang="en-US" sz="2000" b="1" dirty="0"/>
+              <a:t> </a:t>
+            </a:r>
             <a:r>
               <a:rPr lang="en-US" dirty="0" smtClean="0"/>
-              <a:t>Easy access to get all simulated information </a:t>
-            </a:r>
-          </a:p>
-          <a:p>
-            <a:pPr algn="l"/>
+              <a:t>(</a:t>
+            </a:r>
             <a:r>
               <a:rPr lang="en-US" dirty="0" smtClean="0"/>
-              <a:t>Ability to move objects on board</a:t>
-            </a:r>
-          </a:p>
-          <a:p>
-            <a:pPr algn="l"/>
-            <a:r>
-              <a:rPr lang="en-US" dirty="0" smtClean="0"/>
-              <a:t>Drag &amp; Drop</a:t>
-            </a:r>
-          </a:p>
-          <a:p>
-            <a:pPr algn="l"/>
-            <a:r>
-              <a:rPr lang="en-US" dirty="0" smtClean="0"/>
-              <a:t>Creation of RF device </a:t>
-            </a:r>
-          </a:p>
-          <a:p>
-            <a:pPr algn="l"/>
-            <a:r>
-              <a:rPr lang="en-US" dirty="0" smtClean="0"/>
-              <a:t>Random simulation</a:t>
-            </a:r>
-          </a:p>
-          <a:p>
-            <a:pPr algn="l"/>
-            <a:r>
-              <a:rPr lang="en-US" dirty="0" smtClean="0"/>
-              <a:t>Static simulation</a:t>
-            </a:r>
-          </a:p>
-          <a:p>
-            <a:pPr algn="l"/>
-            <a:r>
-              <a:rPr lang="en-US" dirty="0" smtClean="0"/>
-              <a:t>Station info form :</a:t>
-            </a:r>
-          </a:p>
-          <a:p>
-            <a:pPr lvl="1">
-              <a:buFont typeface="Wingdings" pitchFamily="2" charset="2"/>
-              <a:buChar char="Ø"/>
-            </a:pPr>
-            <a:r>
-              <a:rPr lang="en-US" dirty="0" smtClean="0"/>
-              <a:t>Statistic </a:t>
-            </a:r>
-          </a:p>
-          <a:p>
-            <a:pPr lvl="1">
-              <a:buFont typeface="Wingdings" pitchFamily="2" charset="2"/>
-              <a:buChar char="Ø"/>
-            </a:pPr>
-            <a:r>
-              <a:rPr lang="en-US" dirty="0" smtClean="0"/>
-              <a:t>Logs</a:t>
-            </a:r>
-          </a:p>
-          <a:p>
-            <a:pPr lvl="1">
-              <a:buFont typeface="Wingdings" pitchFamily="2" charset="2"/>
-              <a:buChar char="Ø"/>
-            </a:pPr>
-            <a:r>
-              <a:rPr lang="en-US" dirty="0" smtClean="0"/>
-              <a:t>Station configuration and overview</a:t>
-            </a:r>
-          </a:p>
-          <a:p>
-            <a:pPr lvl="1">
-              <a:buFont typeface="Wingdings" pitchFamily="2" charset="2"/>
-              <a:buChar char="Ø"/>
-            </a:pPr>
-            <a:r>
-              <a:rPr lang="en-US" dirty="0" smtClean="0"/>
-              <a:t>Configurable </a:t>
-            </a:r>
-            <a:r>
-              <a:rPr lang="en-US" dirty="0"/>
-              <a:t>d</a:t>
-            </a:r>
-            <a:r>
-              <a:rPr lang="en-US" dirty="0" smtClean="0"/>
-              <a:t>ump of STA object</a:t>
-            </a:r>
-          </a:p>
-          <a:p>
-            <a:pPr algn="l"/>
-            <a:r>
-              <a:rPr lang="en-US" dirty="0" smtClean="0"/>
-              <a:t>AP info form – provide basic configuration</a:t>
-            </a:r>
-          </a:p>
-          <a:p>
-            <a:pPr algn="l"/>
-            <a:r>
-              <a:rPr lang="en-US" dirty="0" smtClean="0"/>
-              <a:t>Saving and Load current simulation into file</a:t>
-            </a:r>
-          </a:p>
-          <a:p>
-            <a:pPr algn="l"/>
+              <a:t>RSSI)</a:t>
+            </a:r>
             <a:endParaRPr lang="en-US" dirty="0" smtClean="0"/>
           </a:p>
           <a:p>
@@ -7996,9 +8005,148 @@
             <a:pPr rtl="1"/>
             <a:r>
               <a:rPr lang="en-US" dirty="0" smtClean="0"/>
-              <a:t>GUI</a:t>
+              <a:t>Used Algorithms</a:t>
             </a:r>
             <a:endParaRPr lang="en-US" dirty="0"/>
+          </a:p>
+        </p:txBody>
+      </p:sp>
+      <p:pic>
+        <p:nvPicPr>
+          <p:cNvPr id="4" name="Picture 2"/>
+          <p:cNvPicPr>
+            <a:picLocks noChangeAspect="1" noChangeArrowheads="1"/>
+          </p:cNvPicPr>
+          <p:nvPr/>
+        </p:nvPicPr>
+        <p:blipFill rotWithShape="1">
+          <a:blip r:embed="rId2">
+            <a:extLst>
+              <a:ext uri="{28A0092B-C50C-407E-A947-70E740481C1C}">
+                <a14:useLocalDpi xmlns:a14="http://schemas.microsoft.com/office/drawing/2010/main" val="0"/>
+              </a:ext>
+            </a:extLst>
+          </a:blip>
+          <a:srcRect t="9762"/>
+          <a:stretch/>
+        </p:blipFill>
+        <p:spPr bwMode="auto">
+          <a:xfrm>
+            <a:off x="1981200" y="2807576"/>
+            <a:ext cx="4724400" cy="4050423"/>
+          </a:xfrm>
+          <a:prstGeom prst="rect">
+            <a:avLst/>
+          </a:prstGeom>
+          <a:noFill/>
+          <a:ln>
+            <a:noFill/>
+          </a:ln>
+          <a:effectLst/>
+          <a:extLst>
+            <a:ext uri="{909E8E84-426E-40DD-AFC4-6F175D3DCCD1}">
+              <a14:hiddenFill xmlns:a14="http://schemas.microsoft.com/office/drawing/2010/main">
+                <a:solidFill>
+                  <a:schemeClr val="accent1"/>
+                </a:solidFill>
+              </a14:hiddenFill>
+            </a:ext>
+            <a:ext uri="{91240B29-F687-4F45-9708-019B960494DF}">
+              <a14:hiddenLine xmlns:a14="http://schemas.microsoft.com/office/drawing/2010/main" w="9525">
+                <a:solidFill>
+                  <a:schemeClr val="tx1"/>
+                </a:solidFill>
+                <a:miter lim="800000"/>
+                <a:headEnd/>
+                <a:tailEnd/>
+              </a14:hiddenLine>
+            </a:ext>
+            <a:ext uri="{AF507438-7753-43E0-B8FC-AC1667EBCBE1}">
+              <a14:hiddenEffects xmlns:a14="http://schemas.microsoft.com/office/drawing/2010/main">
+                <a:effectLst>
+                  <a:outerShdw dist="35921" dir="2700000" algn="ctr" rotWithShape="0">
+                    <a:schemeClr val="bg2"/>
+                  </a:outerShdw>
+                </a:effectLst>
+              </a14:hiddenEffects>
+            </a:ext>
+          </a:extLst>
+        </p:spPr>
+      </p:pic>
+      <p:sp>
+        <p:nvSpPr>
+          <p:cNvPr id="5" name="TextBox 4"/>
+          <p:cNvSpPr txBox="1"/>
+          <p:nvPr/>
+        </p:nvSpPr>
+        <p:spPr>
+          <a:xfrm>
+            <a:off x="1295400" y="5576500"/>
+            <a:ext cx="838200" cy="276999"/>
+          </a:xfrm>
+          <a:prstGeom prst="rect">
+            <a:avLst/>
+          </a:prstGeom>
+          <a:solidFill>
+            <a:schemeClr val="bg1"/>
+          </a:solidFill>
+          <a:effectLst>
+            <a:outerShdw blurRad="50800" dist="50800" dir="5400000" algn="ctr" rotWithShape="0">
+              <a:schemeClr val="bg1"/>
+            </a:outerShdw>
+          </a:effectLst>
+        </p:spPr>
+        <p:txBody>
+          <a:bodyPr wrap="square" rtlCol="0">
+            <a:spAutoFit/>
+          </a:bodyPr>
+          <a:lstStyle/>
+          <a:p>
+            <a:pPr algn="r"/>
+            <a:r>
+              <a:rPr lang="en-US" sz="1200" dirty="0" smtClean="0"/>
+              <a:t>(</a:t>
+            </a:r>
+            <a:r>
+              <a:rPr lang="en-US" sz="1200" dirty="0" err="1" smtClean="0"/>
+              <a:t>DBm</a:t>
+            </a:r>
+            <a:r>
+              <a:rPr lang="en-US" sz="1200" dirty="0" smtClean="0"/>
+              <a:t>)</a:t>
+            </a:r>
+            <a:endParaRPr lang="ru-RU" sz="1200" dirty="0"/>
+          </a:p>
+        </p:txBody>
+      </p:sp>
+      <p:sp>
+        <p:nvSpPr>
+          <p:cNvPr id="6" name="TextBox 5"/>
+          <p:cNvSpPr txBox="1"/>
+          <p:nvPr/>
+        </p:nvSpPr>
+        <p:spPr>
+          <a:xfrm>
+            <a:off x="3771900" y="4204899"/>
+            <a:ext cx="1752600" cy="276999"/>
+          </a:xfrm>
+          <a:prstGeom prst="rect">
+            <a:avLst/>
+          </a:prstGeom>
+          <a:noFill/>
+        </p:spPr>
+        <p:txBody>
+          <a:bodyPr wrap="square" rtlCol="0">
+            <a:spAutoFit/>
+          </a:bodyPr>
+          <a:lstStyle/>
+          <a:p>
+            <a:pPr algn="r"/>
+            <a:r>
+              <a:rPr lang="en-US" sz="1200" dirty="0" smtClean="0"/>
+              <a:t>Distance (meters)</a:t>
+            </a:r>
+            <a:endParaRPr lang="ru-RU" sz="1200" dirty="0"/>
           </a:p>
         </p:txBody>
       </p:sp>
@@ -8012,6 +8160,13 @@
   <p:clrMapOvr>
     <a:masterClrMapping/>
   </p:clrMapOvr>
+  <p:timing>
+    <p:tnLst>
+      <p:par>
+        <p:cTn id="1" dur="indefinite" restart="never" nodeType="tmRoot"/>
+      </p:par>
+    </p:tnLst>
+  </p:timing>
 </p:sld>
 </file>
 
@@ -8044,60 +8199,29 @@
         </p:nvSpPr>
         <p:spPr/>
         <p:txBody>
-          <a:bodyPr>
-            <a:normAutofit/>
-          </a:bodyPr>
+          <a:bodyPr/>
           <a:lstStyle/>
           <a:p>
+            <a:pPr algn="l"/>
             <a:r>
               <a:rPr lang="en-US" dirty="0" smtClean="0"/>
-              <a:t>RSSI</a:t>
-            </a:r>
+              <a:t>Signal </a:t>
+            </a:r>
+            <a:r>
+              <a:rPr lang="en-US" dirty="0" smtClean="0"/>
+              <a:t>to Noise Ratio (SNR) – Packet Loss </a:t>
+            </a:r>
+          </a:p>
+          <a:p>
+            <a:pPr algn="l"/>
             <a:endParaRPr lang="en-US" dirty="0" smtClean="0"/>
           </a:p>
           <a:p>
-            <a:endParaRPr lang="en-US" dirty="0"/>
-          </a:p>
-          <a:p>
-            <a:r>
-              <a:rPr lang="en-US" dirty="0" smtClean="0"/>
-              <a:t>Challenge – medium</a:t>
-            </a:r>
-          </a:p>
-          <a:p>
-            <a:pPr lvl="1"/>
-            <a:r>
-              <a:rPr lang="en-US" dirty="0" smtClean="0"/>
-              <a:t>Send data</a:t>
-            </a:r>
-          </a:p>
-          <a:p>
-            <a:pPr lvl="1"/>
-            <a:r>
-              <a:rPr lang="en-US" dirty="0" smtClean="0"/>
-              <a:t>Pars received packet</a:t>
-            </a:r>
-          </a:p>
-          <a:p>
-            <a:pPr lvl="1"/>
-            <a:r>
-              <a:rPr lang="en-US" dirty="0" smtClean="0"/>
-              <a:t>Medium registration</a:t>
-            </a:r>
-          </a:p>
-          <a:p>
-            <a:pPr lvl="1"/>
-            <a:r>
-              <a:rPr lang="en-US" dirty="0" smtClean="0"/>
-              <a:t>AP – support any kind of packets </a:t>
-            </a:r>
-          </a:p>
-          <a:p>
-            <a:pPr lvl="1"/>
-            <a:r>
-              <a:rPr lang="en-US" dirty="0" smtClean="0"/>
-              <a:t>Stream handler / File to Packet division and restoration    </a:t>
-            </a:r>
+            <a:pPr algn="l"/>
+            <a:endParaRPr lang="en-US" dirty="0" smtClean="0"/>
+          </a:p>
+          <a:p>
+            <a:pPr algn="l"/>
             <a:endParaRPr lang="en-US" dirty="0"/>
           </a:p>
         </p:txBody>
@@ -8118,6 +8242,10 @@
           <a:lstStyle/>
           <a:p>
             <a:pPr rtl="1"/>
+            <a:r>
+              <a:rPr lang="en-US" dirty="0" smtClean="0"/>
+              <a:t>Used Algorithms</a:t>
+            </a:r>
             <a:endParaRPr lang="en-US" dirty="0"/>
           </a:p>
         </p:txBody>
@@ -8125,7 +8253,7 @@
     </p:spTree>
     <p:extLst>
       <p:ext uri="{BB962C8B-B14F-4D97-AF65-F5344CB8AC3E}">
-        <p14:creationId xmlns:p14="http://schemas.microsoft.com/office/powerpoint/2010/main" val="1441071697"/>
+        <p14:creationId xmlns:p14="http://schemas.microsoft.com/office/powerpoint/2010/main" val="2241084113"/>
       </p:ext>
     </p:extLst>
   </p:cSld>
@@ -8154,7 +8282,49 @@
       </p:grpSpPr>
       <p:sp>
         <p:nvSpPr>
-          <p:cNvPr id="3" name="Заголовок 2"/>
+          <p:cNvPr id="2" name="Content Placeholder 1"/>
+          <p:cNvSpPr>
+            <a:spLocks noGrp="1"/>
+          </p:cNvSpPr>
+          <p:nvPr>
+            <p:ph idx="1"/>
+          </p:nvPr>
+        </p:nvSpPr>
+        <p:spPr/>
+        <p:txBody>
+          <a:bodyPr/>
+          <a:lstStyle/>
+          <a:p>
+            <a:r>
+              <a:rPr lang="en-US" dirty="0" smtClean="0"/>
+              <a:t>Calculation </a:t>
+            </a:r>
+            <a:r>
+              <a:rPr lang="en-US" dirty="0"/>
+              <a:t>of transmit rate regarding to RSSI</a:t>
+            </a:r>
+          </a:p>
+          <a:p>
+            <a:pPr algn="l"/>
+            <a:endParaRPr lang="en-US" dirty="0" smtClean="0"/>
+          </a:p>
+          <a:p>
+            <a:pPr algn="l"/>
+            <a:endParaRPr lang="en-US" dirty="0" smtClean="0"/>
+          </a:p>
+          <a:p>
+            <a:pPr algn="l"/>
+            <a:endParaRPr lang="en-US" dirty="0" smtClean="0"/>
+          </a:p>
+          <a:p>
+            <a:pPr algn="l"/>
+            <a:endParaRPr lang="en-US" dirty="0"/>
+          </a:p>
+        </p:txBody>
+      </p:sp>
+      <p:sp>
+        <p:nvSpPr>
+          <p:cNvPr id="3" name="Title 2"/>
           <p:cNvSpPr>
             <a:spLocks noGrp="1"/>
           </p:cNvSpPr>
@@ -8162,27 +8332,219 @@
             <p:ph type="title"/>
           </p:nvPr>
         </p:nvSpPr>
-        <p:spPr>
-          <a:xfrm>
-            <a:off x="381000" y="570156"/>
-            <a:ext cx="8382000" cy="1030044"/>
-          </a:xfrm>
-        </p:spPr>
+        <p:spPr/>
         <p:txBody>
           <a:bodyPr/>
           <a:lstStyle/>
           <a:p>
-            <a:r>
-              <a:rPr lang="en-US"/>
-              <a:t>Low Rate Clients Degrade WLAN Performance</a:t>
-            </a:r>
-            <a:endParaRPr lang="ru-RU" dirty="0"/>
+            <a:pPr rtl="1"/>
+            <a:r>
+              <a:rPr lang="en-US" dirty="0" smtClean="0"/>
+              <a:t>Used Algorithms</a:t>
+            </a:r>
+            <a:endParaRPr lang="en-US" dirty="0"/>
+          </a:p>
+        </p:txBody>
+      </p:sp>
+      <p:graphicFrame>
+        <p:nvGraphicFramePr>
+          <p:cNvPr id="4" name="Диаграмма 3"/>
+          <p:cNvGraphicFramePr>
+            <a:graphicFrameLocks/>
+          </p:cNvGraphicFramePr>
+          <p:nvPr>
+            <p:extLst>
+              <p:ext uri="{D42A27DB-BD31-4B8C-83A1-F6EECF244321}">
+                <p14:modId xmlns:p14="http://schemas.microsoft.com/office/powerpoint/2010/main" val="830276947"/>
+              </p:ext>
+            </p:extLst>
+          </p:nvPr>
+        </p:nvGraphicFramePr>
+        <p:xfrm>
+          <a:off x="1143000" y="2743200"/>
+          <a:ext cx="6858000" cy="3962400"/>
+        </p:xfrm>
+        <a:graphic>
+          <a:graphicData uri="http://schemas.openxmlformats.org/drawingml/2006/chart">
+            <c:chart xmlns:c="http://schemas.openxmlformats.org/drawingml/2006/chart" xmlns:r="http://schemas.openxmlformats.org/officeDocument/2006/relationships" r:id="rId2"/>
+          </a:graphicData>
+        </a:graphic>
+      </p:graphicFrame>
+      <p:sp>
+        <p:nvSpPr>
+          <p:cNvPr id="5" name="TextBox 4"/>
+          <p:cNvSpPr txBox="1"/>
+          <p:nvPr/>
+        </p:nvSpPr>
+        <p:spPr>
+          <a:xfrm>
+            <a:off x="7391400" y="6410325"/>
+            <a:ext cx="838200" cy="261610"/>
+          </a:xfrm>
+          <a:prstGeom prst="rect">
+            <a:avLst/>
+          </a:prstGeom>
+          <a:noFill/>
+        </p:spPr>
+        <p:txBody>
+          <a:bodyPr wrap="square" rtlCol="0">
+            <a:spAutoFit/>
+          </a:bodyPr>
+          <a:lstStyle/>
+          <a:p>
+            <a:r>
+              <a:rPr lang="en-US" sz="1100" dirty="0" smtClean="0"/>
+              <a:t>(Kbps)</a:t>
+            </a:r>
+            <a:endParaRPr lang="ru-RU" sz="1100" dirty="0"/>
+          </a:p>
+        </p:txBody>
+      </p:sp>
+      <p:sp>
+        <p:nvSpPr>
+          <p:cNvPr id="6" name="TextBox 5"/>
+          <p:cNvSpPr txBox="1"/>
+          <p:nvPr/>
+        </p:nvSpPr>
+        <p:spPr>
+          <a:xfrm>
+            <a:off x="6705600" y="2819400"/>
+            <a:ext cx="838200" cy="276999"/>
+          </a:xfrm>
+          <a:prstGeom prst="rect">
+            <a:avLst/>
+          </a:prstGeom>
+          <a:noFill/>
+        </p:spPr>
+        <p:txBody>
+          <a:bodyPr wrap="square" rtlCol="0">
+            <a:spAutoFit/>
+          </a:bodyPr>
+          <a:lstStyle/>
+          <a:p>
+            <a:pPr algn="r"/>
+            <a:r>
+              <a:rPr lang="en-US" sz="1200" dirty="0" smtClean="0"/>
+              <a:t>(</a:t>
+            </a:r>
+            <a:r>
+              <a:rPr lang="en-US" sz="1200" dirty="0" err="1" smtClean="0"/>
+              <a:t>DBm</a:t>
+            </a:r>
+            <a:r>
+              <a:rPr lang="en-US" sz="1200" dirty="0" smtClean="0"/>
+              <a:t>)</a:t>
+            </a:r>
+            <a:endParaRPr lang="ru-RU" sz="1200" dirty="0"/>
+          </a:p>
+        </p:txBody>
+      </p:sp>
+    </p:spTree>
+    <p:extLst>
+      <p:ext uri="{BB962C8B-B14F-4D97-AF65-F5344CB8AC3E}">
+        <p14:creationId xmlns:p14="http://schemas.microsoft.com/office/powerpoint/2010/main" val="2241084113"/>
+      </p:ext>
+    </p:extLst>
+  </p:cSld>
+  <p:clrMapOvr>
+    <a:masterClrMapping/>
+  </p:clrMapOvr>
+  <p:timing>
+    <p:tnLst>
+      <p:par>
+        <p:cTn id="1" dur="indefinite" restart="never" nodeType="tmRoot"/>
+      </p:par>
+    </p:tnLst>
+  </p:timing>
+</p:sld>
+</file>
+
+<file path=ppt/slides/slide14.xml><?xml version="1.0" encoding="utf-8"?>
+<p:sld xmlns:a="http://schemas.openxmlformats.org/drawingml/2006/main" xmlns:r="http://schemas.openxmlformats.org/officeDocument/2006/relationships" xmlns:p="http://schemas.openxmlformats.org/presentationml/2006/main">
+  <p:cSld>
+    <p:spTree>
+      <p:nvGrpSpPr>
+        <p:cNvPr id="1" name=""/>
+        <p:cNvGrpSpPr/>
+        <p:nvPr/>
+      </p:nvGrpSpPr>
+      <p:grpSpPr>
+        <a:xfrm>
+          <a:off x="0" y="0"/>
+          <a:ext cx="0" cy="0"/>
+          <a:chOff x="0" y="0"/>
+          <a:chExt cx="0" cy="0"/>
+        </a:xfrm>
+      </p:grpSpPr>
+      <p:sp>
+        <p:nvSpPr>
+          <p:cNvPr id="2" name="Content Placeholder 1"/>
+          <p:cNvSpPr>
+            <a:spLocks noGrp="1"/>
+          </p:cNvSpPr>
+          <p:nvPr>
+            <p:ph idx="1"/>
+          </p:nvPr>
+        </p:nvSpPr>
+        <p:spPr/>
+        <p:txBody>
+          <a:bodyPr/>
+          <a:lstStyle/>
+          <a:p>
+            <a:r>
+              <a:rPr lang="en-US" dirty="0" smtClean="0"/>
+              <a:t>Calculation </a:t>
+            </a:r>
+            <a:r>
+              <a:rPr lang="en-US" dirty="0"/>
+              <a:t>of transmit rate regarding to RSSI</a:t>
+            </a:r>
+          </a:p>
+          <a:p>
+            <a:pPr algn="l"/>
+            <a:endParaRPr lang="en-US" dirty="0" smtClean="0"/>
+          </a:p>
+          <a:p>
+            <a:pPr algn="l"/>
+            <a:endParaRPr lang="en-US" dirty="0" smtClean="0"/>
+          </a:p>
+          <a:p>
+            <a:pPr algn="l"/>
+            <a:endParaRPr lang="en-US" dirty="0" smtClean="0"/>
+          </a:p>
+          <a:p>
+            <a:pPr algn="l"/>
+            <a:endParaRPr lang="en-US" dirty="0"/>
+          </a:p>
+        </p:txBody>
+      </p:sp>
+      <p:sp>
+        <p:nvSpPr>
+          <p:cNvPr id="3" name="Title 2"/>
+          <p:cNvSpPr>
+            <a:spLocks noGrp="1"/>
+          </p:cNvSpPr>
+          <p:nvPr>
+            <p:ph type="title"/>
+          </p:nvPr>
+        </p:nvSpPr>
+        <p:spPr/>
+        <p:txBody>
+          <a:bodyPr/>
+          <a:lstStyle/>
+          <a:p>
+            <a:pPr rtl="1"/>
+            <a:r>
+              <a:rPr lang="en-US" dirty="0" smtClean="0"/>
+              <a:t>Used Algorithms</a:t>
+            </a:r>
+            <a:endParaRPr lang="en-US" dirty="0"/>
           </a:p>
         </p:txBody>
       </p:sp>
       <p:pic>
         <p:nvPicPr>
-          <p:cNvPr id="5122" name="Picture 2" descr="D:\Dropbox\Z_PROJECTS\sls\Results\Coverage Area.JPG"/>
+          <p:cNvPr id="7" name="Picture 2" descr="D:\Dropbox\Z_PROJECTS\sls\Results\Coverage Area.JPG"/>
           <p:cNvPicPr>
             <a:picLocks noChangeAspect="1" noChangeArrowheads="1"/>
           </p:cNvPicPr>
@@ -8203,8 +8565,8 @@
         </p:blipFill>
         <p:spPr bwMode="auto">
           <a:xfrm>
-            <a:off x="1143000" y="1676400"/>
-            <a:ext cx="6986588" cy="4991016"/>
+            <a:off x="1219199" y="2748089"/>
+            <a:ext cx="5753189" cy="4109911"/>
           </a:xfrm>
           <a:prstGeom prst="rect">
             <a:avLst/>
@@ -8224,17 +8586,24 @@
     </p:spTree>
     <p:extLst>
       <p:ext uri="{BB962C8B-B14F-4D97-AF65-F5344CB8AC3E}">
-        <p14:creationId xmlns:p14="http://schemas.microsoft.com/office/powerpoint/2010/main" val="2687470670"/>
+        <p14:creationId xmlns:p14="http://schemas.microsoft.com/office/powerpoint/2010/main" val="1697233512"/>
       </p:ext>
     </p:extLst>
   </p:cSld>
   <p:clrMapOvr>
     <a:masterClrMapping/>
   </p:clrMapOvr>
+  <p:timing>
+    <p:tnLst>
+      <p:par>
+        <p:cTn id="1" dur="indefinite" restart="never" nodeType="tmRoot"/>
+      </p:par>
+    </p:tnLst>
+  </p:timing>
 </p:sld>
 </file>
 
-<file path=ppt/slides/slide14.xml><?xml version="1.0" encoding="utf-8"?>
+<file path=ppt/slides/slide15.xml><?xml version="1.0" encoding="utf-8"?>
 <p:sld xmlns:a="http://schemas.openxmlformats.org/drawingml/2006/main" xmlns:r="http://schemas.openxmlformats.org/officeDocument/2006/relationships" xmlns:p="http://schemas.openxmlformats.org/presentationml/2006/main">
   <p:cSld>
     <p:spTree>
@@ -8270,35 +8639,50 @@
           <a:p>
             <a:r>
               <a:rPr lang="en-US" sz="3200" dirty="0" smtClean="0"/>
-              <a:t>Null Data Packet </a:t>
-            </a:r>
-            <a:r>
-              <a:rPr lang="en-US" sz="3200" dirty="0"/>
+              <a:t>We have developed 2 different SLS algorithms: </a:t>
+            </a:r>
+          </a:p>
+          <a:p>
+            <a:endParaRPr lang="en-US" sz="3200" dirty="0"/>
+          </a:p>
+          <a:p>
+            <a:pPr lvl="1">
+              <a:buFont typeface="Wingdings" pitchFamily="2" charset="2"/>
+              <a:buChar char="Ø"/>
+            </a:pPr>
+            <a:r>
+              <a:rPr lang="en-US" sz="3000" dirty="0" smtClean="0"/>
+              <a:t>Null </a:t>
+            </a:r>
+            <a:r>
+              <a:rPr lang="en-US" sz="3000" dirty="0" smtClean="0"/>
+              <a:t>Data Packet </a:t>
+            </a:r>
+            <a:r>
+              <a:rPr lang="en-US" sz="3000" dirty="0"/>
               <a:t>Based </a:t>
             </a:r>
             <a:r>
-              <a:rPr lang="en-US" sz="3200" dirty="0" smtClean="0"/>
+              <a:rPr lang="en-US" sz="3000" dirty="0" smtClean="0"/>
               <a:t>Algorithm</a:t>
             </a:r>
           </a:p>
           <a:p>
-            <a:pPr marL="0" indent="0">
+            <a:pPr marL="411480" lvl="1" indent="0">
               <a:buNone/>
             </a:pPr>
-            <a:endParaRPr lang="en-US" sz="3200" dirty="0"/>
-          </a:p>
-          <a:p>
-            <a:pPr marL="0" indent="0">
-              <a:buNone/>
+            <a:endParaRPr lang="en-US" sz="3000" dirty="0" smtClean="0"/>
+          </a:p>
+          <a:p>
+            <a:pPr lvl="1">
+              <a:buFont typeface="Wingdings" pitchFamily="2" charset="2"/>
+              <a:buChar char="Ø"/>
             </a:pPr>
-            <a:endParaRPr lang="en-US" sz="3200" dirty="0" smtClean="0"/>
-          </a:p>
-          <a:p>
-            <a:r>
-              <a:rPr lang="en-US" sz="3200" dirty="0" smtClean="0"/>
+            <a:r>
+              <a:rPr lang="en-US" sz="3000" dirty="0" smtClean="0"/>
               <a:t>Window Based Algorithm</a:t>
             </a:r>
-            <a:endParaRPr lang="ru-RU" sz="3200" dirty="0"/>
+            <a:endParaRPr lang="ru-RU" sz="3000" dirty="0"/>
           </a:p>
         </p:txBody>
       </p:sp>
@@ -8319,7 +8703,7 @@
           <a:p>
             <a:r>
               <a:rPr lang="en-US" dirty="0" smtClean="0"/>
-              <a:t>SLS</a:t>
+              <a:t>Smart Link Selection</a:t>
             </a:r>
             <a:endParaRPr lang="ru-RU" dirty="0"/>
           </a:p>
@@ -8335,10 +8719,17 @@
   <p:clrMapOvr>
     <a:masterClrMapping/>
   </p:clrMapOvr>
+  <p:timing>
+    <p:tnLst>
+      <p:par>
+        <p:cTn id="1" dur="indefinite" restart="never" nodeType="tmRoot"/>
+      </p:par>
+    </p:tnLst>
+  </p:timing>
 </p:sld>
 </file>
 
-<file path=ppt/slides/slide15.xml><?xml version="1.0" encoding="utf-8"?>
+<file path=ppt/slides/slide16.xml><?xml version="1.0" encoding="utf-8"?>
 <p:sld xmlns:a="http://schemas.openxmlformats.org/drawingml/2006/main" xmlns:r="http://schemas.openxmlformats.org/officeDocument/2006/relationships" xmlns:p="http://schemas.openxmlformats.org/presentationml/2006/main">
   <p:cSld>
     <p:spTree>
@@ -8474,10 +8865,17 @@
   <p:clrMapOvr>
     <a:masterClrMapping/>
   </p:clrMapOvr>
+  <p:timing>
+    <p:tnLst>
+      <p:par>
+        <p:cTn id="1" dur="indefinite" restart="never" nodeType="tmRoot"/>
+      </p:par>
+    </p:tnLst>
+  </p:timing>
 </p:sld>
 </file>
 
-<file path=ppt/slides/slide16.xml><?xml version="1.0" encoding="utf-8"?>
+<file path=ppt/slides/slide17.xml><?xml version="1.0" encoding="utf-8"?>
 <p:sld xmlns:a="http://schemas.openxmlformats.org/drawingml/2006/main" xmlns:r="http://schemas.openxmlformats.org/officeDocument/2006/relationships" xmlns:p="http://schemas.openxmlformats.org/presentationml/2006/main">
   <p:cSld>
     <p:spTree>
@@ -8536,7 +8934,7 @@
           <a:graphicData uri="http://schemas.openxmlformats.org/presentationml/2006/ole">
             <mc:AlternateContent xmlns:mc="http://schemas.openxmlformats.org/markup-compatibility/2006">
               <mc:Choice xmlns:v="urn:schemas-microsoft-com:vml" Requires="v">
-                <p:oleObj spid="_x0000_s3169" name="Visio" r:id="rId3" imgW="9147060" imgH="7289860" progId="Visio.Drawing.11">
+                <p:oleObj spid="_x0000_s3176" name="Visio" r:id="rId3" imgW="9147060" imgH="7289860" progId="Visio.Drawing.11">
                   <p:embed/>
                 </p:oleObj>
               </mc:Choice>
@@ -8591,7 +8989,7 @@
 </p:sld>
 </file>
 
-<file path=ppt/slides/slide17.xml><?xml version="1.0" encoding="utf-8"?>
+<file path=ppt/slides/slide18.xml><?xml version="1.0" encoding="utf-8"?>
 <p:sld xmlns:a="http://schemas.openxmlformats.org/drawingml/2006/main" xmlns:r="http://schemas.openxmlformats.org/officeDocument/2006/relationships" xmlns:p="http://schemas.openxmlformats.org/presentationml/2006/main">
   <p:cSld>
     <p:spTree>
@@ -8754,7 +9152,7 @@
 </p:sld>
 </file>
 
-<file path=ppt/slides/slide18.xml><?xml version="1.0" encoding="utf-8"?>
+<file path=ppt/slides/slide19.xml><?xml version="1.0" encoding="utf-8"?>
 <p:sld xmlns:a="http://schemas.openxmlformats.org/drawingml/2006/main" xmlns:r="http://schemas.openxmlformats.org/officeDocument/2006/relationships" xmlns:p="http://schemas.openxmlformats.org/presentationml/2006/main">
   <p:cSld>
     <p:spTree>
@@ -8793,7 +9191,7 @@
           <a:graphicData uri="http://schemas.openxmlformats.org/presentationml/2006/ole">
             <mc:AlternateContent xmlns:mc="http://schemas.openxmlformats.org/markup-compatibility/2006">
               <mc:Choice xmlns:v="urn:schemas-microsoft-com:vml" Requires="v">
-                <p:oleObj spid="_x0000_s5149" name="Visio" r:id="rId3" imgW="10758690" imgH="7626560" progId="Visio.Drawing.11">
+                <p:oleObj spid="_x0000_s5156" name="Visio" r:id="rId3" imgW="10758690" imgH="7626560" progId="Visio.Drawing.11">
                   <p:embed/>
                 </p:oleObj>
               </mc:Choice>
@@ -8953,132 +9351,6 @@
 </p:sld>
 </file>
 
-<file path=ppt/slides/slide19.xml><?xml version="1.0" encoding="utf-8"?>
-<p:sld xmlns:a="http://schemas.openxmlformats.org/drawingml/2006/main" xmlns:r="http://schemas.openxmlformats.org/officeDocument/2006/relationships" xmlns:p="http://schemas.openxmlformats.org/presentationml/2006/main">
-  <p:cSld>
-    <p:spTree>
-      <p:nvGrpSpPr>
-        <p:cNvPr id="1" name=""/>
-        <p:cNvGrpSpPr/>
-        <p:nvPr/>
-      </p:nvGrpSpPr>
-      <p:grpSpPr>
-        <a:xfrm>
-          <a:off x="0" y="0"/>
-          <a:ext cx="0" cy="0"/>
-          <a:chOff x="0" y="0"/>
-          <a:chExt cx="0" cy="0"/>
-        </a:xfrm>
-      </p:grpSpPr>
-      <p:graphicFrame>
-        <p:nvGraphicFramePr>
-          <p:cNvPr id="7" name="Object 6"/>
-          <p:cNvGraphicFramePr>
-            <a:graphicFrameLocks noChangeAspect="1"/>
-          </p:cNvGraphicFramePr>
-          <p:nvPr>
-            <p:extLst>
-              <p:ext uri="{D42A27DB-BD31-4B8C-83A1-F6EECF244321}">
-                <p14:modId xmlns:p14="http://schemas.microsoft.com/office/powerpoint/2010/main" val="1831266268"/>
-              </p:ext>
-            </p:extLst>
-          </p:nvPr>
-        </p:nvGraphicFramePr>
-        <p:xfrm>
-          <a:off x="0" y="-1"/>
-          <a:ext cx="9144000" cy="6858001"/>
-        </p:xfrm>
-        <a:graphic>
-          <a:graphicData uri="http://schemas.openxmlformats.org/presentationml/2006/ole">
-            <mc:AlternateContent xmlns:mc="http://schemas.openxmlformats.org/markup-compatibility/2006">
-              <mc:Choice xmlns:v="urn:schemas-microsoft-com:vml" Requires="v">
-                <p:oleObj spid="_x0000_s7191" name="Visio" r:id="rId3" imgW="10758690" imgH="7626560" progId="Visio.Drawing.11">
-                  <p:embed/>
-                </p:oleObj>
-              </mc:Choice>
-              <mc:Fallback>
-                <p:oleObj name="Visio" r:id="rId3" imgW="10758690" imgH="7626560" progId="Visio.Drawing.11">
-                  <p:embed/>
-                  <p:pic>
-                    <p:nvPicPr>
-                      <p:cNvPr id="0" name=""/>
-                      <p:cNvPicPr/>
-                      <p:nvPr/>
-                    </p:nvPicPr>
-                    <p:blipFill>
-                      <a:blip r:embed="rId4"/>
-                      <a:stretch>
-                        <a:fillRect/>
-                      </a:stretch>
-                    </p:blipFill>
-                    <p:spPr>
-                      <a:xfrm>
-                        <a:off x="0" y="-1"/>
-                        <a:ext cx="9144000" cy="6858001"/>
-                      </a:xfrm>
-                      <a:prstGeom prst="rect">
-                        <a:avLst/>
-                      </a:prstGeom>
-                    </p:spPr>
-                  </p:pic>
-                </p:oleObj>
-              </mc:Fallback>
-            </mc:AlternateContent>
-          </a:graphicData>
-        </a:graphic>
-      </p:graphicFrame>
-      <p:sp>
-        <p:nvSpPr>
-          <p:cNvPr id="3" name="Заголовок 2"/>
-          <p:cNvSpPr>
-            <a:spLocks noGrp="1"/>
-          </p:cNvSpPr>
-          <p:nvPr>
-            <p:ph type="title"/>
-          </p:nvPr>
-        </p:nvSpPr>
-        <p:spPr>
-          <a:xfrm>
-            <a:off x="285750" y="95250"/>
-            <a:ext cx="7756263" cy="1054250"/>
-          </a:xfrm>
-        </p:spPr>
-        <p:txBody>
-          <a:bodyPr/>
-          <a:lstStyle/>
-          <a:p>
-            <a:r>
-              <a:rPr lang="en-US" sz="4800" dirty="0"/>
-              <a:t>Window Based </a:t>
-            </a:r>
-            <a:r>
-              <a:rPr lang="en-US" sz="4800" dirty="0" smtClean="0"/>
-              <a:t>Algorithm</a:t>
-            </a:r>
-            <a:endParaRPr lang="ru-RU" dirty="0"/>
-          </a:p>
-        </p:txBody>
-      </p:sp>
-    </p:spTree>
-    <p:extLst>
-      <p:ext uri="{BB962C8B-B14F-4D97-AF65-F5344CB8AC3E}">
-        <p14:creationId xmlns:p14="http://schemas.microsoft.com/office/powerpoint/2010/main" val="2267959745"/>
-      </p:ext>
-    </p:extLst>
-  </p:cSld>
-  <p:clrMapOvr>
-    <a:masterClrMapping/>
-  </p:clrMapOvr>
-  <p:timing>
-    <p:tnLst>
-      <p:par>
-        <p:cTn id="1" dur="indefinite" restart="never" nodeType="tmRoot"/>
-      </p:par>
-    </p:tnLst>
-  </p:timing>
-</p:sld>
-</file>
-
 <file path=ppt/slides/slide2.xml><?xml version="1.0" encoding="utf-8"?>
 <p:sld xmlns:a="http://schemas.openxmlformats.org/drawingml/2006/main" xmlns:r="http://schemas.openxmlformats.org/officeDocument/2006/relationships" xmlns:p="http://schemas.openxmlformats.org/presentationml/2006/main">
   <p:cSld>
@@ -9098,6 +9370,36 @@
       </p:grpSpPr>
       <p:sp>
         <p:nvSpPr>
+          <p:cNvPr id="2" name="Content Placeholder 1"/>
+          <p:cNvSpPr>
+            <a:spLocks noGrp="1"/>
+          </p:cNvSpPr>
+          <p:nvPr>
+            <p:ph idx="1"/>
+          </p:nvPr>
+        </p:nvSpPr>
+        <p:spPr/>
+        <p:txBody>
+          <a:bodyPr>
+            <a:normAutofit/>
+          </a:bodyPr>
+          <a:lstStyle/>
+          <a:p>
+            <a:pPr algn="l"/>
+            <a:r>
+              <a:rPr lang="en-US" dirty="0" smtClean="0"/>
+              <a:t>Creation of WiFi simulator in order to develop Smart Link Selection </a:t>
+            </a:r>
+            <a:r>
+              <a:rPr lang="en-US" dirty="0" smtClean="0"/>
+              <a:t>Algorithms  </a:t>
+            </a:r>
+            <a:endParaRPr lang="en-US" dirty="0"/>
+          </a:p>
+        </p:txBody>
+      </p:sp>
+      <p:sp>
+        <p:nvSpPr>
           <p:cNvPr id="3" name="Title 2"/>
           <p:cNvSpPr>
             <a:spLocks noGrp="1"/>
@@ -9114,7 +9416,11 @@
             <a:pPr rtl="1"/>
             <a:r>
               <a:rPr lang="en-US" dirty="0" smtClean="0"/>
-              <a:t>Project Overview</a:t>
+              <a:t>Project </a:t>
+            </a:r>
+            <a:r>
+              <a:rPr lang="en-US" dirty="0" smtClean="0"/>
+              <a:t>Goal</a:t>
             </a:r>
             <a:endParaRPr lang="en-US" dirty="0"/>
           </a:p>
@@ -9142,8 +9448,8 @@
         </p:blipFill>
         <p:spPr>
           <a:xfrm>
-            <a:off x="1600200" y="2133600"/>
-            <a:ext cx="5976664" cy="4320481"/>
+            <a:off x="2209800" y="3084411"/>
+            <a:ext cx="4648200" cy="3360145"/>
           </a:xfrm>
           <a:prstGeom prst="rect">
             <a:avLst/>
@@ -9159,7 +9465,7 @@
     </p:spTree>
     <p:extLst>
       <p:ext uri="{BB962C8B-B14F-4D97-AF65-F5344CB8AC3E}">
-        <p14:creationId xmlns:p14="http://schemas.microsoft.com/office/powerpoint/2010/main" val="3615643797"/>
+        <p14:creationId xmlns:p14="http://schemas.microsoft.com/office/powerpoint/2010/main" val="3472477673"/>
       </p:ext>
     </p:extLst>
   </p:cSld>
@@ -9309,6 +9615,132 @@
       </p:grpSpPr>
       <p:graphicFrame>
         <p:nvGraphicFramePr>
+          <p:cNvPr id="7" name="Object 6"/>
+          <p:cNvGraphicFramePr>
+            <a:graphicFrameLocks noChangeAspect="1"/>
+          </p:cNvGraphicFramePr>
+          <p:nvPr>
+            <p:extLst>
+              <p:ext uri="{D42A27DB-BD31-4B8C-83A1-F6EECF244321}">
+                <p14:modId xmlns:p14="http://schemas.microsoft.com/office/powerpoint/2010/main" val="1831266268"/>
+              </p:ext>
+            </p:extLst>
+          </p:nvPr>
+        </p:nvGraphicFramePr>
+        <p:xfrm>
+          <a:off x="0" y="-1"/>
+          <a:ext cx="9144000" cy="6858001"/>
+        </p:xfrm>
+        <a:graphic>
+          <a:graphicData uri="http://schemas.openxmlformats.org/presentationml/2006/ole">
+            <mc:AlternateContent xmlns:mc="http://schemas.openxmlformats.org/markup-compatibility/2006">
+              <mc:Choice xmlns:v="urn:schemas-microsoft-com:vml" Requires="v">
+                <p:oleObj spid="_x0000_s7198" name="Visio" r:id="rId3" imgW="10758690" imgH="7626560" progId="Visio.Drawing.11">
+                  <p:embed/>
+                </p:oleObj>
+              </mc:Choice>
+              <mc:Fallback>
+                <p:oleObj name="Visio" r:id="rId3" imgW="10758690" imgH="7626560" progId="Visio.Drawing.11">
+                  <p:embed/>
+                  <p:pic>
+                    <p:nvPicPr>
+                      <p:cNvPr id="0" name=""/>
+                      <p:cNvPicPr/>
+                      <p:nvPr/>
+                    </p:nvPicPr>
+                    <p:blipFill>
+                      <a:blip r:embed="rId4"/>
+                      <a:stretch>
+                        <a:fillRect/>
+                      </a:stretch>
+                    </p:blipFill>
+                    <p:spPr>
+                      <a:xfrm>
+                        <a:off x="0" y="-1"/>
+                        <a:ext cx="9144000" cy="6858001"/>
+                      </a:xfrm>
+                      <a:prstGeom prst="rect">
+                        <a:avLst/>
+                      </a:prstGeom>
+                    </p:spPr>
+                  </p:pic>
+                </p:oleObj>
+              </mc:Fallback>
+            </mc:AlternateContent>
+          </a:graphicData>
+        </a:graphic>
+      </p:graphicFrame>
+      <p:sp>
+        <p:nvSpPr>
+          <p:cNvPr id="3" name="Заголовок 2"/>
+          <p:cNvSpPr>
+            <a:spLocks noGrp="1"/>
+          </p:cNvSpPr>
+          <p:nvPr>
+            <p:ph type="title"/>
+          </p:nvPr>
+        </p:nvSpPr>
+        <p:spPr>
+          <a:xfrm>
+            <a:off x="285750" y="95250"/>
+            <a:ext cx="7756263" cy="1054250"/>
+          </a:xfrm>
+        </p:spPr>
+        <p:txBody>
+          <a:bodyPr/>
+          <a:lstStyle/>
+          <a:p>
+            <a:r>
+              <a:rPr lang="en-US" sz="4800" dirty="0"/>
+              <a:t>Window Based </a:t>
+            </a:r>
+            <a:r>
+              <a:rPr lang="en-US" sz="4800" dirty="0" smtClean="0"/>
+              <a:t>Algorithm</a:t>
+            </a:r>
+            <a:endParaRPr lang="ru-RU" dirty="0"/>
+          </a:p>
+        </p:txBody>
+      </p:sp>
+    </p:spTree>
+    <p:extLst>
+      <p:ext uri="{BB962C8B-B14F-4D97-AF65-F5344CB8AC3E}">
+        <p14:creationId xmlns:p14="http://schemas.microsoft.com/office/powerpoint/2010/main" val="2267959745"/>
+      </p:ext>
+    </p:extLst>
+  </p:cSld>
+  <p:clrMapOvr>
+    <a:masterClrMapping/>
+  </p:clrMapOvr>
+  <p:timing>
+    <p:tnLst>
+      <p:par>
+        <p:cTn id="1" dur="indefinite" restart="never" nodeType="tmRoot"/>
+      </p:par>
+    </p:tnLst>
+  </p:timing>
+</p:sld>
+</file>
+
+<file path=ppt/slides/slide21.xml><?xml version="1.0" encoding="utf-8"?>
+<p:sld xmlns:a="http://schemas.openxmlformats.org/drawingml/2006/main" xmlns:r="http://schemas.openxmlformats.org/officeDocument/2006/relationships" xmlns:p="http://schemas.openxmlformats.org/presentationml/2006/main">
+  <p:cSld>
+    <p:spTree>
+      <p:nvGrpSpPr>
+        <p:cNvPr id="1" name=""/>
+        <p:cNvGrpSpPr/>
+        <p:nvPr/>
+      </p:nvGrpSpPr>
+      <p:grpSpPr>
+        <a:xfrm>
+          <a:off x="0" y="0"/>
+          <a:ext cx="0" cy="0"/>
+          <a:chOff x="0" y="0"/>
+          <a:chExt cx="0" cy="0"/>
+        </a:xfrm>
+      </p:grpSpPr>
+      <p:graphicFrame>
+        <p:nvGraphicFramePr>
           <p:cNvPr id="5" name="Object 4"/>
           <p:cNvGraphicFramePr>
             <a:graphicFrameLocks noChangeAspect="1"/>
@@ -9329,7 +9761,7 @@
           <a:graphicData uri="http://schemas.openxmlformats.org/presentationml/2006/ole">
             <mc:AlternateContent xmlns:mc="http://schemas.openxmlformats.org/markup-compatibility/2006">
               <mc:Choice xmlns:v="urn:schemas-microsoft-com:vml" Requires="v">
-                <p:oleObj spid="_x0000_s8215" name="Visio" r:id="rId3" imgW="10758690" imgH="7626560" progId="Visio.Drawing.11">
+                <p:oleObj spid="_x0000_s8222" name="Visio" r:id="rId3" imgW="10758690" imgH="7626560" progId="Visio.Drawing.11">
                   <p:embed/>
                 </p:oleObj>
               </mc:Choice>
@@ -9416,7 +9848,7 @@
 </p:sld>
 </file>
 
-<file path=ppt/slides/slide21.xml><?xml version="1.0" encoding="utf-8"?>
+<file path=ppt/slides/slide22.xml><?xml version="1.0" encoding="utf-8"?>
 <p:sld xmlns:a="http://schemas.openxmlformats.org/drawingml/2006/main" xmlns:r="http://schemas.openxmlformats.org/officeDocument/2006/relationships" xmlns:p="http://schemas.openxmlformats.org/presentationml/2006/main">
   <p:cSld>
     <p:spTree>
@@ -9476,7 +9908,7 @@
           <a:graphicData uri="http://schemas.openxmlformats.org/presentationml/2006/ole">
             <mc:AlternateContent xmlns:mc="http://schemas.openxmlformats.org/markup-compatibility/2006">
               <mc:Choice xmlns:v="urn:schemas-microsoft-com:vml" Requires="v">
-                <p:oleObj spid="_x0000_s2147" name="Visio" r:id="rId3" imgW="9147060" imgH="7289860" progId="Visio.Drawing.11">
+                <p:oleObj spid="_x0000_s2154" name="Visio" r:id="rId3" imgW="9147060" imgH="7289860" progId="Visio.Drawing.11">
                   <p:embed/>
                 </p:oleObj>
               </mc:Choice>
@@ -9531,7 +9963,7 @@
 </p:sld>
 </file>
 
-<file path=ppt/slides/slide22.xml><?xml version="1.0" encoding="utf-8"?>
+<file path=ppt/slides/slide23.xml><?xml version="1.0" encoding="utf-8"?>
 <p:sld xmlns:a="http://schemas.openxmlformats.org/drawingml/2006/main" xmlns:r="http://schemas.openxmlformats.org/officeDocument/2006/relationships" xmlns:p="http://schemas.openxmlformats.org/presentationml/2006/main">
   <p:cSld>
     <p:spTree>
@@ -9675,91 +10107,6 @@
     <p:extLst>
       <p:ext uri="{BB962C8B-B14F-4D97-AF65-F5344CB8AC3E}">
         <p14:creationId xmlns:p14="http://schemas.microsoft.com/office/powerpoint/2010/main" val="2265612564"/>
-      </p:ext>
-    </p:extLst>
-  </p:cSld>
-  <p:clrMapOvr>
-    <a:masterClrMapping/>
-  </p:clrMapOvr>
-  <p:timing>
-    <p:tnLst>
-      <p:par>
-        <p:cTn id="1" dur="indefinite" restart="never" nodeType="tmRoot"/>
-      </p:par>
-    </p:tnLst>
-  </p:timing>
-</p:sld>
-</file>
-
-<file path=ppt/slides/slide23.xml><?xml version="1.0" encoding="utf-8"?>
-<p:sld xmlns:a="http://schemas.openxmlformats.org/drawingml/2006/main" xmlns:r="http://schemas.openxmlformats.org/officeDocument/2006/relationships" xmlns:p="http://schemas.openxmlformats.org/presentationml/2006/main">
-  <p:cSld>
-    <p:spTree>
-      <p:nvGrpSpPr>
-        <p:cNvPr id="1" name=""/>
-        <p:cNvGrpSpPr/>
-        <p:nvPr/>
-      </p:nvGrpSpPr>
-      <p:grpSpPr>
-        <a:xfrm>
-          <a:off x="0" y="0"/>
-          <a:ext cx="0" cy="0"/>
-          <a:chOff x="0" y="0"/>
-          <a:chExt cx="0" cy="0"/>
-        </a:xfrm>
-      </p:grpSpPr>
-      <p:sp>
-        <p:nvSpPr>
-          <p:cNvPr id="3" name="Title 2"/>
-          <p:cNvSpPr>
-            <a:spLocks noGrp="1"/>
-          </p:cNvSpPr>
-          <p:nvPr>
-            <p:ph type="title"/>
-          </p:nvPr>
-        </p:nvSpPr>
-        <p:spPr/>
-        <p:txBody>
-          <a:bodyPr/>
-          <a:lstStyle/>
-          <a:p>
-            <a:pPr rtl="1"/>
-            <a:r>
-              <a:rPr lang="en-US" dirty="0" smtClean="0"/>
-              <a:t>Rates used</a:t>
-            </a:r>
-            <a:endParaRPr lang="en-US" dirty="0"/>
-          </a:p>
-        </p:txBody>
-      </p:sp>
-      <p:graphicFrame>
-        <p:nvGraphicFramePr>
-          <p:cNvPr id="5" name="Диаграмма 4"/>
-          <p:cNvGraphicFramePr>
-            <a:graphicFrameLocks/>
-          </p:cNvGraphicFramePr>
-          <p:nvPr>
-            <p:extLst>
-              <p:ext uri="{D42A27DB-BD31-4B8C-83A1-F6EECF244321}">
-                <p14:modId xmlns:p14="http://schemas.microsoft.com/office/powerpoint/2010/main" val="3962167458"/>
-              </p:ext>
-            </p:extLst>
-          </p:nvPr>
-        </p:nvGraphicFramePr>
-        <p:xfrm>
-          <a:off x="1143000" y="1676400"/>
-          <a:ext cx="6781800" cy="4848225"/>
-        </p:xfrm>
-        <a:graphic>
-          <a:graphicData uri="http://schemas.openxmlformats.org/drawingml/2006/chart">
-            <c:chart xmlns:c="http://schemas.openxmlformats.org/drawingml/2006/chart" xmlns:r="http://schemas.openxmlformats.org/officeDocument/2006/relationships" r:id="rId2"/>
-          </a:graphicData>
-        </a:graphic>
-      </p:graphicFrame>
-    </p:spTree>
-    <p:extLst>
-      <p:ext uri="{BB962C8B-B14F-4D97-AF65-F5344CB8AC3E}">
-        <p14:creationId xmlns:p14="http://schemas.microsoft.com/office/powerpoint/2010/main" val="1441071697"/>
       </p:ext>
     </p:extLst>
   </p:cSld>
@@ -9861,7 +10208,7 @@
     </p:spTree>
     <p:extLst>
       <p:ext uri="{BB962C8B-B14F-4D97-AF65-F5344CB8AC3E}">
-        <p14:creationId xmlns:p14="http://schemas.microsoft.com/office/powerpoint/2010/main" val="1441071697"/>
+        <p14:creationId xmlns:p14="http://schemas.microsoft.com/office/powerpoint/2010/main" val="2302769290"/>
       </p:ext>
     </p:extLst>
   </p:cSld>
@@ -10211,7 +10558,12 @@
             <p:ph idx="1"/>
           </p:nvPr>
         </p:nvSpPr>
-        <p:spPr/>
+        <p:spPr>
+          <a:xfrm>
+            <a:off x="457200" y="1905001"/>
+            <a:ext cx="7987553" cy="4221162"/>
+          </a:xfrm>
+        </p:spPr>
         <p:txBody>
           <a:bodyPr/>
           <a:lstStyle/>
@@ -10266,14 +10618,14 @@
           <p:nvPr>
             <p:extLst>
               <p:ext uri="{D42A27DB-BD31-4B8C-83A1-F6EECF244321}">
-                <p14:modId xmlns:p14="http://schemas.microsoft.com/office/powerpoint/2010/main" val="3293380053"/>
+                <p14:modId xmlns:p14="http://schemas.microsoft.com/office/powerpoint/2010/main" val="2763180952"/>
               </p:ext>
             </p:extLst>
           </p:nvPr>
         </p:nvGraphicFramePr>
         <p:xfrm>
-          <a:off x="2971800" y="2514599"/>
-          <a:ext cx="5410200" cy="1371601"/>
+          <a:off x="609600" y="5334000"/>
+          <a:ext cx="3733800" cy="1371601"/>
         </p:xfrm>
         <a:graphic>
           <a:graphicData uri="http://schemas.openxmlformats.org/drawingml/2006/table">
@@ -10282,10 +10634,10 @@
                 <a:tableStyleId>{16D9F66E-5EB9-4882-86FB-DCBF35E3C3E4}</a:tableStyleId>
               </a:tblPr>
               <a:tblGrid>
-                <a:gridCol w="1352550"/>
-                <a:gridCol w="1352550"/>
-                <a:gridCol w="1352550"/>
-                <a:gridCol w="1352550"/>
+                <a:gridCol w="933450"/>
+                <a:gridCol w="933450"/>
+                <a:gridCol w="933450"/>
+                <a:gridCol w="933450"/>
               </a:tblGrid>
               <a:tr h="363547">
                 <a:tc>
@@ -10324,12 +10676,12 @@
                     <a:p>
                       <a:pPr algn="l" fontAlgn="b"/>
                       <a:r>
-                        <a:rPr lang="en-US" sz="1100" u="none" strike="noStrike">
+                        <a:rPr lang="en-US" sz="1100" u="none" strike="noStrike" dirty="0">
                           <a:effectLst/>
                         </a:rPr>
                         <a:t>AP</a:t>
                       </a:r>
-                      <a:endParaRPr lang="en-US" sz="1100" b="0" i="0" u="none" strike="noStrike">
+                      <a:endParaRPr lang="en-US" sz="1100" b="0" i="0" u="none" strike="noStrike" dirty="0">
                         <a:solidFill>
                           <a:srgbClr val="000000"/>
                         </a:solidFill>
@@ -10682,14 +11034,14 @@
           <p:nvPr>
             <p:extLst>
               <p:ext uri="{D42A27DB-BD31-4B8C-83A1-F6EECF244321}">
-                <p14:modId xmlns:p14="http://schemas.microsoft.com/office/powerpoint/2010/main" val="2641684414"/>
+                <p14:modId xmlns:p14="http://schemas.microsoft.com/office/powerpoint/2010/main" val="3037562827"/>
               </p:ext>
             </p:extLst>
           </p:nvPr>
         </p:nvGraphicFramePr>
         <p:xfrm>
-          <a:off x="609600" y="4114800"/>
-          <a:ext cx="3790950" cy="2205038"/>
+          <a:off x="4495800" y="2209800"/>
+          <a:ext cx="3943350" cy="2205038"/>
         </p:xfrm>
         <a:graphic>
           <a:graphicData uri="http://schemas.openxmlformats.org/drawingml/2006/chart">
@@ -10706,13 +11058,13 @@
           <p:nvPr>
             <p:extLst>
               <p:ext uri="{D42A27DB-BD31-4B8C-83A1-F6EECF244321}">
-                <p14:modId xmlns:p14="http://schemas.microsoft.com/office/powerpoint/2010/main" val="2150589850"/>
+                <p14:modId xmlns:p14="http://schemas.microsoft.com/office/powerpoint/2010/main" val="3332857893"/>
               </p:ext>
             </p:extLst>
           </p:nvPr>
         </p:nvGraphicFramePr>
         <p:xfrm>
-          <a:off x="4495800" y="4114800"/>
+          <a:off x="4495800" y="4495800"/>
           <a:ext cx="3933826" cy="2224088"/>
         </p:xfrm>
         <a:graphic>
@@ -10721,6 +11073,52 @@
           </a:graphicData>
         </a:graphic>
       </p:graphicFrame>
+      <p:pic>
+        <p:nvPicPr>
+          <p:cNvPr id="11266" name="Picture 2" descr="D:\Снимок.PNG"/>
+          <p:cNvPicPr>
+            <a:picLocks noChangeAspect="1" noChangeArrowheads="1"/>
+          </p:cNvPicPr>
+          <p:nvPr/>
+        </p:nvPicPr>
+        <p:blipFill>
+          <a:blip r:embed="rId4">
+            <a:extLst>
+              <a:ext uri="{28A0092B-C50C-407E-A947-70E740481C1C}">
+                <a14:useLocalDpi xmlns:a14="http://schemas.microsoft.com/office/drawing/2010/main" val="0"/>
+              </a:ext>
+            </a:extLst>
+          </a:blip>
+          <a:srcRect/>
+          <a:stretch>
+            <a:fillRect/>
+          </a:stretch>
+        </p:blipFill>
+        <p:spPr bwMode="auto">
+          <a:xfrm>
+            <a:off x="609600" y="2324099"/>
+            <a:ext cx="3048000" cy="2891425"/>
+          </a:xfrm>
+          <a:prstGeom prst="rect">
+            <a:avLst/>
+          </a:prstGeom>
+          <a:ln>
+            <a:noFill/>
+          </a:ln>
+          <a:effectLst>
+            <a:softEdge rad="112500"/>
+          </a:effectLst>
+          <a:extLst>
+            <a:ext uri="{909E8E84-426E-40DD-AFC4-6F175D3DCCD1}">
+              <a14:hiddenFill xmlns:a14="http://schemas.microsoft.com/office/drawing/2010/main">
+                <a:solidFill>
+                  <a:srgbClr val="FFFFFF"/>
+                </a:solidFill>
+              </a14:hiddenFill>
+            </a:ext>
+          </a:extLst>
+        </p:spPr>
+      </p:pic>
     </p:spTree>
     <p:extLst>
       <p:ext uri="{BB962C8B-B14F-4D97-AF65-F5344CB8AC3E}">
@@ -10731,6 +11129,13 @@
   <p:clrMapOvr>
     <a:masterClrMapping/>
   </p:clrMapOvr>
+  <p:timing>
+    <p:tnLst>
+      <p:par>
+        <p:cTn id="1" dur="indefinite" restart="never" nodeType="tmRoot"/>
+      </p:par>
+    </p:tnLst>
+  </p:timing>
 </p:sld>
 </file>
 
@@ -10761,7 +11166,12 @@
             <p:ph idx="1"/>
           </p:nvPr>
         </p:nvSpPr>
-        <p:spPr/>
+        <p:spPr>
+          <a:xfrm>
+            <a:off x="533401" y="1905000"/>
+            <a:ext cx="7911352" cy="4221163"/>
+          </a:xfrm>
+        </p:spPr>
         <p:txBody>
           <a:bodyPr/>
           <a:lstStyle/>
@@ -10816,14 +11226,14 @@
           <p:nvPr>
             <p:extLst>
               <p:ext uri="{D42A27DB-BD31-4B8C-83A1-F6EECF244321}">
-                <p14:modId xmlns:p14="http://schemas.microsoft.com/office/powerpoint/2010/main" val="3588538240"/>
+                <p14:modId xmlns:p14="http://schemas.microsoft.com/office/powerpoint/2010/main" val="661008965"/>
               </p:ext>
             </p:extLst>
           </p:nvPr>
         </p:nvGraphicFramePr>
         <p:xfrm>
-          <a:off x="2971800" y="2514599"/>
-          <a:ext cx="5410200" cy="1371601"/>
+          <a:off x="609598" y="5334000"/>
+          <a:ext cx="3733800" cy="1371601"/>
         </p:xfrm>
         <a:graphic>
           <a:graphicData uri="http://schemas.openxmlformats.org/drawingml/2006/table">
@@ -10832,10 +11242,10 @@
                 <a:tableStyleId>{16D9F66E-5EB9-4882-86FB-DCBF35E3C3E4}</a:tableStyleId>
               </a:tblPr>
               <a:tblGrid>
-                <a:gridCol w="1352550"/>
-                <a:gridCol w="1352550"/>
-                <a:gridCol w="1352550"/>
-                <a:gridCol w="1352550"/>
+                <a:gridCol w="933450"/>
+                <a:gridCol w="933450"/>
+                <a:gridCol w="933450"/>
+                <a:gridCol w="933450"/>
               </a:tblGrid>
               <a:tr h="363547">
                 <a:tc>
@@ -10856,6 +11266,12 @@
                         </a:rPr>
                         <a:t> </a:t>
                       </a:r>
+                      <a:r>
+                        <a:rPr lang="en-US" sz="1100" u="none" strike="noStrike" dirty="0" smtClean="0">
+                          <a:effectLst/>
+                        </a:rPr>
+                        <a:t> (meters)</a:t>
+                      </a:r>
                       <a:endParaRPr lang="ru-RU" sz="1100" b="0" i="0" u="none" strike="noStrike" dirty="0">
                         <a:solidFill>
                           <a:srgbClr val="000000"/>
@@ -10874,12 +11290,12 @@
                     <a:p>
                       <a:pPr algn="l" fontAlgn="b"/>
                       <a:r>
-                        <a:rPr lang="en-US" sz="1100" u="none" strike="noStrike">
+                        <a:rPr lang="en-US" sz="1100" u="none" strike="noStrike" dirty="0">
                           <a:effectLst/>
                         </a:rPr>
                         <a:t>AP</a:t>
                       </a:r>
-                      <a:endParaRPr lang="en-US" sz="1100" b="0" i="0" u="none" strike="noStrike">
+                      <a:endParaRPr lang="en-US" sz="1100" b="0" i="0" u="none" strike="noStrike" dirty="0">
                         <a:solidFill>
                           <a:srgbClr val="000000"/>
                         </a:solidFill>
@@ -11205,14 +11621,14 @@
           <p:nvPr>
             <p:extLst>
               <p:ext uri="{D42A27DB-BD31-4B8C-83A1-F6EECF244321}">
-                <p14:modId xmlns:p14="http://schemas.microsoft.com/office/powerpoint/2010/main" val="3609268317"/>
+                <p14:modId xmlns:p14="http://schemas.microsoft.com/office/powerpoint/2010/main" val="155132641"/>
               </p:ext>
             </p:extLst>
           </p:nvPr>
         </p:nvGraphicFramePr>
         <p:xfrm>
-          <a:off x="609600" y="4114800"/>
-          <a:ext cx="3810000" cy="2286000"/>
+          <a:off x="4495800" y="2129871"/>
+          <a:ext cx="3962400" cy="2286000"/>
         </p:xfrm>
         <a:graphic>
           <a:graphicData uri="http://schemas.openxmlformats.org/drawingml/2006/chart">
@@ -11229,14 +11645,14 @@
           <p:nvPr>
             <p:extLst>
               <p:ext uri="{D42A27DB-BD31-4B8C-83A1-F6EECF244321}">
-                <p14:modId xmlns:p14="http://schemas.microsoft.com/office/powerpoint/2010/main" val="3438908833"/>
+                <p14:modId xmlns:p14="http://schemas.microsoft.com/office/powerpoint/2010/main" val="130435482"/>
               </p:ext>
             </p:extLst>
           </p:nvPr>
         </p:nvGraphicFramePr>
         <p:xfrm>
-          <a:off x="4495800" y="4114800"/>
-          <a:ext cx="3962400" cy="2286000"/>
+          <a:off x="4495800" y="4495800"/>
+          <a:ext cx="3962400" cy="2209800"/>
         </p:xfrm>
         <a:graphic>
           <a:graphicData uri="http://schemas.openxmlformats.org/drawingml/2006/chart">
@@ -11244,6 +11660,71 @@
           </a:graphicData>
         </a:graphic>
       </p:graphicFrame>
+      <p:pic>
+        <p:nvPicPr>
+          <p:cNvPr id="10244" name="Picture 4"/>
+          <p:cNvPicPr>
+            <a:picLocks noChangeAspect="1" noChangeArrowheads="1"/>
+          </p:cNvPicPr>
+          <p:nvPr/>
+        </p:nvPicPr>
+        <p:blipFill>
+          <a:blip r:embed="rId4">
+            <a:extLst>
+              <a:ext uri="{28A0092B-C50C-407E-A947-70E740481C1C}">
+                <a14:useLocalDpi xmlns:a14="http://schemas.microsoft.com/office/drawing/2010/main" val="0"/>
+              </a:ext>
+            </a:extLst>
+          </a:blip>
+          <a:srcRect/>
+          <a:stretch>
+            <a:fillRect/>
+          </a:stretch>
+        </p:blipFill>
+        <p:spPr bwMode="auto">
+          <a:xfrm>
+            <a:off x="609600" y="2368882"/>
+            <a:ext cx="3051856" cy="2812718"/>
+          </a:xfrm>
+          <a:prstGeom prst="rect">
+            <a:avLst/>
+          </a:prstGeom>
+          <a:ln>
+            <a:noFill/>
+          </a:ln>
+          <a:effectLst>
+            <a:softEdge rad="112500"/>
+          </a:effectLst>
+          <a:extLst>
+            <a:ext uri="{909E8E84-426E-40DD-AFC4-6F175D3DCCD1}">
+              <a14:hiddenFill xmlns:a14="http://schemas.microsoft.com/office/drawing/2010/main">
+                <a:solidFill>
+                  <a:schemeClr val="accent1"/>
+                </a:solidFill>
+              </a14:hiddenFill>
+            </a:ext>
+            <a:ext uri="{91240B29-F687-4F45-9708-019B960494DF}">
+              <a14:hiddenLine xmlns:a14="http://schemas.microsoft.com/office/drawing/2010/main" w="9525">
+                <a:solidFill>
+                  <a:schemeClr val="tx1"/>
+                </a:solidFill>
+                <a:miter lim="800000"/>
+                <a:headEnd/>
+                <a:tailEnd/>
+              </a14:hiddenLine>
+            </a:ext>
+            <a:ext uri="{AF507438-7753-43E0-B8FC-AC1667EBCBE1}">
+              <a14:hiddenEffects xmlns:a14="http://schemas.microsoft.com/office/drawing/2010/main">
+                <a:effectLst>
+                  <a:outerShdw dist="35921" dir="2700000" algn="ctr" rotWithShape="0">
+                    <a:schemeClr val="bg2"/>
+                  </a:outerShdw>
+                </a:effectLst>
+              </a14:hiddenEffects>
+            </a:ext>
+          </a:extLst>
+        </p:spPr>
+      </p:pic>
     </p:spTree>
     <p:extLst>
       <p:ext uri="{BB962C8B-B14F-4D97-AF65-F5344CB8AC3E}">
@@ -11254,6 +11735,13 @@
   <p:clrMapOvr>
     <a:masterClrMapping/>
   </p:clrMapOvr>
+  <p:timing>
+    <p:tnLst>
+      <p:par>
+        <p:cTn id="1" dur="indefinite" restart="never" nodeType="tmRoot"/>
+      </p:par>
+    </p:tnLst>
+  </p:timing>
 </p:sld>
 </file>
 
@@ -11287,14 +11775,98 @@
         <p:spPr/>
         <p:txBody>
           <a:bodyPr>
-            <a:normAutofit/>
+            <a:normAutofit lnSpcReduction="10000"/>
           </a:bodyPr>
           <a:lstStyle/>
           <a:p>
             <a:pPr algn="l"/>
             <a:r>
               <a:rPr lang="en-US" dirty="0" smtClean="0"/>
-              <a:t>Creation of WiFi simulator in order to develop Smart Link Selection Algorithm  </a:t>
+              <a:t>Simulator</a:t>
+            </a:r>
+          </a:p>
+          <a:p>
+            <a:pPr lvl="1">
+              <a:buFont typeface="Wingdings" pitchFamily="2" charset="2"/>
+              <a:buChar char="Ø"/>
+            </a:pPr>
+            <a:r>
+              <a:rPr lang="en-US" dirty="0" smtClean="0"/>
+              <a:t>Design</a:t>
+            </a:r>
+          </a:p>
+          <a:p>
+            <a:pPr lvl="1">
+              <a:buFont typeface="Wingdings" pitchFamily="2" charset="2"/>
+              <a:buChar char="Ø"/>
+            </a:pPr>
+            <a:r>
+              <a:rPr lang="en-US" dirty="0" smtClean="0"/>
+              <a:t>S</a:t>
+            </a:r>
+            <a:r>
+              <a:rPr lang="en-US" dirty="0" smtClean="0"/>
+              <a:t>upported Protocols </a:t>
+            </a:r>
+            <a:endParaRPr lang="en-US" dirty="0" smtClean="0"/>
+          </a:p>
+          <a:p>
+            <a:pPr lvl="1">
+              <a:buFont typeface="Wingdings" pitchFamily="2" charset="2"/>
+              <a:buChar char="Ø"/>
+            </a:pPr>
+            <a:r>
+              <a:rPr lang="en-US" dirty="0" smtClean="0"/>
+              <a:t>Used </a:t>
+            </a:r>
+            <a:r>
+              <a:rPr lang="en-US" dirty="0" smtClean="0"/>
+              <a:t>algorithms</a:t>
+            </a:r>
+            <a:endParaRPr lang="en-US" dirty="0" smtClean="0"/>
+          </a:p>
+          <a:p>
+            <a:pPr lvl="1">
+              <a:buFont typeface="Wingdings" pitchFamily="2" charset="2"/>
+              <a:buChar char="Ø"/>
+            </a:pPr>
+            <a:r>
+              <a:rPr lang="en-US" dirty="0" smtClean="0"/>
+              <a:t>Usability</a:t>
+            </a:r>
+          </a:p>
+          <a:p>
+            <a:pPr marL="0" indent="0" algn="l">
+              <a:buNone/>
+            </a:pPr>
+            <a:endParaRPr lang="en-US" dirty="0" smtClean="0"/>
+          </a:p>
+          <a:p>
+            <a:pPr algn="l"/>
+            <a:r>
+              <a:rPr lang="en-US" dirty="0" smtClean="0"/>
+              <a:t>SLS Algorithm</a:t>
+            </a:r>
+          </a:p>
+          <a:p>
+            <a:pPr lvl="1"/>
+            <a:r>
+              <a:rPr lang="en-US" dirty="0" smtClean="0"/>
+              <a:t>Algorithms flow</a:t>
+            </a:r>
+          </a:p>
+          <a:p>
+            <a:pPr lvl="1"/>
+            <a:r>
+              <a:rPr lang="en-US" dirty="0" smtClean="0"/>
+              <a:t>Statistic</a:t>
+            </a:r>
+          </a:p>
+          <a:p>
+            <a:pPr lvl="1"/>
+            <a:r>
+              <a:rPr lang="en-US" dirty="0" smtClean="0"/>
+              <a:t>Conclusion</a:t>
             </a:r>
             <a:endParaRPr lang="en-US" dirty="0"/>
           </a:p>
@@ -11318,7 +11890,7 @@
             <a:pPr rtl="1"/>
             <a:r>
               <a:rPr lang="en-US" dirty="0" smtClean="0"/>
-              <a:t>Project Goals</a:t>
+              <a:t>Project Overview</a:t>
             </a:r>
             <a:endParaRPr lang="en-US" dirty="0"/>
           </a:p>
@@ -11327,7 +11899,7 @@
     </p:spTree>
     <p:extLst>
       <p:ext uri="{BB962C8B-B14F-4D97-AF65-F5344CB8AC3E}">
-        <p14:creationId xmlns:p14="http://schemas.microsoft.com/office/powerpoint/2010/main" val="3472477673"/>
+        <p14:creationId xmlns:p14="http://schemas.microsoft.com/office/powerpoint/2010/main" val="1441071697"/>
       </p:ext>
     </p:extLst>
   </p:cSld>
@@ -11691,6 +12263,13 @@
   <p:clrMapOvr>
     <a:masterClrMapping/>
   </p:clrMapOvr>
+  <p:timing>
+    <p:tnLst>
+      <p:par>
+        <p:cTn id="1" dur="indefinite" restart="never" nodeType="tmRoot"/>
+      </p:par>
+    </p:tnLst>
+  </p:timing>
 </p:sld>
 </file>
 
@@ -11985,6 +12564,13 @@
   <p:clrMapOvr>
     <a:masterClrMapping/>
   </p:clrMapOvr>
+  <p:timing>
+    <p:tnLst>
+      <p:par>
+        <p:cTn id="1" dur="indefinite" restart="never" nodeType="tmRoot"/>
+      </p:par>
+    </p:tnLst>
+  </p:timing>
 </p:sld>
 </file>
 
@@ -12018,15 +12604,82 @@
         <p:spPr/>
         <p:txBody>
           <a:bodyPr>
-            <a:normAutofit fontScale="92500" lnSpcReduction="10000"/>
+            <a:normAutofit lnSpcReduction="10000"/>
           </a:bodyPr>
           <a:lstStyle/>
           <a:p>
             <a:pPr algn="l"/>
             <a:r>
               <a:rPr lang="en-US" dirty="0" smtClean="0"/>
-              <a:t>Simulator</a:t>
-            </a:r>
+              <a:t>Medium infrastructure</a:t>
+            </a:r>
+            <a:r>
+              <a:rPr lang="en-US" dirty="0" smtClean="0"/>
+              <a:t>.</a:t>
+            </a:r>
+          </a:p>
+          <a:p>
+            <a:pPr marL="0" indent="0" algn="l">
+              <a:buNone/>
+            </a:pPr>
+            <a:endParaRPr lang="en-US" sz="1400" dirty="0" smtClean="0"/>
+          </a:p>
+          <a:p>
+            <a:pPr algn="l"/>
+            <a:r>
+              <a:rPr lang="en-US" dirty="0" smtClean="0"/>
+              <a:t>RF devices </a:t>
+            </a:r>
+            <a:endParaRPr lang="en-US" dirty="0" smtClean="0"/>
+          </a:p>
+          <a:p>
+            <a:pPr marL="0" indent="0" algn="l">
+              <a:buNone/>
+            </a:pPr>
+            <a:endParaRPr lang="en-US" sz="1400" strike="sngStrike" dirty="0" smtClean="0"/>
+          </a:p>
+          <a:p>
+            <a:pPr algn="l"/>
+            <a:r>
+              <a:rPr lang="en-US" dirty="0" smtClean="0"/>
+              <a:t>Packets </a:t>
+            </a:r>
+            <a:endParaRPr lang="en-US" dirty="0" smtClean="0"/>
+          </a:p>
+          <a:p>
+            <a:pPr algn="l"/>
+            <a:endParaRPr lang="en-US" dirty="0" smtClean="0"/>
+          </a:p>
+          <a:p>
+            <a:pPr algn="l"/>
+            <a:r>
+              <a:rPr lang="en-US" dirty="0" smtClean="0"/>
+              <a:t>GUI</a:t>
+            </a:r>
+            <a:endParaRPr lang="en-US" dirty="0" smtClean="0"/>
+          </a:p>
+          <a:p>
+            <a:pPr marL="0" indent="0" algn="l">
+              <a:buNone/>
+            </a:pPr>
+            <a:endParaRPr lang="en-US" sz="1400" strike="sngStrike" dirty="0" smtClean="0"/>
+          </a:p>
+          <a:p>
+            <a:pPr algn="l"/>
+            <a:r>
+              <a:rPr lang="en-US" dirty="0" smtClean="0"/>
+              <a:t>Support of two different data links</a:t>
+            </a:r>
+            <a:r>
+              <a:rPr lang="en-US" dirty="0" smtClean="0"/>
+              <a:t>:</a:t>
+            </a:r>
+          </a:p>
+          <a:p>
+            <a:pPr marL="0" indent="0" algn="l">
+              <a:buNone/>
+            </a:pPr>
+            <a:endParaRPr lang="en-US" sz="400" dirty="0" smtClean="0"/>
           </a:p>
           <a:p>
             <a:pPr lvl="1">
@@ -12034,8 +12687,8 @@
               <a:buChar char="Ø"/>
             </a:pPr>
             <a:r>
-              <a:rPr lang="en-US" dirty="0" smtClean="0"/>
-              <a:t>Design</a:t>
+              <a:rPr lang="en-US" sz="1800" dirty="0" smtClean="0"/>
+              <a:t>BSS</a:t>
             </a:r>
           </a:p>
           <a:p>
@@ -12044,51 +12697,8 @@
               <a:buChar char="Ø"/>
             </a:pPr>
             <a:r>
-              <a:rPr lang="en-US" dirty="0" smtClean="0"/>
-              <a:t>Protocols support</a:t>
-            </a:r>
-          </a:p>
-          <a:p>
-            <a:pPr lvl="1">
-              <a:buFont typeface="Wingdings" pitchFamily="2" charset="2"/>
-              <a:buChar char="Ø"/>
-            </a:pPr>
-            <a:r>
-              <a:rPr lang="en-US" dirty="0" smtClean="0"/>
-              <a:t>Used algorithms </a:t>
-            </a:r>
-            <a:r>
-              <a:rPr lang="en-US" strike="sngStrike" dirty="0" smtClean="0"/>
-              <a:t>(</a:t>
-            </a:r>
-            <a:r>
-              <a:rPr lang="en-US" strike="sngStrike" dirty="0" err="1" smtClean="0"/>
-              <a:t>RSSI,Noise,Rate</a:t>
-            </a:r>
-            <a:r>
-              <a:rPr lang="en-US" strike="sngStrike" dirty="0" smtClean="0"/>
-              <a:t>)</a:t>
-            </a:r>
-            <a:endParaRPr lang="en-US" dirty="0" smtClean="0"/>
-          </a:p>
-          <a:p>
-            <a:pPr lvl="1">
-              <a:buFont typeface="Wingdings" pitchFamily="2" charset="2"/>
-              <a:buChar char="Ø"/>
-            </a:pPr>
-            <a:r>
-              <a:rPr lang="en-US" dirty="0" smtClean="0"/>
-              <a:t>Usability</a:t>
-            </a:r>
-          </a:p>
-          <a:p>
-            <a:pPr lvl="1">
-              <a:buFont typeface="Wingdings" pitchFamily="2" charset="2"/>
-              <a:buChar char="Ø"/>
-            </a:pPr>
-            <a:r>
-              <a:rPr lang="en-US" dirty="0" smtClean="0"/>
-              <a:t>Saving simulation</a:t>
+              <a:rPr lang="en-US" sz="1800" dirty="0" smtClean="0"/>
+              <a:t>TDLS</a:t>
             </a:r>
           </a:p>
           <a:p>
@@ -12099,31 +12709,10 @@
           </a:p>
           <a:p>
             <a:pPr algn="l"/>
-            <a:r>
-              <a:rPr lang="en-US" dirty="0" smtClean="0"/>
-              <a:t>SLS Algorithm</a:t>
-            </a:r>
-          </a:p>
-          <a:p>
-            <a:pPr lvl="1"/>
-            <a:r>
-              <a:rPr lang="en-US" dirty="0" smtClean="0"/>
-              <a:t>Algorithms flow</a:t>
-            </a:r>
-          </a:p>
-          <a:p>
-            <a:pPr lvl="1"/>
-            <a:r>
-              <a:rPr lang="en-US" dirty="0" smtClean="0"/>
-              <a:t>Statistic</a:t>
-            </a:r>
-          </a:p>
-          <a:p>
-            <a:pPr lvl="1"/>
-            <a:r>
-              <a:rPr lang="en-US" dirty="0" smtClean="0"/>
-              <a:t>Conclusion</a:t>
-            </a:r>
+            <a:endParaRPr lang="en-US" dirty="0" smtClean="0"/>
+          </a:p>
+          <a:p>
+            <a:pPr algn="l"/>
             <a:endParaRPr lang="en-US" dirty="0"/>
           </a:p>
         </p:txBody>
@@ -12146,171 +12735,6 @@
             <a:pPr rtl="1"/>
             <a:r>
               <a:rPr lang="en-US" dirty="0" smtClean="0"/>
-              <a:t>Project Overview</a:t>
-            </a:r>
-            <a:endParaRPr lang="en-US" dirty="0"/>
-          </a:p>
-        </p:txBody>
-      </p:sp>
-    </p:spTree>
-    <p:extLst>
-      <p:ext uri="{BB962C8B-B14F-4D97-AF65-F5344CB8AC3E}">
-        <p14:creationId xmlns:p14="http://schemas.microsoft.com/office/powerpoint/2010/main" val="1441071697"/>
-      </p:ext>
-    </p:extLst>
-  </p:cSld>
-  <p:clrMapOvr>
-    <a:masterClrMapping/>
-  </p:clrMapOvr>
-  <p:timing>
-    <p:tnLst>
-      <p:par>
-        <p:cTn id="1" dur="indefinite" restart="never" nodeType="tmRoot"/>
-      </p:par>
-    </p:tnLst>
-  </p:timing>
-</p:sld>
-</file>
-
-<file path=ppt/slides/slide5.xml><?xml version="1.0" encoding="utf-8"?>
-<p:sld xmlns:a="http://schemas.openxmlformats.org/drawingml/2006/main" xmlns:r="http://schemas.openxmlformats.org/officeDocument/2006/relationships" xmlns:p="http://schemas.openxmlformats.org/presentationml/2006/main">
-  <p:cSld>
-    <p:spTree>
-      <p:nvGrpSpPr>
-        <p:cNvPr id="1" name=""/>
-        <p:cNvGrpSpPr/>
-        <p:nvPr/>
-      </p:nvGrpSpPr>
-      <p:grpSpPr>
-        <a:xfrm>
-          <a:off x="0" y="0"/>
-          <a:ext cx="0" cy="0"/>
-          <a:chOff x="0" y="0"/>
-          <a:chExt cx="0" cy="0"/>
-        </a:xfrm>
-      </p:grpSpPr>
-      <p:sp>
-        <p:nvSpPr>
-          <p:cNvPr id="2" name="Content Placeholder 1"/>
-          <p:cNvSpPr>
-            <a:spLocks noGrp="1"/>
-          </p:cNvSpPr>
-          <p:nvPr>
-            <p:ph idx="1"/>
-          </p:nvPr>
-        </p:nvSpPr>
-        <p:spPr/>
-        <p:txBody>
-          <a:bodyPr>
-            <a:normAutofit/>
-          </a:bodyPr>
-          <a:lstStyle/>
-          <a:p>
-            <a:pPr algn="l"/>
-            <a:r>
-              <a:rPr lang="en-US" dirty="0" smtClean="0"/>
-              <a:t>Medium infrastructure</a:t>
-            </a:r>
-            <a:r>
-              <a:rPr lang="en-US" dirty="0" smtClean="0"/>
-              <a:t>.</a:t>
-            </a:r>
-          </a:p>
-          <a:p>
-            <a:pPr marL="0" indent="0" algn="l">
-              <a:buNone/>
-            </a:pPr>
-            <a:endParaRPr lang="en-US" sz="1400" dirty="0" smtClean="0"/>
-          </a:p>
-          <a:p>
-            <a:pPr algn="l"/>
-            <a:r>
-              <a:rPr lang="en-US" dirty="0" smtClean="0"/>
-              <a:t>RF devices </a:t>
-            </a:r>
-            <a:endParaRPr lang="en-US" dirty="0" smtClean="0"/>
-          </a:p>
-          <a:p>
-            <a:pPr marL="0" indent="0" algn="l">
-              <a:buNone/>
-            </a:pPr>
-            <a:endParaRPr lang="en-US" sz="1400" strike="sngStrike" dirty="0" smtClean="0"/>
-          </a:p>
-          <a:p>
-            <a:pPr algn="l"/>
-            <a:r>
-              <a:rPr lang="en-US" dirty="0" smtClean="0"/>
-              <a:t>Packets </a:t>
-            </a:r>
-            <a:endParaRPr lang="en-US" dirty="0" smtClean="0"/>
-          </a:p>
-          <a:p>
-            <a:pPr marL="0" indent="0" algn="l">
-              <a:buNone/>
-            </a:pPr>
-            <a:endParaRPr lang="en-US" sz="1400" strike="sngStrike" dirty="0" smtClean="0"/>
-          </a:p>
-          <a:p>
-            <a:pPr algn="l"/>
-            <a:r>
-              <a:rPr lang="en-US" dirty="0" smtClean="0"/>
-              <a:t>Support of two different data links:</a:t>
-            </a:r>
-          </a:p>
-          <a:p>
-            <a:pPr lvl="1">
-              <a:buFont typeface="Wingdings" pitchFamily="2" charset="2"/>
-              <a:buChar char="Ø"/>
-            </a:pPr>
-            <a:r>
-              <a:rPr lang="en-US" sz="1800" dirty="0" smtClean="0"/>
-              <a:t>BSS</a:t>
-            </a:r>
-          </a:p>
-          <a:p>
-            <a:pPr lvl="1">
-              <a:buFont typeface="Wingdings" pitchFamily="2" charset="2"/>
-              <a:buChar char="Ø"/>
-            </a:pPr>
-            <a:r>
-              <a:rPr lang="en-US" sz="1800" dirty="0" smtClean="0"/>
-              <a:t>TDLS</a:t>
-            </a:r>
-          </a:p>
-          <a:p>
-            <a:pPr marL="0" indent="0" algn="l">
-              <a:buNone/>
-            </a:pPr>
-            <a:endParaRPr lang="en-US" dirty="0" smtClean="0"/>
-          </a:p>
-          <a:p>
-            <a:pPr algn="l"/>
-            <a:endParaRPr lang="en-US" dirty="0" smtClean="0"/>
-          </a:p>
-          <a:p>
-            <a:pPr algn="l"/>
-            <a:endParaRPr lang="en-US" dirty="0"/>
-          </a:p>
-        </p:txBody>
-      </p:sp>
-      <p:sp>
-        <p:nvSpPr>
-          <p:cNvPr id="3" name="Title 2"/>
-          <p:cNvSpPr>
-            <a:spLocks noGrp="1"/>
-          </p:cNvSpPr>
-          <p:nvPr>
-            <p:ph type="title"/>
-          </p:nvPr>
-        </p:nvSpPr>
-        <p:spPr/>
-        <p:txBody>
-          <a:bodyPr/>
-          <a:lstStyle/>
-          <a:p>
-            <a:pPr rtl="1"/>
-            <a:r>
-              <a:rPr lang="en-US" dirty="0" smtClean="0"/>
               <a:t>Simulator - Design</a:t>
             </a:r>
             <a:endParaRPr lang="en-US" dirty="0"/>
@@ -12330,7 +12754,7 @@
 </p:sld>
 </file>
 
-<file path=ppt/slides/slide6.xml><?xml version="1.0" encoding="utf-8"?>
+<file path=ppt/slides/slide5.xml><?xml version="1.0" encoding="utf-8"?>
 <p:sld xmlns:a="http://schemas.openxmlformats.org/drawingml/2006/main" xmlns:r="http://schemas.openxmlformats.org/officeDocument/2006/relationships" xmlns:p="http://schemas.openxmlformats.org/presentationml/2006/main">
   <p:cSld>
     <p:spTree>
@@ -12370,7 +12794,7 @@
           <a:graphicData uri="http://schemas.openxmlformats.org/presentationml/2006/ole">
             <mc:AlternateContent xmlns:mc="http://schemas.openxmlformats.org/markup-compatibility/2006">
               <mc:Choice xmlns:v="urn:schemas-microsoft-com:vml" Requires="v">
-                <p:oleObj spid="_x0000_s1123" name="Visio" r:id="rId3" imgW="9147060" imgH="7289860" progId="Visio.Drawing.11">
+                <p:oleObj spid="_x0000_s1130" name="Visio" r:id="rId3" imgW="9147060" imgH="7289860" progId="Visio.Drawing.11">
                   <p:embed/>
                 </p:oleObj>
               </mc:Choice>
@@ -12607,7 +13031,7 @@
 </p:sld>
 </file>
 
-<file path=ppt/slides/slide7.xml><?xml version="1.0" encoding="utf-8"?>
+<file path=ppt/slides/slide6.xml><?xml version="1.0" encoding="utf-8"?>
 <p:sld xmlns:a="http://schemas.openxmlformats.org/drawingml/2006/main" xmlns:r="http://schemas.openxmlformats.org/officeDocument/2006/relationships" xmlns:p="http://schemas.openxmlformats.org/presentationml/2006/main">
   <p:cSld>
     <p:spTree>
@@ -12706,6 +13130,164 @@
       </p:par>
     </p:tnLst>
   </p:timing>
+</p:sld>
+</file>
+
+<file path=ppt/slides/slide7.xml><?xml version="1.0" encoding="utf-8"?>
+<p:sld xmlns:a="http://schemas.openxmlformats.org/drawingml/2006/main" xmlns:r="http://schemas.openxmlformats.org/officeDocument/2006/relationships" xmlns:p="http://schemas.openxmlformats.org/presentationml/2006/main">
+  <p:cSld>
+    <p:spTree>
+      <p:nvGrpSpPr>
+        <p:cNvPr id="1" name=""/>
+        <p:cNvGrpSpPr/>
+        <p:nvPr/>
+      </p:nvGrpSpPr>
+      <p:grpSpPr>
+        <a:xfrm>
+          <a:off x="0" y="0"/>
+          <a:ext cx="0" cy="0"/>
+          <a:chOff x="0" y="0"/>
+          <a:chExt cx="0" cy="0"/>
+        </a:xfrm>
+      </p:grpSpPr>
+      <p:sp>
+        <p:nvSpPr>
+          <p:cNvPr id="2" name="Объект 1"/>
+          <p:cNvSpPr>
+            <a:spLocks noGrp="1"/>
+          </p:cNvSpPr>
+          <p:nvPr>
+            <p:ph idx="1"/>
+          </p:nvPr>
+        </p:nvSpPr>
+        <p:spPr/>
+        <p:txBody>
+          <a:bodyPr/>
+          <a:lstStyle/>
+          <a:p>
+            <a:r>
+              <a:rPr lang="en-US" dirty="0" smtClean="0"/>
+              <a:t>AP</a:t>
+            </a:r>
+          </a:p>
+          <a:p>
+            <a:pPr marL="731520" lvl="2">
+              <a:buFont typeface="Wingdings" pitchFamily="2" charset="2"/>
+              <a:buChar char="Ø"/>
+            </a:pPr>
+            <a:r>
+              <a:rPr lang="en-US" dirty="0" smtClean="0"/>
+              <a:t>Able to transfer any </a:t>
+            </a:r>
+            <a:r>
+              <a:rPr lang="en-US" dirty="0"/>
+              <a:t>kind of packets </a:t>
+            </a:r>
+            <a:r>
+              <a:rPr lang="en-US" dirty="0" smtClean="0"/>
+              <a:t>without any code change</a:t>
+            </a:r>
+          </a:p>
+          <a:p>
+            <a:pPr marL="731520" lvl="2">
+              <a:buFont typeface="Wingdings" pitchFamily="2" charset="2"/>
+              <a:buChar char="Ø"/>
+            </a:pPr>
+            <a:r>
+              <a:rPr lang="en-US" dirty="0" smtClean="0"/>
+              <a:t>Buffers packet for each STA</a:t>
+            </a:r>
+          </a:p>
+          <a:p>
+            <a:pPr marL="365760" lvl="1">
+              <a:buFont typeface="Wingdings" pitchFamily="2" charset="2"/>
+              <a:buChar char=""/>
+            </a:pPr>
+            <a:endParaRPr lang="en-US" dirty="0"/>
+          </a:p>
+          <a:p>
+            <a:pPr marL="365760" lvl="1">
+              <a:buFont typeface="Wingdings" pitchFamily="2" charset="2"/>
+              <a:buChar char=""/>
+            </a:pPr>
+            <a:r>
+              <a:rPr lang="en-US" dirty="0" smtClean="0"/>
+              <a:t>STA</a:t>
+            </a:r>
+          </a:p>
+          <a:p>
+            <a:pPr marL="708660" lvl="2" indent="-342900">
+              <a:buFont typeface="Wingdings" pitchFamily="2" charset="2"/>
+              <a:buChar char="Ø"/>
+            </a:pPr>
+            <a:r>
+              <a:rPr lang="en-US" dirty="0" smtClean="0"/>
+              <a:t>Preferred (best) Channel finding for TDLS </a:t>
+            </a:r>
+          </a:p>
+          <a:p>
+            <a:pPr marL="708660" lvl="2" indent="-342900">
+              <a:buFont typeface="Wingdings" pitchFamily="2" charset="2"/>
+              <a:buChar char="Ø"/>
+            </a:pPr>
+            <a:r>
+              <a:rPr lang="en-US" dirty="0"/>
+              <a:t>Stream handler / File to </a:t>
+            </a:r>
+            <a:r>
+              <a:rPr lang="en-US" dirty="0" smtClean="0"/>
+              <a:t>Packets </a:t>
+            </a:r>
+            <a:r>
+              <a:rPr lang="en-US" dirty="0"/>
+              <a:t>division and restoration    </a:t>
+            </a:r>
+          </a:p>
+          <a:p>
+            <a:pPr marL="365760" lvl="1">
+              <a:buFont typeface="Wingdings" pitchFamily="2" charset="2"/>
+              <a:buChar char=""/>
+            </a:pPr>
+            <a:endParaRPr lang="en-US" dirty="0"/>
+          </a:p>
+          <a:p>
+            <a:endParaRPr lang="ru-RU" dirty="0"/>
+          </a:p>
+        </p:txBody>
+      </p:sp>
+      <p:sp>
+        <p:nvSpPr>
+          <p:cNvPr id="3" name="Заголовок 2"/>
+          <p:cNvSpPr>
+            <a:spLocks noGrp="1"/>
+          </p:cNvSpPr>
+          <p:nvPr>
+            <p:ph type="title"/>
+          </p:nvPr>
+        </p:nvSpPr>
+        <p:spPr/>
+        <p:txBody>
+          <a:bodyPr/>
+          <a:lstStyle/>
+          <a:p>
+            <a:r>
+              <a:rPr lang="en-US" dirty="0" smtClean="0"/>
+              <a:t>RF Devices</a:t>
+            </a:r>
+            <a:endParaRPr lang="ru-RU" dirty="0"/>
+          </a:p>
+        </p:txBody>
+      </p:sp>
+    </p:spTree>
+    <p:extLst>
+      <p:ext uri="{BB962C8B-B14F-4D97-AF65-F5344CB8AC3E}">
+        <p14:creationId xmlns:p14="http://schemas.microsoft.com/office/powerpoint/2010/main" val="72287815"/>
+      </p:ext>
+    </p:extLst>
+  </p:cSld>
+  <p:clrMapOvr>
+    <a:masterClrMapping/>
+  </p:clrMapOvr>
 </p:sld>
 </file>
 
@@ -12841,113 +13423,148 @@
         <p:spPr/>
         <p:txBody>
           <a:bodyPr>
-            <a:normAutofit fontScale="92500" lnSpcReduction="20000"/>
+            <a:normAutofit/>
           </a:bodyPr>
           <a:lstStyle/>
           <a:p>
             <a:pPr algn="l"/>
             <a:r>
+              <a:rPr lang="en-US" sz="1050" strike="sngStrike" dirty="0" smtClean="0"/>
+              <a:t>Easy </a:t>
+            </a:r>
+            <a:r>
+              <a:rPr lang="en-US" sz="1050" strike="sngStrike" dirty="0" smtClean="0"/>
+              <a:t>access to get all simulated information </a:t>
+            </a:r>
+          </a:p>
+          <a:p>
+            <a:pPr algn="l"/>
+            <a:r>
+              <a:rPr lang="en-US" sz="1050" strike="sngStrike" dirty="0" smtClean="0"/>
+              <a:t>Ability to move objects on </a:t>
+            </a:r>
+            <a:r>
+              <a:rPr lang="en-US" sz="1050" strike="sngStrike" dirty="0" smtClean="0"/>
+              <a:t>board - Drag </a:t>
+            </a:r>
+            <a:r>
+              <a:rPr lang="en-US" sz="1050" strike="sngStrike" dirty="0" smtClean="0"/>
+              <a:t>&amp; Drop</a:t>
+            </a:r>
+          </a:p>
+          <a:p>
+            <a:pPr algn="l"/>
+            <a:r>
+              <a:rPr lang="en-US" sz="1050" strike="sngStrike" dirty="0" smtClean="0"/>
+              <a:t>Creation of RF device </a:t>
+            </a:r>
+          </a:p>
+          <a:p>
+            <a:pPr algn="l"/>
+            <a:r>
+              <a:rPr lang="en-US" sz="1050" strike="sngStrike" dirty="0" smtClean="0"/>
+              <a:t>Random simulation</a:t>
+            </a:r>
+          </a:p>
+          <a:p>
+            <a:pPr algn="l"/>
+            <a:r>
+              <a:rPr lang="en-US" sz="1050" strike="sngStrike" dirty="0" smtClean="0"/>
+              <a:t>Static simulation</a:t>
+            </a:r>
+          </a:p>
+          <a:p>
+            <a:pPr algn="l"/>
+            <a:r>
+              <a:rPr lang="en-US" sz="1050" strike="sngStrike" dirty="0" smtClean="0"/>
+              <a:t>Station info form :</a:t>
+            </a:r>
+          </a:p>
+          <a:p>
+            <a:pPr lvl="1">
+              <a:buFont typeface="Wingdings" pitchFamily="2" charset="2"/>
+              <a:buChar char="Ø"/>
+            </a:pPr>
+            <a:r>
+              <a:rPr lang="en-US" sz="1050" strike="sngStrike" dirty="0" smtClean="0"/>
+              <a:t>Statistic </a:t>
+            </a:r>
+          </a:p>
+          <a:p>
+            <a:pPr lvl="1">
+              <a:buFont typeface="Wingdings" pitchFamily="2" charset="2"/>
+              <a:buChar char="Ø"/>
+            </a:pPr>
+            <a:r>
+              <a:rPr lang="en-US" sz="1050" strike="sngStrike" dirty="0" smtClean="0"/>
+              <a:t>Logs</a:t>
+            </a:r>
+          </a:p>
+          <a:p>
+            <a:pPr lvl="1">
+              <a:buFont typeface="Wingdings" pitchFamily="2" charset="2"/>
+              <a:buChar char="Ø"/>
+            </a:pPr>
+            <a:r>
+              <a:rPr lang="en-US" sz="1050" strike="sngStrike" dirty="0" smtClean="0"/>
+              <a:t>Station configuration and overview</a:t>
+            </a:r>
+          </a:p>
+          <a:p>
+            <a:pPr lvl="1">
+              <a:buFont typeface="Wingdings" pitchFamily="2" charset="2"/>
+              <a:buChar char="Ø"/>
+            </a:pPr>
+            <a:r>
+              <a:rPr lang="en-US" sz="1050" strike="sngStrike" dirty="0" smtClean="0"/>
+              <a:t>Configurable </a:t>
+            </a:r>
+            <a:r>
+              <a:rPr lang="en-US" sz="1050" strike="sngStrike" dirty="0"/>
+              <a:t>d</a:t>
+            </a:r>
+            <a:r>
+              <a:rPr lang="en-US" sz="1050" strike="sngStrike" dirty="0" smtClean="0"/>
+              <a:t>ump of STA object</a:t>
+            </a:r>
+          </a:p>
+          <a:p>
+            <a:pPr algn="l"/>
+            <a:r>
+              <a:rPr lang="en-US" sz="1050" strike="sngStrike" dirty="0" smtClean="0"/>
+              <a:t>AP info form – provide basic configuration</a:t>
+            </a:r>
+          </a:p>
+          <a:p>
+            <a:pPr algn="l"/>
+            <a:r>
+              <a:rPr lang="en-US" sz="1050" strike="sngStrike" dirty="0" smtClean="0"/>
+              <a:t>Saving and Load current simulation into </a:t>
+            </a:r>
+            <a:r>
+              <a:rPr lang="en-US" sz="1050" strike="sngStrike" dirty="0" smtClean="0"/>
+              <a:t>file</a:t>
+            </a:r>
+            <a:endParaRPr lang="en-US" sz="1050" strike="sngStrike" dirty="0" smtClean="0"/>
+          </a:p>
+          <a:p>
+            <a:pPr algn="l"/>
+            <a:endParaRPr lang="en-US" dirty="0"/>
+          </a:p>
+          <a:p>
+            <a:pPr algn="l"/>
+            <a:r>
               <a:rPr lang="en-US" dirty="0" smtClean="0"/>
-              <a:t>IEEE80211</a:t>
-            </a:r>
+              <a:t>Here we will show the bullets mentioned above on the real Program. </a:t>
+            </a:r>
+            <a:endParaRPr lang="en-US" dirty="0" smtClean="0"/>
           </a:p>
           <a:p>
             <a:pPr algn="l"/>
-            <a:r>
-              <a:rPr lang="en-US" dirty="0" smtClean="0"/>
-              <a:t>Passive scan</a:t>
-            </a:r>
+            <a:endParaRPr lang="en-US" dirty="0" smtClean="0"/>
           </a:p>
           <a:p>
             <a:pPr algn="l"/>
-            <a:r>
-              <a:rPr lang="en-US" dirty="0" smtClean="0"/>
-              <a:t>Beacon sending</a:t>
-            </a:r>
-          </a:p>
-          <a:p>
-            <a:pPr algn="l"/>
-            <a:r>
-              <a:rPr lang="en-US" dirty="0" smtClean="0"/>
-              <a:t>Acknowledgment</a:t>
-            </a:r>
-          </a:p>
-          <a:p>
-            <a:pPr algn="l"/>
-            <a:r>
-              <a:rPr lang="en-US" dirty="0" smtClean="0"/>
-              <a:t>Connect/Disconnect flow</a:t>
-            </a:r>
-          </a:p>
-          <a:p>
-            <a:pPr algn="l"/>
-            <a:r>
-              <a:rPr lang="en-US" dirty="0" smtClean="0"/>
-              <a:t>Keep Alive mechanism</a:t>
-            </a:r>
-          </a:p>
-          <a:p>
-            <a:r>
-              <a:rPr lang="en-US" dirty="0"/>
-              <a:t>Received Signal Strength </a:t>
-            </a:r>
-            <a:r>
-              <a:rPr lang="en-US" dirty="0" smtClean="0"/>
-              <a:t>Indication (RSSI)</a:t>
-            </a:r>
-          </a:p>
-          <a:p>
-            <a:r>
-              <a:rPr lang="en-US" dirty="0" smtClean="0"/>
-              <a:t>Transmit Rate Calculation (</a:t>
-            </a:r>
-            <a:r>
-              <a:rPr lang="en-US" dirty="0" smtClean="0"/>
-              <a:t>SNR)</a:t>
-            </a:r>
-          </a:p>
-          <a:p>
-            <a:r>
-              <a:rPr lang="en-US" dirty="0" smtClean="0"/>
-              <a:t>Support of standards </a:t>
-            </a:r>
-            <a:r>
-              <a:rPr lang="en-US" strike="sngStrike" dirty="0" smtClean="0"/>
-              <a:t>Band</a:t>
-            </a:r>
-            <a:r>
-              <a:rPr lang="en-US" dirty="0" smtClean="0"/>
-              <a:t> A, </a:t>
-            </a:r>
-            <a:r>
-              <a:rPr lang="en-US" strike="sngStrike" dirty="0" smtClean="0"/>
-              <a:t>Band</a:t>
-            </a:r>
-            <a:r>
-              <a:rPr lang="en-US" dirty="0" smtClean="0"/>
-              <a:t> N</a:t>
-            </a:r>
-          </a:p>
-          <a:p>
-            <a:r>
-              <a:rPr lang="en-US" dirty="0" smtClean="0"/>
-              <a:t>Connection </a:t>
-            </a:r>
-            <a:r>
-              <a:rPr lang="en-US" dirty="0" smtClean="0"/>
-              <a:t>establishment negotiation</a:t>
-            </a:r>
-          </a:p>
-          <a:p>
-            <a:r>
-              <a:rPr lang="en-US" dirty="0" smtClean="0"/>
-              <a:t> Packets Encapsulation /Headers /hierarchy  </a:t>
-            </a:r>
-          </a:p>
-          <a:p>
-            <a:endParaRPr lang="en-US" dirty="0" smtClean="0"/>
-          </a:p>
-          <a:p>
             <a:endParaRPr lang="en-US" dirty="0"/>
           </a:p>
         </p:txBody>
@@ -12970,7 +13587,7 @@
             <a:pPr rtl="1"/>
             <a:r>
               <a:rPr lang="en-US" dirty="0" smtClean="0"/>
-              <a:t>Protocols Support</a:t>
+              <a:t>GUI</a:t>
             </a:r>
             <a:endParaRPr lang="en-US" dirty="0"/>
           </a:p>

</xml_diff>

<commit_message>
Before sending to Martin
Change-Id: I45c49fe6db4f6bb9711b63cd6edac32626de857c
Signed-off-by: Andrey Shamis <lolnik@gmail.com>
</commit_message>
<xml_diff>
--- a/JudgesForumPresentation.pptx
+++ b/JudgesForumPresentation.pptx
@@ -5,10 +5,10 @@
     <p:sldMasterId id="2147483672" r:id="rId1"/>
   </p:sldMasterIdLst>
   <p:notesMasterIdLst>
-    <p:notesMasterId r:id="rId34"/>
+    <p:notesMasterId r:id="rId31"/>
   </p:notesMasterIdLst>
   <p:handoutMasterIdLst>
-    <p:handoutMasterId r:id="rId35"/>
+    <p:handoutMasterId r:id="rId32"/>
   </p:handoutMasterIdLst>
   <p:sldIdLst>
     <p:sldId id="256" r:id="rId2"/>
@@ -34,15 +34,12 @@
     <p:sldId id="330" r:id="rId22"/>
     <p:sldId id="311" r:id="rId23"/>
     <p:sldId id="328" r:id="rId24"/>
-    <p:sldId id="339" r:id="rId25"/>
-    <p:sldId id="309" r:id="rId26"/>
-    <p:sldId id="320" r:id="rId27"/>
-    <p:sldId id="321" r:id="rId28"/>
-    <p:sldId id="307" r:id="rId29"/>
-    <p:sldId id="332" r:id="rId30"/>
-    <p:sldId id="317" r:id="rId31"/>
-    <p:sldId id="308" r:id="rId32"/>
-    <p:sldId id="333" r:id="rId33"/>
+    <p:sldId id="307" r:id="rId25"/>
+    <p:sldId id="332" r:id="rId26"/>
+    <p:sldId id="317" r:id="rId27"/>
+    <p:sldId id="339" r:id="rId28"/>
+    <p:sldId id="308" r:id="rId29"/>
+    <p:sldId id="333" r:id="rId30"/>
   </p:sldIdLst>
   <p:sldSz cx="9144000" cy="6858000" type="screen4x3"/>
   <p:notesSz cx="6669088" cy="9928225"/>
@@ -7916,6 +7913,13 @@
   <p:clrMapOvr>
     <a:masterClrMapping/>
   </p:clrMapOvr>
+  <p:timing>
+    <p:tnLst>
+      <p:par>
+        <p:cTn id="1" dur="indefinite" restart="never" nodeType="tmRoot"/>
+      </p:par>
+    </p:tnLst>
+  </p:timing>
 </p:sld>
 </file>
 
@@ -8211,6 +8215,19 @@
               <a:rPr lang="en-US" dirty="0" smtClean="0"/>
               <a:t>to Noise Ratio (SNR) – Packet Loss </a:t>
             </a:r>
+            <a:endParaRPr lang="en-US" dirty="0" smtClean="0"/>
+          </a:p>
+          <a:p>
+            <a:pPr algn="l"/>
+            <a:endParaRPr lang="en-US" dirty="0"/>
+          </a:p>
+          <a:p>
+            <a:pPr algn="l"/>
+            <a:r>
+              <a:rPr lang="en-US" smtClean="0"/>
+              <a:t>Graph will be here</a:t>
+            </a:r>
+            <a:endParaRPr lang="en-US" dirty="0" smtClean="0"/>
           </a:p>
           <a:p>
             <a:pPr algn="l"/>
@@ -8260,6 +8277,13 @@
   <p:clrMapOvr>
     <a:masterClrMapping/>
   </p:clrMapOvr>
+  <p:timing>
+    <p:tnLst>
+      <p:par>
+        <p:cTn id="1" dur="indefinite" restart="never" nodeType="tmRoot"/>
+      </p:par>
+    </p:tnLst>
+  </p:timing>
 </p:sld>
 </file>
 
@@ -8934,7 +8958,7 @@
           <a:graphicData uri="http://schemas.openxmlformats.org/presentationml/2006/ole">
             <mc:AlternateContent xmlns:mc="http://schemas.openxmlformats.org/markup-compatibility/2006">
               <mc:Choice xmlns:v="urn:schemas-microsoft-com:vml" Requires="v">
-                <p:oleObj spid="_x0000_s3176" name="Visio" r:id="rId3" imgW="9147060" imgH="7289860" progId="Visio.Drawing.11">
+                <p:oleObj spid="_x0000_s3177" name="Visio" r:id="rId3" imgW="9147060" imgH="7289860" progId="Visio.Drawing.11">
                   <p:embed/>
                 </p:oleObj>
               </mc:Choice>
@@ -9191,7 +9215,7 @@
           <a:graphicData uri="http://schemas.openxmlformats.org/presentationml/2006/ole">
             <mc:AlternateContent xmlns:mc="http://schemas.openxmlformats.org/markup-compatibility/2006">
               <mc:Choice xmlns:v="urn:schemas-microsoft-com:vml" Requires="v">
-                <p:oleObj spid="_x0000_s5156" name="Visio" r:id="rId3" imgW="10758690" imgH="7626560" progId="Visio.Drawing.11">
+                <p:oleObj spid="_x0000_s5157" name="Visio" r:id="rId3" imgW="10758690" imgH="7626560" progId="Visio.Drawing.11">
                   <p:embed/>
                 </p:oleObj>
               </mc:Choice>
@@ -9635,7 +9659,7 @@
           <a:graphicData uri="http://schemas.openxmlformats.org/presentationml/2006/ole">
             <mc:AlternateContent xmlns:mc="http://schemas.openxmlformats.org/markup-compatibility/2006">
               <mc:Choice xmlns:v="urn:schemas-microsoft-com:vml" Requires="v">
-                <p:oleObj spid="_x0000_s7198" name="Visio" r:id="rId3" imgW="10758690" imgH="7626560" progId="Visio.Drawing.11">
+                <p:oleObj spid="_x0000_s7199" name="Visio" r:id="rId3" imgW="10758690" imgH="7626560" progId="Visio.Drawing.11">
                   <p:embed/>
                 </p:oleObj>
               </mc:Choice>
@@ -9761,7 +9785,7 @@
           <a:graphicData uri="http://schemas.openxmlformats.org/presentationml/2006/ole">
             <mc:AlternateContent xmlns:mc="http://schemas.openxmlformats.org/markup-compatibility/2006">
               <mc:Choice xmlns:v="urn:schemas-microsoft-com:vml" Requires="v">
-                <p:oleObj spid="_x0000_s8222" name="Visio" r:id="rId3" imgW="10758690" imgH="7626560" progId="Visio.Drawing.11">
+                <p:oleObj spid="_x0000_s8223" name="Visio" r:id="rId3" imgW="10758690" imgH="7626560" progId="Visio.Drawing.11">
                   <p:embed/>
                 </p:oleObj>
               </mc:Choice>
@@ -9908,7 +9932,7 @@
           <a:graphicData uri="http://schemas.openxmlformats.org/presentationml/2006/ole">
             <mc:AlternateContent xmlns:mc="http://schemas.openxmlformats.org/markup-compatibility/2006">
               <mc:Choice xmlns:v="urn:schemas-microsoft-com:vml" Requires="v">
-                <p:oleObj spid="_x0000_s2154" name="Visio" r:id="rId3" imgW="9147060" imgH="7289860" progId="Visio.Drawing.11">
+                <p:oleObj spid="_x0000_s2155" name="Visio" r:id="rId3" imgW="9147060" imgH="7289860" progId="Visio.Drawing.11">
                   <p:embed/>
                 </p:oleObj>
               </mc:Choice>
@@ -10142,414 +10166,6 @@
       </p:grpSpPr>
       <p:sp>
         <p:nvSpPr>
-          <p:cNvPr id="3" name="Title 2"/>
-          <p:cNvSpPr>
-            <a:spLocks noGrp="1"/>
-          </p:cNvSpPr>
-          <p:nvPr>
-            <p:ph type="title"/>
-          </p:nvPr>
-        </p:nvSpPr>
-        <p:spPr/>
-        <p:txBody>
-          <a:bodyPr/>
-          <a:lstStyle/>
-          <a:p>
-            <a:pPr rtl="1"/>
-            <a:r>
-              <a:rPr lang="en-US" dirty="0" smtClean="0"/>
-              <a:t>Start Simulation</a:t>
-            </a:r>
-            <a:endParaRPr lang="en-US" dirty="0"/>
-          </a:p>
-        </p:txBody>
-      </p:sp>
-      <p:pic>
-        <p:nvPicPr>
-          <p:cNvPr id="6146" name="Picture 2" descr="D:\Dropbox\Z_PROJECTS\sls\Results\Parameters.JPG"/>
-          <p:cNvPicPr>
-            <a:picLocks noChangeAspect="1" noChangeArrowheads="1"/>
-          </p:cNvPicPr>
-          <p:nvPr/>
-        </p:nvPicPr>
-        <p:blipFill>
-          <a:blip r:embed="rId2">
-            <a:extLst>
-              <a:ext uri="{28A0092B-C50C-407E-A947-70E740481C1C}">
-                <a14:useLocalDpi xmlns:a14="http://schemas.microsoft.com/office/drawing/2010/main" val="0"/>
-              </a:ext>
-            </a:extLst>
-          </a:blip>
-          <a:srcRect/>
-          <a:stretch>
-            <a:fillRect/>
-          </a:stretch>
-        </p:blipFill>
-        <p:spPr bwMode="auto">
-          <a:xfrm>
-            <a:off x="1447800" y="2133600"/>
-            <a:ext cx="6182212" cy="4343400"/>
-          </a:xfrm>
-          <a:prstGeom prst="rect">
-            <a:avLst/>
-          </a:prstGeom>
-          <a:noFill/>
-          <a:extLst>
-            <a:ext uri="{909E8E84-426E-40DD-AFC4-6F175D3DCCD1}">
-              <a14:hiddenFill xmlns:a14="http://schemas.microsoft.com/office/drawing/2010/main">
-                <a:solidFill>
-                  <a:srgbClr val="FFFFFF"/>
-                </a:solidFill>
-              </a14:hiddenFill>
-            </a:ext>
-          </a:extLst>
-        </p:spPr>
-      </p:pic>
-    </p:spTree>
-    <p:extLst>
-      <p:ext uri="{BB962C8B-B14F-4D97-AF65-F5344CB8AC3E}">
-        <p14:creationId xmlns:p14="http://schemas.microsoft.com/office/powerpoint/2010/main" val="2302769290"/>
-      </p:ext>
-    </p:extLst>
-  </p:cSld>
-  <p:clrMapOvr>
-    <a:masterClrMapping/>
-  </p:clrMapOvr>
-  <p:timing>
-    <p:tnLst>
-      <p:par>
-        <p:cTn id="1" dur="indefinite" restart="never" nodeType="tmRoot"/>
-      </p:par>
-    </p:tnLst>
-  </p:timing>
-</p:sld>
-</file>
-
-<file path=ppt/slides/slide25.xml><?xml version="1.0" encoding="utf-8"?>
-<p:sld xmlns:a="http://schemas.openxmlformats.org/drawingml/2006/main" xmlns:r="http://schemas.openxmlformats.org/officeDocument/2006/relationships" xmlns:p="http://schemas.openxmlformats.org/presentationml/2006/main">
-  <p:cSld>
-    <p:spTree>
-      <p:nvGrpSpPr>
-        <p:cNvPr id="1" name=""/>
-        <p:cNvGrpSpPr/>
-        <p:nvPr/>
-      </p:nvGrpSpPr>
-      <p:grpSpPr>
-        <a:xfrm>
-          <a:off x="0" y="0"/>
-          <a:ext cx="0" cy="0"/>
-          <a:chOff x="0" y="0"/>
-          <a:chExt cx="0" cy="0"/>
-        </a:xfrm>
-      </p:grpSpPr>
-      <p:sp>
-        <p:nvSpPr>
-          <p:cNvPr id="3" name="Title 2"/>
-          <p:cNvSpPr>
-            <a:spLocks noGrp="1"/>
-          </p:cNvSpPr>
-          <p:nvPr>
-            <p:ph type="title"/>
-          </p:nvPr>
-        </p:nvSpPr>
-        <p:spPr/>
-        <p:txBody>
-          <a:bodyPr/>
-          <a:lstStyle/>
-          <a:p>
-            <a:pPr rtl="1"/>
-            <a:r>
-              <a:rPr lang="en-US" dirty="0" smtClean="0"/>
-              <a:t>Simulator demo</a:t>
-            </a:r>
-            <a:endParaRPr lang="en-US" dirty="0"/>
-          </a:p>
-        </p:txBody>
-      </p:sp>
-      <p:pic>
-        <p:nvPicPr>
-          <p:cNvPr id="8194" name="Picture 2" descr="D:\Dropbox\Z_PROJECTS\sls\Results\Dev0.JPG"/>
-          <p:cNvPicPr>
-            <a:picLocks noChangeAspect="1" noChangeArrowheads="1"/>
-          </p:cNvPicPr>
-          <p:nvPr/>
-        </p:nvPicPr>
-        <p:blipFill>
-          <a:blip r:embed="rId2">
-            <a:extLst>
-              <a:ext uri="{28A0092B-C50C-407E-A947-70E740481C1C}">
-                <a14:useLocalDpi xmlns:a14="http://schemas.microsoft.com/office/drawing/2010/main" val="0"/>
-              </a:ext>
-            </a:extLst>
-          </a:blip>
-          <a:srcRect/>
-          <a:stretch>
-            <a:fillRect/>
-          </a:stretch>
-        </p:blipFill>
-        <p:spPr bwMode="auto">
-          <a:xfrm>
-            <a:off x="766761" y="2286000"/>
-            <a:ext cx="7610475" cy="3933825"/>
-          </a:xfrm>
-          <a:prstGeom prst="rect">
-            <a:avLst/>
-          </a:prstGeom>
-          <a:noFill/>
-          <a:extLst>
-            <a:ext uri="{909E8E84-426E-40DD-AFC4-6F175D3DCCD1}">
-              <a14:hiddenFill xmlns:a14="http://schemas.microsoft.com/office/drawing/2010/main">
-                <a:solidFill>
-                  <a:srgbClr val="FFFFFF"/>
-                </a:solidFill>
-              </a14:hiddenFill>
-            </a:ext>
-          </a:extLst>
-        </p:spPr>
-      </p:pic>
-    </p:spTree>
-    <p:extLst>
-      <p:ext uri="{BB962C8B-B14F-4D97-AF65-F5344CB8AC3E}">
-        <p14:creationId xmlns:p14="http://schemas.microsoft.com/office/powerpoint/2010/main" val="1441071697"/>
-      </p:ext>
-    </p:extLst>
-  </p:cSld>
-  <p:clrMapOvr>
-    <a:masterClrMapping/>
-  </p:clrMapOvr>
-  <p:timing>
-    <p:tnLst>
-      <p:par>
-        <p:cTn id="1" dur="indefinite" restart="never" nodeType="tmRoot"/>
-      </p:par>
-    </p:tnLst>
-  </p:timing>
-</p:sld>
-</file>
-
-<file path=ppt/slides/slide26.xml><?xml version="1.0" encoding="utf-8"?>
-<p:sld xmlns:a="http://schemas.openxmlformats.org/drawingml/2006/main" xmlns:r="http://schemas.openxmlformats.org/officeDocument/2006/relationships" xmlns:p="http://schemas.openxmlformats.org/presentationml/2006/main">
-  <p:cSld>
-    <p:spTree>
-      <p:nvGrpSpPr>
-        <p:cNvPr id="1" name=""/>
-        <p:cNvGrpSpPr/>
-        <p:nvPr/>
-      </p:nvGrpSpPr>
-      <p:grpSpPr>
-        <a:xfrm>
-          <a:off x="0" y="0"/>
-          <a:ext cx="0" cy="0"/>
-          <a:chOff x="0" y="0"/>
-          <a:chExt cx="0" cy="0"/>
-        </a:xfrm>
-      </p:grpSpPr>
-      <p:sp>
-        <p:nvSpPr>
-          <p:cNvPr id="3" name="Title 2"/>
-          <p:cNvSpPr>
-            <a:spLocks noGrp="1"/>
-          </p:cNvSpPr>
-          <p:nvPr>
-            <p:ph type="title"/>
-          </p:nvPr>
-        </p:nvSpPr>
-        <p:spPr/>
-        <p:txBody>
-          <a:bodyPr/>
-          <a:lstStyle/>
-          <a:p>
-            <a:pPr rtl="1"/>
-            <a:r>
-              <a:rPr lang="en-US" dirty="0" smtClean="0"/>
-              <a:t>Simulator demo</a:t>
-            </a:r>
-            <a:endParaRPr lang="en-US" dirty="0"/>
-          </a:p>
-        </p:txBody>
-      </p:sp>
-      <p:pic>
-        <p:nvPicPr>
-          <p:cNvPr id="9218" name="Picture 2" descr="D:\Dropbox\Z_PROJECTS\sls\Results\Dev.JPG"/>
-          <p:cNvPicPr>
-            <a:picLocks noChangeAspect="1" noChangeArrowheads="1"/>
-          </p:cNvPicPr>
-          <p:nvPr/>
-        </p:nvPicPr>
-        <p:blipFill>
-          <a:blip r:embed="rId2">
-            <a:extLst>
-              <a:ext uri="{28A0092B-C50C-407E-A947-70E740481C1C}">
-                <a14:useLocalDpi xmlns:a14="http://schemas.microsoft.com/office/drawing/2010/main" val="0"/>
-              </a:ext>
-            </a:extLst>
-          </a:blip>
-          <a:srcRect/>
-          <a:stretch>
-            <a:fillRect/>
-          </a:stretch>
-        </p:blipFill>
-        <p:spPr bwMode="auto">
-          <a:xfrm>
-            <a:off x="1347787" y="2438400"/>
-            <a:ext cx="6448425" cy="3171825"/>
-          </a:xfrm>
-          <a:prstGeom prst="rect">
-            <a:avLst/>
-          </a:prstGeom>
-          <a:noFill/>
-          <a:extLst>
-            <a:ext uri="{909E8E84-426E-40DD-AFC4-6F175D3DCCD1}">
-              <a14:hiddenFill xmlns:a14="http://schemas.microsoft.com/office/drawing/2010/main">
-                <a:solidFill>
-                  <a:srgbClr val="FFFFFF"/>
-                </a:solidFill>
-              </a14:hiddenFill>
-            </a:ext>
-          </a:extLst>
-        </p:spPr>
-      </p:pic>
-    </p:spTree>
-    <p:extLst>
-      <p:ext uri="{BB962C8B-B14F-4D97-AF65-F5344CB8AC3E}">
-        <p14:creationId xmlns:p14="http://schemas.microsoft.com/office/powerpoint/2010/main" val="3570863975"/>
-      </p:ext>
-    </p:extLst>
-  </p:cSld>
-  <p:clrMapOvr>
-    <a:masterClrMapping/>
-  </p:clrMapOvr>
-  <p:timing>
-    <p:tnLst>
-      <p:par>
-        <p:cTn id="1" dur="indefinite" restart="never" nodeType="tmRoot"/>
-      </p:par>
-    </p:tnLst>
-  </p:timing>
-</p:sld>
-</file>
-
-<file path=ppt/slides/slide27.xml><?xml version="1.0" encoding="utf-8"?>
-<p:sld xmlns:a="http://schemas.openxmlformats.org/drawingml/2006/main" xmlns:r="http://schemas.openxmlformats.org/officeDocument/2006/relationships" xmlns:p="http://schemas.openxmlformats.org/presentationml/2006/main">
-  <p:cSld>
-    <p:spTree>
-      <p:nvGrpSpPr>
-        <p:cNvPr id="1" name=""/>
-        <p:cNvGrpSpPr/>
-        <p:nvPr/>
-      </p:nvGrpSpPr>
-      <p:grpSpPr>
-        <a:xfrm>
-          <a:off x="0" y="0"/>
-          <a:ext cx="0" cy="0"/>
-          <a:chOff x="0" y="0"/>
-          <a:chExt cx="0" cy="0"/>
-        </a:xfrm>
-      </p:grpSpPr>
-      <p:sp>
-        <p:nvSpPr>
-          <p:cNvPr id="3" name="Title 2"/>
-          <p:cNvSpPr>
-            <a:spLocks noGrp="1"/>
-          </p:cNvSpPr>
-          <p:nvPr>
-            <p:ph type="title"/>
-          </p:nvPr>
-        </p:nvSpPr>
-        <p:spPr/>
-        <p:txBody>
-          <a:bodyPr/>
-          <a:lstStyle/>
-          <a:p>
-            <a:pPr rtl="1"/>
-            <a:r>
-              <a:rPr lang="en-US" dirty="0" smtClean="0"/>
-              <a:t>Simulator demo</a:t>
-            </a:r>
-            <a:endParaRPr lang="en-US" dirty="0"/>
-          </a:p>
-        </p:txBody>
-      </p:sp>
-      <p:pic>
-        <p:nvPicPr>
-          <p:cNvPr id="10242" name="Picture 2" descr="D:\Dropbox\Z_PROJECTS\sls\Results\Dev2.JPG"/>
-          <p:cNvPicPr>
-            <a:picLocks noChangeAspect="1" noChangeArrowheads="1"/>
-          </p:cNvPicPr>
-          <p:nvPr/>
-        </p:nvPicPr>
-        <p:blipFill>
-          <a:blip r:embed="rId2">
-            <a:extLst>
-              <a:ext uri="{28A0092B-C50C-407E-A947-70E740481C1C}">
-                <a14:useLocalDpi xmlns:a14="http://schemas.microsoft.com/office/drawing/2010/main" val="0"/>
-              </a:ext>
-            </a:extLst>
-          </a:blip>
-          <a:srcRect/>
-          <a:stretch>
-            <a:fillRect/>
-          </a:stretch>
-        </p:blipFill>
-        <p:spPr bwMode="auto">
-          <a:xfrm>
-            <a:off x="1347787" y="2438400"/>
-            <a:ext cx="6448425" cy="3171825"/>
-          </a:xfrm>
-          <a:prstGeom prst="rect">
-            <a:avLst/>
-          </a:prstGeom>
-          <a:noFill/>
-          <a:extLst>
-            <a:ext uri="{909E8E84-426E-40DD-AFC4-6F175D3DCCD1}">
-              <a14:hiddenFill xmlns:a14="http://schemas.microsoft.com/office/drawing/2010/main">
-                <a:solidFill>
-                  <a:srgbClr val="FFFFFF"/>
-                </a:solidFill>
-              </a14:hiddenFill>
-            </a:ext>
-          </a:extLst>
-        </p:spPr>
-      </p:pic>
-    </p:spTree>
-    <p:extLst>
-      <p:ext uri="{BB962C8B-B14F-4D97-AF65-F5344CB8AC3E}">
-        <p14:creationId xmlns:p14="http://schemas.microsoft.com/office/powerpoint/2010/main" val="1151157969"/>
-      </p:ext>
-    </p:extLst>
-  </p:cSld>
-  <p:clrMapOvr>
-    <a:masterClrMapping/>
-  </p:clrMapOvr>
-  <p:timing>
-    <p:tnLst>
-      <p:par>
-        <p:cTn id="1" dur="indefinite" restart="never" nodeType="tmRoot"/>
-      </p:par>
-    </p:tnLst>
-  </p:timing>
-</p:sld>
-</file>
-
-<file path=ppt/slides/slide28.xml><?xml version="1.0" encoding="utf-8"?>
-<p:sld xmlns:a="http://schemas.openxmlformats.org/drawingml/2006/main" xmlns:r="http://schemas.openxmlformats.org/officeDocument/2006/relationships" xmlns:p="http://schemas.openxmlformats.org/presentationml/2006/main">
-  <p:cSld>
-    <p:spTree>
-      <p:nvGrpSpPr>
-        <p:cNvPr id="1" name=""/>
-        <p:cNvGrpSpPr/>
-        <p:nvPr/>
-      </p:nvGrpSpPr>
-      <p:grpSpPr>
-        <a:xfrm>
-          <a:off x="0" y="0"/>
-          <a:ext cx="0" cy="0"/>
-          <a:chOff x="0" y="0"/>
-          <a:chExt cx="0" cy="0"/>
-        </a:xfrm>
-      </p:grpSpPr>
-      <p:sp>
-        <p:nvSpPr>
           <p:cNvPr id="2" name="Content Placeholder 1"/>
           <p:cNvSpPr>
             <a:spLocks noGrp="1"/>
@@ -10599,12 +10215,9 @@
           <a:p>
             <a:pPr rtl="1"/>
             <a:r>
-              <a:rPr lang="en-US" dirty="0"/>
-              <a:t>Conclusions </a:t>
-            </a:r>
-            <a:br>
-              <a:rPr lang="en-US" dirty="0"/>
-            </a:br>
+              <a:rPr lang="en-US" dirty="0" smtClean="0"/>
+              <a:t>Simulation Results</a:t>
+            </a:r>
             <a:endParaRPr lang="en-US" dirty="0"/>
           </a:p>
         </p:txBody>
@@ -11139,7 +10752,7 @@
 </p:sld>
 </file>
 
-<file path=ppt/slides/slide29.xml><?xml version="1.0" encoding="utf-8"?>
+<file path=ppt/slides/slide25.xml><?xml version="1.0" encoding="utf-8"?>
 <p:sld xmlns:a="http://schemas.openxmlformats.org/drawingml/2006/main" xmlns:r="http://schemas.openxmlformats.org/officeDocument/2006/relationships" xmlns:p="http://schemas.openxmlformats.org/presentationml/2006/main">
   <p:cSld>
     <p:spTree>
@@ -11208,11 +10821,8 @@
             <a:pPr rtl="1"/>
             <a:r>
               <a:rPr lang="en-US" dirty="0"/>
-              <a:t>Conclusions </a:t>
-            </a:r>
-            <a:br>
-              <a:rPr lang="en-US" dirty="0"/>
-            </a:br>
+              <a:t>Simulation Results</a:t>
+            </a:r>
             <a:endParaRPr lang="en-US" dirty="0"/>
           </a:p>
         </p:txBody>
@@ -11745,178 +11355,7 @@
 </p:sld>
 </file>
 
-<file path=ppt/slides/slide3.xml><?xml version="1.0" encoding="utf-8"?>
-<p:sld xmlns:a="http://schemas.openxmlformats.org/drawingml/2006/main" xmlns:r="http://schemas.openxmlformats.org/officeDocument/2006/relationships" xmlns:p="http://schemas.openxmlformats.org/presentationml/2006/main">
-  <p:cSld>
-    <p:spTree>
-      <p:nvGrpSpPr>
-        <p:cNvPr id="1" name=""/>
-        <p:cNvGrpSpPr/>
-        <p:nvPr/>
-      </p:nvGrpSpPr>
-      <p:grpSpPr>
-        <a:xfrm>
-          <a:off x="0" y="0"/>
-          <a:ext cx="0" cy="0"/>
-          <a:chOff x="0" y="0"/>
-          <a:chExt cx="0" cy="0"/>
-        </a:xfrm>
-      </p:grpSpPr>
-      <p:sp>
-        <p:nvSpPr>
-          <p:cNvPr id="2" name="Content Placeholder 1"/>
-          <p:cNvSpPr>
-            <a:spLocks noGrp="1"/>
-          </p:cNvSpPr>
-          <p:nvPr>
-            <p:ph idx="1"/>
-          </p:nvPr>
-        </p:nvSpPr>
-        <p:spPr/>
-        <p:txBody>
-          <a:bodyPr>
-            <a:normAutofit lnSpcReduction="10000"/>
-          </a:bodyPr>
-          <a:lstStyle/>
-          <a:p>
-            <a:pPr algn="l"/>
-            <a:r>
-              <a:rPr lang="en-US" dirty="0" smtClean="0"/>
-              <a:t>Simulator</a:t>
-            </a:r>
-          </a:p>
-          <a:p>
-            <a:pPr lvl="1">
-              <a:buFont typeface="Wingdings" pitchFamily="2" charset="2"/>
-              <a:buChar char="Ø"/>
-            </a:pPr>
-            <a:r>
-              <a:rPr lang="en-US" dirty="0" smtClean="0"/>
-              <a:t>Design</a:t>
-            </a:r>
-          </a:p>
-          <a:p>
-            <a:pPr lvl="1">
-              <a:buFont typeface="Wingdings" pitchFamily="2" charset="2"/>
-              <a:buChar char="Ø"/>
-            </a:pPr>
-            <a:r>
-              <a:rPr lang="en-US" dirty="0" smtClean="0"/>
-              <a:t>S</a:t>
-            </a:r>
-            <a:r>
-              <a:rPr lang="en-US" dirty="0" smtClean="0"/>
-              <a:t>upported Protocols </a:t>
-            </a:r>
-            <a:endParaRPr lang="en-US" dirty="0" smtClean="0"/>
-          </a:p>
-          <a:p>
-            <a:pPr lvl="1">
-              <a:buFont typeface="Wingdings" pitchFamily="2" charset="2"/>
-              <a:buChar char="Ø"/>
-            </a:pPr>
-            <a:r>
-              <a:rPr lang="en-US" dirty="0" smtClean="0"/>
-              <a:t>Used </a:t>
-            </a:r>
-            <a:r>
-              <a:rPr lang="en-US" dirty="0" smtClean="0"/>
-              <a:t>algorithms</a:t>
-            </a:r>
-            <a:endParaRPr lang="en-US" dirty="0" smtClean="0"/>
-          </a:p>
-          <a:p>
-            <a:pPr lvl="1">
-              <a:buFont typeface="Wingdings" pitchFamily="2" charset="2"/>
-              <a:buChar char="Ø"/>
-            </a:pPr>
-            <a:r>
-              <a:rPr lang="en-US" dirty="0" smtClean="0"/>
-              <a:t>Usability</a:t>
-            </a:r>
-          </a:p>
-          <a:p>
-            <a:pPr marL="0" indent="0" algn="l">
-              <a:buNone/>
-            </a:pPr>
-            <a:endParaRPr lang="en-US" dirty="0" smtClean="0"/>
-          </a:p>
-          <a:p>
-            <a:pPr algn="l"/>
-            <a:r>
-              <a:rPr lang="en-US" dirty="0" smtClean="0"/>
-              <a:t>SLS Algorithm</a:t>
-            </a:r>
-          </a:p>
-          <a:p>
-            <a:pPr lvl="1"/>
-            <a:r>
-              <a:rPr lang="en-US" dirty="0" smtClean="0"/>
-              <a:t>Algorithms flow</a:t>
-            </a:r>
-          </a:p>
-          <a:p>
-            <a:pPr lvl="1"/>
-            <a:r>
-              <a:rPr lang="en-US" dirty="0" smtClean="0"/>
-              <a:t>Statistic</a:t>
-            </a:r>
-          </a:p>
-          <a:p>
-            <a:pPr lvl="1"/>
-            <a:r>
-              <a:rPr lang="en-US" dirty="0" smtClean="0"/>
-              <a:t>Conclusion</a:t>
-            </a:r>
-            <a:endParaRPr lang="en-US" dirty="0"/>
-          </a:p>
-        </p:txBody>
-      </p:sp>
-      <p:sp>
-        <p:nvSpPr>
-          <p:cNvPr id="3" name="Title 2"/>
-          <p:cNvSpPr>
-            <a:spLocks noGrp="1"/>
-          </p:cNvSpPr>
-          <p:nvPr>
-            <p:ph type="title"/>
-          </p:nvPr>
-        </p:nvSpPr>
-        <p:spPr/>
-        <p:txBody>
-          <a:bodyPr/>
-          <a:lstStyle/>
-          <a:p>
-            <a:pPr rtl="1"/>
-            <a:r>
-              <a:rPr lang="en-US" dirty="0" smtClean="0"/>
-              <a:t>Project Overview</a:t>
-            </a:r>
-            <a:endParaRPr lang="en-US" dirty="0"/>
-          </a:p>
-        </p:txBody>
-      </p:sp>
-    </p:spTree>
-    <p:extLst>
-      <p:ext uri="{BB962C8B-B14F-4D97-AF65-F5344CB8AC3E}">
-        <p14:creationId xmlns:p14="http://schemas.microsoft.com/office/powerpoint/2010/main" val="1441071697"/>
-      </p:ext>
-    </p:extLst>
-  </p:cSld>
-  <p:clrMapOvr>
-    <a:masterClrMapping/>
-  </p:clrMapOvr>
-  <p:timing>
-    <p:tnLst>
-      <p:par>
-        <p:cTn id="1" dur="indefinite" restart="never" nodeType="tmRoot"/>
-      </p:par>
-    </p:tnLst>
-  </p:timing>
-</p:sld>
-</file>
-
-<file path=ppt/slides/slide30.xml><?xml version="1.0" encoding="utf-8"?>
+<file path=ppt/slides/slide26.xml><?xml version="1.0" encoding="utf-8"?>
 <p:sld xmlns:a="http://schemas.openxmlformats.org/drawingml/2006/main" xmlns:r="http://schemas.openxmlformats.org/officeDocument/2006/relationships" xmlns:p="http://schemas.openxmlformats.org/presentationml/2006/main">
   <p:cSld>
     <p:spTree>
@@ -12182,7 +11621,91 @@
 </p:sld>
 </file>
 
-<file path=ppt/slides/slide31.xml><?xml version="1.0" encoding="utf-8"?>
+<file path=ppt/slides/slide27.xml><?xml version="1.0" encoding="utf-8"?>
+<p:sld xmlns:a="http://schemas.openxmlformats.org/drawingml/2006/main" xmlns:r="http://schemas.openxmlformats.org/officeDocument/2006/relationships" xmlns:p="http://schemas.openxmlformats.org/presentationml/2006/main">
+  <p:cSld>
+    <p:spTree>
+      <p:nvGrpSpPr>
+        <p:cNvPr id="1" name=""/>
+        <p:cNvGrpSpPr/>
+        <p:nvPr/>
+      </p:nvGrpSpPr>
+      <p:grpSpPr>
+        <a:xfrm>
+          <a:off x="0" y="0"/>
+          <a:ext cx="0" cy="0"/>
+          <a:chOff x="0" y="0"/>
+          <a:chExt cx="0" cy="0"/>
+        </a:xfrm>
+      </p:grpSpPr>
+      <p:sp>
+        <p:nvSpPr>
+          <p:cNvPr id="2" name="Объект 1"/>
+          <p:cNvSpPr>
+            <a:spLocks noGrp="1"/>
+          </p:cNvSpPr>
+          <p:nvPr>
+            <p:ph idx="1"/>
+          </p:nvPr>
+        </p:nvSpPr>
+        <p:spPr/>
+        <p:txBody>
+          <a:bodyPr/>
+          <a:lstStyle/>
+          <a:p>
+            <a:endParaRPr lang="ru-RU"/>
+          </a:p>
+        </p:txBody>
+      </p:sp>
+      <p:sp>
+        <p:nvSpPr>
+          <p:cNvPr id="3" name="Заголовок 2"/>
+          <p:cNvSpPr>
+            <a:spLocks noGrp="1"/>
+          </p:cNvSpPr>
+          <p:nvPr>
+            <p:ph type="title"/>
+          </p:nvPr>
+        </p:nvSpPr>
+        <p:spPr>
+          <a:xfrm>
+            <a:off x="533400" y="2286000"/>
+            <a:ext cx="7756263" cy="3352800"/>
+          </a:xfrm>
+        </p:spPr>
+        <p:txBody>
+          <a:bodyPr/>
+          <a:lstStyle/>
+          <a:p>
+            <a:r>
+              <a:rPr lang="en-US" sz="13800" dirty="0" smtClean="0"/>
+              <a:t>Demo</a:t>
+            </a:r>
+            <a:endParaRPr lang="ru-RU" sz="13800" dirty="0"/>
+          </a:p>
+        </p:txBody>
+      </p:sp>
+    </p:spTree>
+    <p:extLst>
+      <p:ext uri="{BB962C8B-B14F-4D97-AF65-F5344CB8AC3E}">
+        <p14:creationId xmlns:p14="http://schemas.microsoft.com/office/powerpoint/2010/main" val="876268902"/>
+      </p:ext>
+    </p:extLst>
+  </p:cSld>
+  <p:clrMapOvr>
+    <a:masterClrMapping/>
+  </p:clrMapOvr>
+  <p:timing>
+    <p:tnLst>
+      <p:par>
+        <p:cTn id="1" dur="indefinite" restart="never" nodeType="tmRoot"/>
+      </p:par>
+    </p:tnLst>
+  </p:timing>
+</p:sld>
+</file>
+
+<file path=ppt/slides/slide28.xml><?xml version="1.0" encoding="utf-8"?>
 <p:sld xmlns:a="http://schemas.openxmlformats.org/drawingml/2006/main" xmlns:r="http://schemas.openxmlformats.org/officeDocument/2006/relationships" xmlns:p="http://schemas.openxmlformats.org/presentationml/2006/main">
   <p:cSld>
     <p:spTree>
@@ -12273,7 +11796,7 @@
 </p:sld>
 </file>
 
-<file path=ppt/slides/slide32.xml><?xml version="1.0" encoding="utf-8"?>
+<file path=ppt/slides/slide29.xml><?xml version="1.0" encoding="utf-8"?>
 <p:sld xmlns:a="http://schemas.openxmlformats.org/drawingml/2006/main" xmlns:r="http://schemas.openxmlformats.org/officeDocument/2006/relationships" xmlns:p="http://schemas.openxmlformats.org/presentationml/2006/main">
   <p:cSld>
     <p:spTree>
@@ -12558,6 +12081,177 @@
     <p:extLst>
       <p:ext uri="{BB962C8B-B14F-4D97-AF65-F5344CB8AC3E}">
         <p14:creationId xmlns:p14="http://schemas.microsoft.com/office/powerpoint/2010/main" val="4092822900"/>
+      </p:ext>
+    </p:extLst>
+  </p:cSld>
+  <p:clrMapOvr>
+    <a:masterClrMapping/>
+  </p:clrMapOvr>
+  <p:timing>
+    <p:tnLst>
+      <p:par>
+        <p:cTn id="1" dur="indefinite" restart="never" nodeType="tmRoot"/>
+      </p:par>
+    </p:tnLst>
+  </p:timing>
+</p:sld>
+</file>
+
+<file path=ppt/slides/slide3.xml><?xml version="1.0" encoding="utf-8"?>
+<p:sld xmlns:a="http://schemas.openxmlformats.org/drawingml/2006/main" xmlns:r="http://schemas.openxmlformats.org/officeDocument/2006/relationships" xmlns:p="http://schemas.openxmlformats.org/presentationml/2006/main">
+  <p:cSld>
+    <p:spTree>
+      <p:nvGrpSpPr>
+        <p:cNvPr id="1" name=""/>
+        <p:cNvGrpSpPr/>
+        <p:nvPr/>
+      </p:nvGrpSpPr>
+      <p:grpSpPr>
+        <a:xfrm>
+          <a:off x="0" y="0"/>
+          <a:ext cx="0" cy="0"/>
+          <a:chOff x="0" y="0"/>
+          <a:chExt cx="0" cy="0"/>
+        </a:xfrm>
+      </p:grpSpPr>
+      <p:sp>
+        <p:nvSpPr>
+          <p:cNvPr id="2" name="Content Placeholder 1"/>
+          <p:cNvSpPr>
+            <a:spLocks noGrp="1"/>
+          </p:cNvSpPr>
+          <p:nvPr>
+            <p:ph idx="1"/>
+          </p:nvPr>
+        </p:nvSpPr>
+        <p:spPr/>
+        <p:txBody>
+          <a:bodyPr>
+            <a:normAutofit lnSpcReduction="10000"/>
+          </a:bodyPr>
+          <a:lstStyle/>
+          <a:p>
+            <a:pPr algn="l"/>
+            <a:r>
+              <a:rPr lang="en-US" dirty="0" smtClean="0"/>
+              <a:t>Simulator</a:t>
+            </a:r>
+          </a:p>
+          <a:p>
+            <a:pPr lvl="1">
+              <a:buFont typeface="Wingdings" pitchFamily="2" charset="2"/>
+              <a:buChar char="Ø"/>
+            </a:pPr>
+            <a:r>
+              <a:rPr lang="en-US" dirty="0" smtClean="0"/>
+              <a:t>Design</a:t>
+            </a:r>
+          </a:p>
+          <a:p>
+            <a:pPr lvl="1">
+              <a:buFont typeface="Wingdings" pitchFamily="2" charset="2"/>
+              <a:buChar char="Ø"/>
+            </a:pPr>
+            <a:r>
+              <a:rPr lang="en-US" dirty="0" smtClean="0"/>
+              <a:t>S</a:t>
+            </a:r>
+            <a:r>
+              <a:rPr lang="en-US" dirty="0" smtClean="0"/>
+              <a:t>upported Protocols </a:t>
+            </a:r>
+            <a:endParaRPr lang="en-US" dirty="0" smtClean="0"/>
+          </a:p>
+          <a:p>
+            <a:pPr lvl="1">
+              <a:buFont typeface="Wingdings" pitchFamily="2" charset="2"/>
+              <a:buChar char="Ø"/>
+            </a:pPr>
+            <a:r>
+              <a:rPr lang="en-US" dirty="0" smtClean="0"/>
+              <a:t>Used </a:t>
+            </a:r>
+            <a:r>
+              <a:rPr lang="en-US" dirty="0" smtClean="0"/>
+              <a:t>algorithms</a:t>
+            </a:r>
+            <a:endParaRPr lang="en-US" dirty="0" smtClean="0"/>
+          </a:p>
+          <a:p>
+            <a:pPr lvl="1">
+              <a:buFont typeface="Wingdings" pitchFamily="2" charset="2"/>
+              <a:buChar char="Ø"/>
+            </a:pPr>
+            <a:r>
+              <a:rPr lang="en-US" dirty="0" smtClean="0"/>
+              <a:t>Usability</a:t>
+            </a:r>
+          </a:p>
+          <a:p>
+            <a:pPr marL="0" indent="0" algn="l">
+              <a:buNone/>
+            </a:pPr>
+            <a:endParaRPr lang="en-US" dirty="0" smtClean="0"/>
+          </a:p>
+          <a:p>
+            <a:pPr algn="l"/>
+            <a:r>
+              <a:rPr lang="en-US" dirty="0" smtClean="0"/>
+              <a:t>SLS Algorithm</a:t>
+            </a:r>
+          </a:p>
+          <a:p>
+            <a:pPr lvl="1"/>
+            <a:r>
+              <a:rPr lang="en-US" dirty="0" smtClean="0"/>
+              <a:t>Algorithms flow</a:t>
+            </a:r>
+          </a:p>
+          <a:p>
+            <a:pPr lvl="1"/>
+            <a:r>
+              <a:rPr lang="en-US" dirty="0" smtClean="0"/>
+              <a:t>Statistic</a:t>
+            </a:r>
+          </a:p>
+          <a:p>
+            <a:pPr lvl="1"/>
+            <a:r>
+              <a:rPr lang="en-US" dirty="0" smtClean="0"/>
+              <a:t>Conclusion</a:t>
+            </a:r>
+            <a:endParaRPr lang="en-US" dirty="0"/>
+          </a:p>
+        </p:txBody>
+      </p:sp>
+      <p:sp>
+        <p:nvSpPr>
+          <p:cNvPr id="3" name="Title 2"/>
+          <p:cNvSpPr>
+            <a:spLocks noGrp="1"/>
+          </p:cNvSpPr>
+          <p:nvPr>
+            <p:ph type="title"/>
+          </p:nvPr>
+        </p:nvSpPr>
+        <p:spPr/>
+        <p:txBody>
+          <a:bodyPr/>
+          <a:lstStyle/>
+          <a:p>
+            <a:pPr rtl="1"/>
+            <a:r>
+              <a:rPr lang="en-US" dirty="0" smtClean="0"/>
+              <a:t>Project Overview</a:t>
+            </a:r>
+            <a:endParaRPr lang="en-US" dirty="0"/>
+          </a:p>
+        </p:txBody>
+      </p:sp>
+    </p:spTree>
+    <p:extLst>
+      <p:ext uri="{BB962C8B-B14F-4D97-AF65-F5344CB8AC3E}">
+        <p14:creationId xmlns:p14="http://schemas.microsoft.com/office/powerpoint/2010/main" val="1441071697"/>
       </p:ext>
     </p:extLst>
   </p:cSld>
@@ -12751,6 +12445,13 @@
   <p:clrMapOvr>
     <a:masterClrMapping/>
   </p:clrMapOvr>
+  <p:timing>
+    <p:tnLst>
+      <p:par>
+        <p:cTn id="1" dur="indefinite" restart="never" nodeType="tmRoot"/>
+      </p:par>
+    </p:tnLst>
+  </p:timing>
 </p:sld>
 </file>
 
@@ -12794,7 +12495,7 @@
           <a:graphicData uri="http://schemas.openxmlformats.org/presentationml/2006/ole">
             <mc:AlternateContent xmlns:mc="http://schemas.openxmlformats.org/markup-compatibility/2006">
               <mc:Choice xmlns:v="urn:schemas-microsoft-com:vml" Requires="v">
-                <p:oleObj spid="_x0000_s1130" name="Visio" r:id="rId3" imgW="9147060" imgH="7289860" progId="Visio.Drawing.11">
+                <p:oleObj spid="_x0000_s1131" name="Visio" r:id="rId3" imgW="9147060" imgH="7289860" progId="Visio.Drawing.11">
                   <p:embed/>
                 </p:oleObj>
               </mc:Choice>
@@ -13288,6 +12989,13 @@
   <p:clrMapOvr>
     <a:masterClrMapping/>
   </p:clrMapOvr>
+  <p:timing>
+    <p:tnLst>
+      <p:par>
+        <p:cTn id="1" dur="indefinite" restart="never" nodeType="tmRoot"/>
+      </p:par>
+    </p:tnLst>
+  </p:timing>
 </p:sld>
 </file>
 
@@ -13603,6 +13311,13 @@
   <p:clrMapOvr>
     <a:masterClrMapping/>
   </p:clrMapOvr>
+  <p:timing>
+    <p:tnLst>
+      <p:par>
+        <p:cTn id="1" dur="indefinite" restart="never" nodeType="tmRoot"/>
+      </p:par>
+    </p:tnLst>
+  </p:timing>
 </p:sld>
 </file>
 

</xml_diff>

<commit_message>
Presentation actually sent to Martin
Change-Id: Ic49dfbf9c3cffd65359f432bdcac70a00e01f942
Signed-off-by: Andrey Shamis <lolnik@gmail.com>
</commit_message>
<xml_diff>
--- a/JudgesForumPresentation.pptx
+++ b/JudgesForumPresentation.pptx
@@ -8224,7 +8224,7 @@
           <a:p>
             <a:pPr algn="l"/>
             <a:r>
-              <a:rPr lang="en-US" smtClean="0"/>
+              <a:rPr lang="en-US" dirty="0" smtClean="0"/>
               <a:t>Graph will be here</a:t>
             </a:r>
             <a:endParaRPr lang="en-US" dirty="0" smtClean="0"/>
@@ -8958,7 +8958,7 @@
           <a:graphicData uri="http://schemas.openxmlformats.org/presentationml/2006/ole">
             <mc:AlternateContent xmlns:mc="http://schemas.openxmlformats.org/markup-compatibility/2006">
               <mc:Choice xmlns:v="urn:schemas-microsoft-com:vml" Requires="v">
-                <p:oleObj spid="_x0000_s3177" name="Visio" r:id="rId3" imgW="9147060" imgH="7289860" progId="Visio.Drawing.11">
+                <p:oleObj spid="_x0000_s3178" name="Visio" r:id="rId3" imgW="9147060" imgH="7289860" progId="Visio.Drawing.11">
                   <p:embed/>
                 </p:oleObj>
               </mc:Choice>
@@ -9215,7 +9215,7 @@
           <a:graphicData uri="http://schemas.openxmlformats.org/presentationml/2006/ole">
             <mc:AlternateContent xmlns:mc="http://schemas.openxmlformats.org/markup-compatibility/2006">
               <mc:Choice xmlns:v="urn:schemas-microsoft-com:vml" Requires="v">
-                <p:oleObj spid="_x0000_s5157" name="Visio" r:id="rId3" imgW="10758690" imgH="7626560" progId="Visio.Drawing.11">
+                <p:oleObj spid="_x0000_s5158" name="Visio" r:id="rId3" imgW="10758690" imgH="7626560" progId="Visio.Drawing.11">
                   <p:embed/>
                 </p:oleObj>
               </mc:Choice>
@@ -9659,7 +9659,7 @@
           <a:graphicData uri="http://schemas.openxmlformats.org/presentationml/2006/ole">
             <mc:AlternateContent xmlns:mc="http://schemas.openxmlformats.org/markup-compatibility/2006">
               <mc:Choice xmlns:v="urn:schemas-microsoft-com:vml" Requires="v">
-                <p:oleObj spid="_x0000_s7199" name="Visio" r:id="rId3" imgW="10758690" imgH="7626560" progId="Visio.Drawing.11">
+                <p:oleObj spid="_x0000_s7200" name="Visio" r:id="rId3" imgW="10758690" imgH="7626560" progId="Visio.Drawing.11">
                   <p:embed/>
                 </p:oleObj>
               </mc:Choice>
@@ -9785,7 +9785,7 @@
           <a:graphicData uri="http://schemas.openxmlformats.org/presentationml/2006/ole">
             <mc:AlternateContent xmlns:mc="http://schemas.openxmlformats.org/markup-compatibility/2006">
               <mc:Choice xmlns:v="urn:schemas-microsoft-com:vml" Requires="v">
-                <p:oleObj spid="_x0000_s8223" name="Visio" r:id="rId3" imgW="10758690" imgH="7626560" progId="Visio.Drawing.11">
+                <p:oleObj spid="_x0000_s8224" name="Visio" r:id="rId3" imgW="10758690" imgH="7626560" progId="Visio.Drawing.11">
                   <p:embed/>
                 </p:oleObj>
               </mc:Choice>
@@ -9932,7 +9932,7 @@
           <a:graphicData uri="http://schemas.openxmlformats.org/presentationml/2006/ole">
             <mc:AlternateContent xmlns:mc="http://schemas.openxmlformats.org/markup-compatibility/2006">
               <mc:Choice xmlns:v="urn:schemas-microsoft-com:vml" Requires="v">
-                <p:oleObj spid="_x0000_s2155" name="Visio" r:id="rId3" imgW="9147060" imgH="7289860" progId="Visio.Drawing.11">
+                <p:oleObj spid="_x0000_s2156" name="Visio" r:id="rId3" imgW="9147060" imgH="7289860" progId="Visio.Drawing.11">
                   <p:embed/>
                 </p:oleObj>
               </mc:Choice>
@@ -12495,7 +12495,7 @@
           <a:graphicData uri="http://schemas.openxmlformats.org/presentationml/2006/ole">
             <mc:AlternateContent xmlns:mc="http://schemas.openxmlformats.org/markup-compatibility/2006">
               <mc:Choice xmlns:v="urn:schemas-microsoft-com:vml" Requires="v">
-                <p:oleObj spid="_x0000_s1131" name="Visio" r:id="rId3" imgW="9147060" imgH="7289860" progId="Visio.Drawing.11">
+                <p:oleObj spid="_x0000_s1132" name="Visio" r:id="rId3" imgW="9147060" imgH="7289860" progId="Visio.Drawing.11">
                   <p:embed/>
                 </p:oleObj>
               </mc:Choice>

</xml_diff>

<commit_message>
Add links to presentation
Change-Id: Ie17f201ea1c378d5bc2471fccdc0537f3fa97ced
Signed-off-by: Ilia Gaisinsky <apalon83@gmail.com>
</commit_message>
<xml_diff>
--- a/JudgesForumPresentation.pptx
+++ b/JudgesForumPresentation.pptx
@@ -5,10 +5,10 @@
     <p:sldMasterId id="2147483672" r:id="rId1"/>
   </p:sldMasterIdLst>
   <p:notesMasterIdLst>
-    <p:notesMasterId r:id="rId31"/>
+    <p:notesMasterId r:id="rId32"/>
   </p:notesMasterIdLst>
   <p:handoutMasterIdLst>
-    <p:handoutMasterId r:id="rId32"/>
+    <p:handoutMasterId r:id="rId33"/>
   </p:handoutMasterIdLst>
   <p:sldIdLst>
     <p:sldId id="256" r:id="rId2"/>
@@ -40,6 +40,7 @@
     <p:sldId id="339" r:id="rId28"/>
     <p:sldId id="308" r:id="rId29"/>
     <p:sldId id="333" r:id="rId30"/>
+    <p:sldId id="340" r:id="rId31"/>
   </p:sldIdLst>
   <p:sldSz cx="9144000" cy="6858000" type="screen4x3"/>
   <p:notesSz cx="6669088" cy="9928225"/>
@@ -144,7 +145,7 @@
 <file path=ppt/charts/chart1.xml><?xml version="1.0" encoding="utf-8"?>
 <c:chartSpace xmlns:c="http://schemas.openxmlformats.org/drawingml/2006/chart" xmlns:a="http://schemas.openxmlformats.org/drawingml/2006/main" xmlns:r="http://schemas.openxmlformats.org/officeDocument/2006/relationships">
   <c:date1904 val="0"/>
-  <c:lang val="ru-RU"/>
+  <c:lang val="en-US"/>
   <c:roundedCorners val="0"/>
   <mc:AlternateContent xmlns:mc="http://schemas.openxmlformats.org/markup-compatibility/2006">
     <mc:Choice xmlns:c14="http://schemas.microsoft.com/office/drawing/2007/8/2/chart" Requires="c14">
@@ -172,7 +173,6 @@
           </a:p>
         </c:rich>
       </c:tx>
-      <c:layout/>
       <c:overlay val="0"/>
     </c:title>
     <c:autoTitleDeleted val="0"/>
@@ -1797,11 +1797,11 @@
           <c:showBubbleSize val="0"/>
         </c:dLbls>
         <c:gapWidth val="150"/>
-        <c:axId val="89334784"/>
-        <c:axId val="51533440"/>
+        <c:axId val="91919872"/>
+        <c:axId val="91921408"/>
       </c:barChart>
       <c:catAx>
-        <c:axId val="89334784"/>
+        <c:axId val="91919872"/>
         <c:scaling>
           <c:orientation val="minMax"/>
         </c:scaling>
@@ -1811,7 +1811,7 @@
         <c:majorTickMark val="none"/>
         <c:minorTickMark val="none"/>
         <c:tickLblPos val="nextTo"/>
-        <c:crossAx val="51533440"/>
+        <c:crossAx val="91921408"/>
         <c:crosses val="autoZero"/>
         <c:auto val="1"/>
         <c:lblAlgn val="ctr"/>
@@ -1819,7 +1819,7 @@
         <c:noMultiLvlLbl val="0"/>
       </c:catAx>
       <c:valAx>
-        <c:axId val="51533440"/>
+        <c:axId val="91921408"/>
         <c:scaling>
           <c:orientation val="minMax"/>
         </c:scaling>
@@ -1830,7 +1830,7 @@
         <c:majorTickMark val="none"/>
         <c:minorTickMark val="none"/>
         <c:tickLblPos val="nextTo"/>
-        <c:crossAx val="89334784"/>
+        <c:crossAx val="91919872"/>
         <c:crosses val="autoZero"/>
         <c:crossBetween val="between"/>
       </c:valAx>
@@ -1862,7 +1862,7 @@
 <file path=ppt/charts/chart2.xml><?xml version="1.0" encoding="utf-8"?>
 <c:chartSpace xmlns:c="http://schemas.openxmlformats.org/drawingml/2006/chart" xmlns:a="http://schemas.openxmlformats.org/drawingml/2006/main" xmlns:r="http://schemas.openxmlformats.org/officeDocument/2006/relationships">
   <c:date1904 val="0"/>
-  <c:lang val="ru-RU"/>
+  <c:lang val="en-US"/>
   <c:roundedCorners val="0"/>
   <mc:AlternateContent xmlns:mc="http://schemas.openxmlformats.org/markup-compatibility/2006">
     <mc:Choice xmlns:c14="http://schemas.microsoft.com/office/drawing/2007/8/2/chart" Requires="c14">
@@ -1894,7 +1894,6 @@
           </a:p>
         </c:rich>
       </c:tx>
-      <c:layout/>
       <c:overlay val="0"/>
     </c:title>
     <c:autoTitleDeleted val="0"/>
@@ -1970,11 +1969,11 @@
           <c:showBubbleSize val="0"/>
         </c:dLbls>
         <c:gapWidth val="150"/>
-        <c:axId val="78744576"/>
-        <c:axId val="52439872"/>
+        <c:axId val="93659136"/>
+        <c:axId val="93660672"/>
       </c:barChart>
       <c:catAx>
-        <c:axId val="78744576"/>
+        <c:axId val="93659136"/>
         <c:scaling>
           <c:orientation val="minMax"/>
         </c:scaling>
@@ -1983,7 +1982,7 @@
         <c:majorTickMark val="out"/>
         <c:minorTickMark val="none"/>
         <c:tickLblPos val="nextTo"/>
-        <c:crossAx val="52439872"/>
+        <c:crossAx val="93660672"/>
         <c:crosses val="autoZero"/>
         <c:auto val="1"/>
         <c:lblAlgn val="ctr"/>
@@ -1991,7 +1990,7 @@
         <c:noMultiLvlLbl val="0"/>
       </c:catAx>
       <c:valAx>
-        <c:axId val="52439872"/>
+        <c:axId val="93660672"/>
         <c:scaling>
           <c:orientation val="minMax"/>
         </c:scaling>
@@ -2002,7 +2001,7 @@
         <c:majorTickMark val="out"/>
         <c:minorTickMark val="none"/>
         <c:tickLblPos val="nextTo"/>
-        <c:crossAx val="78744576"/>
+        <c:crossAx val="93659136"/>
         <c:crosses val="autoZero"/>
         <c:crossBetween val="between"/>
       </c:valAx>
@@ -2040,7 +2039,7 @@
           <a:cs typeface="+mn-cs"/>
         </a:defRPr>
       </a:pPr>
-      <a:endParaRPr lang="ru-RU"/>
+      <a:endParaRPr lang="en-US"/>
     </a:p>
   </c:txPr>
   <c:externalData r:id="rId1">
@@ -2052,7 +2051,7 @@
 <file path=ppt/charts/chart3.xml><?xml version="1.0" encoding="utf-8"?>
 <c:chartSpace xmlns:c="http://schemas.openxmlformats.org/drawingml/2006/chart" xmlns:a="http://schemas.openxmlformats.org/drawingml/2006/main" xmlns:r="http://schemas.openxmlformats.org/officeDocument/2006/relationships">
   <c:date1904 val="0"/>
-  <c:lang val="ru-RU"/>
+  <c:lang val="en-US"/>
   <c:roundedCorners val="0"/>
   <mc:AlternateContent xmlns:mc="http://schemas.openxmlformats.org/markup-compatibility/2006">
     <mc:Choice xmlns:c14="http://schemas.microsoft.com/office/drawing/2007/8/2/chart" Requires="c14">
@@ -2079,7 +2078,6 @@
           </a:p>
         </c:rich>
       </c:tx>
-      <c:layout/>
       <c:overlay val="0"/>
     </c:title>
     <c:autoTitleDeleted val="0"/>
@@ -2155,11 +2153,11 @@
           <c:showBubbleSize val="0"/>
         </c:dLbls>
         <c:gapWidth val="150"/>
-        <c:axId val="78745088"/>
-        <c:axId val="47821888"/>
+        <c:axId val="93680768"/>
+        <c:axId val="93682304"/>
       </c:barChart>
       <c:catAx>
-        <c:axId val="78745088"/>
+        <c:axId val="93680768"/>
         <c:scaling>
           <c:orientation val="minMax"/>
         </c:scaling>
@@ -2168,7 +2166,7 @@
         <c:majorTickMark val="none"/>
         <c:minorTickMark val="none"/>
         <c:tickLblPos val="nextTo"/>
-        <c:crossAx val="47821888"/>
+        <c:crossAx val="93682304"/>
         <c:crosses val="autoZero"/>
         <c:auto val="1"/>
         <c:lblAlgn val="ctr"/>
@@ -2176,7 +2174,7 @@
         <c:noMultiLvlLbl val="0"/>
       </c:catAx>
       <c:valAx>
-        <c:axId val="47821888"/>
+        <c:axId val="93682304"/>
         <c:scaling>
           <c:orientation val="minMax"/>
         </c:scaling>
@@ -2187,7 +2185,7 @@
         <c:majorTickMark val="none"/>
         <c:minorTickMark val="none"/>
         <c:tickLblPos val="nextTo"/>
-        <c:crossAx val="78745088"/>
+        <c:crossAx val="93680768"/>
         <c:crosses val="autoZero"/>
         <c:crossBetween val="between"/>
       </c:valAx>
@@ -2231,7 +2229,7 @@
           <a:cs typeface="+mn-cs"/>
         </a:defRPr>
       </a:pPr>
-      <a:endParaRPr lang="ru-RU"/>
+      <a:endParaRPr lang="en-US"/>
     </a:p>
   </c:txPr>
   <c:externalData r:id="rId1">
@@ -2243,7 +2241,7 @@
 <file path=ppt/charts/chart4.xml><?xml version="1.0" encoding="utf-8"?>
 <c:chartSpace xmlns:c="http://schemas.openxmlformats.org/drawingml/2006/chart" xmlns:a="http://schemas.openxmlformats.org/drawingml/2006/main" xmlns:r="http://schemas.openxmlformats.org/officeDocument/2006/relationships">
   <c:date1904 val="0"/>
-  <c:lang val="ru-RU"/>
+  <c:lang val="en-US"/>
   <c:roundedCorners val="0"/>
   <mc:AlternateContent xmlns:mc="http://schemas.openxmlformats.org/markup-compatibility/2006">
     <mc:Choice xmlns:c14="http://schemas.microsoft.com/office/drawing/2007/8/2/chart" Requires="c14">
@@ -2275,7 +2273,6 @@
           </a:p>
         </c:rich>
       </c:tx>
-      <c:layout/>
       <c:overlay val="0"/>
     </c:title>
     <c:autoTitleDeleted val="0"/>
@@ -2351,11 +2348,11 @@
           <c:showBubbleSize val="0"/>
         </c:dLbls>
         <c:gapWidth val="150"/>
-        <c:axId val="89999872"/>
-        <c:axId val="45818432"/>
+        <c:axId val="102057472"/>
+        <c:axId val="102059008"/>
       </c:barChart>
       <c:catAx>
-        <c:axId val="89999872"/>
+        <c:axId val="102057472"/>
         <c:scaling>
           <c:orientation val="minMax"/>
         </c:scaling>
@@ -2364,7 +2361,7 @@
         <c:majorTickMark val="out"/>
         <c:minorTickMark val="none"/>
         <c:tickLblPos val="nextTo"/>
-        <c:crossAx val="45818432"/>
+        <c:crossAx val="102059008"/>
         <c:crosses val="autoZero"/>
         <c:auto val="1"/>
         <c:lblAlgn val="ctr"/>
@@ -2372,7 +2369,7 @@
         <c:noMultiLvlLbl val="0"/>
       </c:catAx>
       <c:valAx>
-        <c:axId val="45818432"/>
+        <c:axId val="102059008"/>
         <c:scaling>
           <c:orientation val="minMax"/>
         </c:scaling>
@@ -2383,7 +2380,7 @@
         <c:majorTickMark val="out"/>
         <c:minorTickMark val="none"/>
         <c:tickLblPos val="nextTo"/>
-        <c:crossAx val="89999872"/>
+        <c:crossAx val="102057472"/>
         <c:crosses val="autoZero"/>
         <c:crossBetween val="between"/>
       </c:valAx>
@@ -2421,7 +2418,7 @@
           <a:cs typeface="+mn-cs"/>
         </a:defRPr>
       </a:pPr>
-      <a:endParaRPr lang="ru-RU"/>
+      <a:endParaRPr lang="en-US"/>
     </a:p>
   </c:txPr>
   <c:externalData r:id="rId1">
@@ -2433,7 +2430,7 @@
 <file path=ppt/charts/chart5.xml><?xml version="1.0" encoding="utf-8"?>
 <c:chartSpace xmlns:c="http://schemas.openxmlformats.org/drawingml/2006/chart" xmlns:a="http://schemas.openxmlformats.org/drawingml/2006/main" xmlns:r="http://schemas.openxmlformats.org/officeDocument/2006/relationships">
   <c:date1904 val="0"/>
-  <c:lang val="ru-RU"/>
+  <c:lang val="en-US"/>
   <c:roundedCorners val="0"/>
   <mc:AlternateContent xmlns:mc="http://schemas.openxmlformats.org/markup-compatibility/2006">
     <mc:Choice xmlns:c14="http://schemas.microsoft.com/office/drawing/2007/8/2/chart" Requires="c14">
@@ -2445,7 +2442,6 @@
   </mc:AlternateContent>
   <c:chart>
     <c:title>
-      <c:layout/>
       <c:overlay val="0"/>
     </c:title>
     <c:autoTitleDeleted val="0"/>
@@ -2521,11 +2517,11 @@
           <c:showBubbleSize val="0"/>
         </c:dLbls>
         <c:gapWidth val="150"/>
-        <c:axId val="88154624"/>
-        <c:axId val="90487552"/>
+        <c:axId val="102075008"/>
+        <c:axId val="102084992"/>
       </c:barChart>
       <c:catAx>
-        <c:axId val="88154624"/>
+        <c:axId val="102075008"/>
         <c:scaling>
           <c:orientation val="minMax"/>
         </c:scaling>
@@ -2534,7 +2530,7 @@
         <c:majorTickMark val="none"/>
         <c:minorTickMark val="none"/>
         <c:tickLblPos val="nextTo"/>
-        <c:crossAx val="90487552"/>
+        <c:crossAx val="102084992"/>
         <c:crosses val="autoZero"/>
         <c:auto val="1"/>
         <c:lblAlgn val="ctr"/>
@@ -2542,7 +2538,7 @@
         <c:noMultiLvlLbl val="0"/>
       </c:catAx>
       <c:valAx>
-        <c:axId val="90487552"/>
+        <c:axId val="102084992"/>
         <c:scaling>
           <c:orientation val="minMax"/>
         </c:scaling>
@@ -2553,7 +2549,7 @@
         <c:majorTickMark val="none"/>
         <c:minorTickMark val="none"/>
         <c:tickLblPos val="nextTo"/>
-        <c:crossAx val="88154624"/>
+        <c:crossAx val="102075008"/>
         <c:crosses val="autoZero"/>
         <c:crossBetween val="between"/>
       </c:valAx>
@@ -2597,7 +2593,7 @@
           <a:cs typeface="+mn-cs"/>
         </a:defRPr>
       </a:pPr>
-      <a:endParaRPr lang="ru-RU"/>
+      <a:endParaRPr lang="en-US"/>
     </a:p>
   </c:txPr>
   <c:externalData r:id="rId1">
@@ -7818,11 +7814,7 @@
             <a:pPr lvl="1"/>
             <a:r>
               <a:rPr lang="en-US" dirty="0" smtClean="0"/>
-              <a:t>Keep Alive </a:t>
-            </a:r>
-            <a:r>
-              <a:rPr lang="en-US" dirty="0" smtClean="0"/>
-              <a:t>mechanism</a:t>
+              <a:t>Keep Alive mechanism</a:t>
             </a:r>
           </a:p>
           <a:p>
@@ -7843,17 +7835,12 @@
               <a:rPr lang="en-US" dirty="0" smtClean="0"/>
               <a:t>N</a:t>
             </a:r>
-            <a:endParaRPr lang="en-US" dirty="0" smtClean="0"/>
           </a:p>
           <a:p>
             <a:pPr lvl="1"/>
             <a:r>
               <a:rPr lang="en-US" dirty="0" smtClean="0"/>
-              <a:t>Connection </a:t>
-            </a:r>
-            <a:r>
-              <a:rPr lang="en-US" dirty="0" smtClean="0"/>
-              <a:t>establishment negotiation</a:t>
+              <a:t>Connection establishment negotiation</a:t>
             </a:r>
           </a:p>
           <a:p>
@@ -7869,7 +7856,6 @@
               <a:rPr lang="en-US" dirty="0" smtClean="0"/>
               <a:t>Tunneled Direct Link Setup </a:t>
             </a:r>
-            <a:endParaRPr lang="en-US" dirty="0" smtClean="0"/>
           </a:p>
           <a:p>
             <a:endParaRPr lang="en-US" dirty="0" smtClean="0"/>
@@ -7973,13 +7959,8 @@
             </a:r>
             <a:r>
               <a:rPr lang="en-US" dirty="0" smtClean="0"/>
-              <a:t>(</a:t>
-            </a:r>
-            <a:r>
-              <a:rPr lang="en-US" dirty="0" smtClean="0"/>
-              <a:t>RSSI)</a:t>
-            </a:r>
-            <a:endParaRPr lang="en-US" dirty="0" smtClean="0"/>
+              <a:t>(RSSI)</a:t>
+            </a:r>
           </a:p>
           <a:p>
             <a:pPr algn="l"/>
@@ -8134,13 +8115,8 @@
             <a:pPr algn="l"/>
             <a:r>
               <a:rPr lang="en-US" dirty="0" smtClean="0"/>
-              <a:t>Signal </a:t>
-            </a:r>
-            <a:r>
-              <a:rPr lang="en-US" dirty="0" smtClean="0"/>
-              <a:t>to Noise Ratio (SNR) – Packet Loss </a:t>
-            </a:r>
-            <a:endParaRPr lang="en-US" dirty="0" smtClean="0"/>
+              <a:t>Signal to Noise Ratio (SNR) – Packet Loss </a:t>
+            </a:r>
           </a:p>
           <a:p>
             <a:pPr algn="l"/>
@@ -8152,7 +8128,6 @@
               <a:rPr lang="en-US" dirty="0" smtClean="0"/>
               <a:t>Graph will be here</a:t>
             </a:r>
-            <a:endParaRPr lang="en-US" dirty="0" smtClean="0"/>
           </a:p>
           <a:p>
             <a:pPr algn="l"/>
@@ -8601,11 +8576,7 @@
             </a:pPr>
             <a:r>
               <a:rPr lang="en-US" sz="3000" dirty="0" smtClean="0"/>
-              <a:t>Null </a:t>
-            </a:r>
-            <a:r>
-              <a:rPr lang="en-US" sz="3000" dirty="0" smtClean="0"/>
-              <a:t>Data Packet </a:t>
+              <a:t>Null Data Packet </a:t>
             </a:r>
             <a:r>
               <a:rPr lang="en-US" sz="3000" dirty="0"/>
@@ -8883,7 +8854,7 @@
           <a:graphicData uri="http://schemas.openxmlformats.org/presentationml/2006/ole">
             <mc:AlternateContent xmlns:mc="http://schemas.openxmlformats.org/markup-compatibility/2006">
               <mc:Choice xmlns:v="urn:schemas-microsoft-com:vml" Requires="v">
-                <p:oleObj spid="_x0000_s3179" name="Visio" r:id="rId3" imgW="9147060" imgH="7289860" progId="Visio.Drawing.11">
+                <p:oleObj spid="_x0000_s3182" name="Visio" r:id="rId3" imgW="9147060" imgH="7289860" progId="Visio.Drawing.11">
                   <p:embed/>
                 </p:oleObj>
               </mc:Choice>
@@ -9140,7 +9111,7 @@
           <a:graphicData uri="http://schemas.openxmlformats.org/presentationml/2006/ole">
             <mc:AlternateContent xmlns:mc="http://schemas.openxmlformats.org/markup-compatibility/2006">
               <mc:Choice xmlns:v="urn:schemas-microsoft-com:vml" Requires="v">
-                <p:oleObj spid="_x0000_s5159" name="Visio" r:id="rId3" imgW="10758690" imgH="7626560" progId="Visio.Drawing.11">
+                <p:oleObj spid="_x0000_s5162" name="Visio" r:id="rId3" imgW="10758690" imgH="7626560" progId="Visio.Drawing.11">
                   <p:embed/>
                 </p:oleObj>
               </mc:Choice>
@@ -9337,11 +9308,7 @@
             <a:pPr algn="l"/>
             <a:r>
               <a:rPr lang="en-US" dirty="0" smtClean="0"/>
-              <a:t>Creation of WiFi simulator in order to develop Smart Link Selection </a:t>
-            </a:r>
-            <a:r>
-              <a:rPr lang="en-US" dirty="0" smtClean="0"/>
-              <a:t>Algorithms  </a:t>
+              <a:t>Creation of WiFi simulator in order to develop Smart Link Selection Algorithms  </a:t>
             </a:r>
             <a:endParaRPr lang="en-US" dirty="0"/>
           </a:p>
@@ -9365,11 +9332,7 @@
             <a:pPr rtl="1"/>
             <a:r>
               <a:rPr lang="en-US" dirty="0" smtClean="0"/>
-              <a:t>Project </a:t>
-            </a:r>
-            <a:r>
-              <a:rPr lang="en-US" dirty="0" smtClean="0"/>
-              <a:t>Goal</a:t>
+              <a:t>Project Goal</a:t>
             </a:r>
             <a:endParaRPr lang="en-US" dirty="0"/>
           </a:p>
@@ -9584,7 +9547,7 @@
           <a:graphicData uri="http://schemas.openxmlformats.org/presentationml/2006/ole">
             <mc:AlternateContent xmlns:mc="http://schemas.openxmlformats.org/markup-compatibility/2006">
               <mc:Choice xmlns:v="urn:schemas-microsoft-com:vml" Requires="v">
-                <p:oleObj spid="_x0000_s7201" name="Visio" r:id="rId3" imgW="10758690" imgH="7626560" progId="Visio.Drawing.11">
+                <p:oleObj spid="_x0000_s7204" name="Visio" r:id="rId3" imgW="10758690" imgH="7626560" progId="Visio.Drawing.11">
                   <p:embed/>
                 </p:oleObj>
               </mc:Choice>
@@ -9710,7 +9673,7 @@
           <a:graphicData uri="http://schemas.openxmlformats.org/presentationml/2006/ole">
             <mc:AlternateContent xmlns:mc="http://schemas.openxmlformats.org/markup-compatibility/2006">
               <mc:Choice xmlns:v="urn:schemas-microsoft-com:vml" Requires="v">
-                <p:oleObj spid="_x0000_s8225" name="Visio" r:id="rId3" imgW="10758690" imgH="7626560" progId="Visio.Drawing.11">
+                <p:oleObj spid="_x0000_s8228" name="Visio" r:id="rId3" imgW="10758690" imgH="7626560" progId="Visio.Drawing.11">
                   <p:embed/>
                 </p:oleObj>
               </mc:Choice>
@@ -9857,7 +9820,7 @@
           <a:graphicData uri="http://schemas.openxmlformats.org/presentationml/2006/ole">
             <mc:AlternateContent xmlns:mc="http://schemas.openxmlformats.org/markup-compatibility/2006">
               <mc:Choice xmlns:v="urn:schemas-microsoft-com:vml" Requires="v">
-                <p:oleObj spid="_x0000_s2157" name="Visio" r:id="rId3" imgW="9147060" imgH="7289860" progId="Visio.Drawing.11">
+                <p:oleObj spid="_x0000_s2160" name="Visio" r:id="rId3" imgW="9147060" imgH="7289860" progId="Visio.Drawing.11">
                   <p:embed/>
                 </p:oleObj>
               </mc:Choice>
@@ -10748,7 +10711,6 @@
               <a:rPr lang="en-US" dirty="0"/>
               <a:t>Simulation Results</a:t>
             </a:r>
-            <a:endParaRPr lang="en-US" dirty="0"/>
           </a:p>
         </p:txBody>
       </p:sp>
@@ -11959,10 +11921,16 @@
               </a:lnSpc>
             </a:pPr>
             <a:r>
+              <a:rPr lang="en-US" dirty="0" smtClean="0">
+                <a:hlinkClick r:id="rId9"/>
+              </a:rPr>
+              <a:t>Our web site for project: http</a:t>
+            </a:r>
+            <a:r>
               <a:rPr lang="en-US" dirty="0">
                 <a:hlinkClick r:id="rId9"/>
               </a:rPr>
-              <a:t>http://wiki.dhs01.com/</a:t>
+              <a:t>://wiki.dhs01.com/</a:t>
             </a:r>
             <a:endParaRPr lang="en-US" dirty="0"/>
           </a:p>
@@ -12079,13 +12047,8 @@
             </a:pPr>
             <a:r>
               <a:rPr lang="en-US" dirty="0" smtClean="0"/>
-              <a:t>S</a:t>
-            </a:r>
-            <a:r>
-              <a:rPr lang="en-US" dirty="0" smtClean="0"/>
-              <a:t>upported Protocols </a:t>
-            </a:r>
-            <a:endParaRPr lang="en-US" dirty="0" smtClean="0"/>
+              <a:t>Supported Protocols </a:t>
+            </a:r>
           </a:p>
           <a:p>
             <a:pPr lvl="1">
@@ -12094,13 +12057,8 @@
             </a:pPr>
             <a:r>
               <a:rPr lang="en-US" dirty="0" smtClean="0"/>
-              <a:t>Used </a:t>
-            </a:r>
-            <a:r>
-              <a:rPr lang="en-US" dirty="0" smtClean="0"/>
-              <a:t>algorithms</a:t>
-            </a:r>
-            <a:endParaRPr lang="en-US" dirty="0" smtClean="0"/>
+              <a:t>Used algorithms</a:t>
+            </a:r>
           </a:p>
           <a:p>
             <a:pPr lvl="1">
@@ -12177,6 +12135,167 @@
     <p:extLst>
       <p:ext uri="{BB962C8B-B14F-4D97-AF65-F5344CB8AC3E}">
         <p14:creationId xmlns:p14="http://schemas.microsoft.com/office/powerpoint/2010/main" val="1441071697"/>
+      </p:ext>
+    </p:extLst>
+  </p:cSld>
+  <p:clrMapOvr>
+    <a:masterClrMapping/>
+  </p:clrMapOvr>
+  <p:timing>
+    <p:tnLst>
+      <p:par>
+        <p:cTn id="1" dur="indefinite" restart="never" nodeType="tmRoot"/>
+      </p:par>
+    </p:tnLst>
+  </p:timing>
+</p:sld>
+</file>
+
+<file path=ppt/slides/slide30.xml><?xml version="1.0" encoding="utf-8"?>
+<p:sld xmlns:a="http://schemas.openxmlformats.org/drawingml/2006/main" xmlns:r="http://schemas.openxmlformats.org/officeDocument/2006/relationships" xmlns:p="http://schemas.openxmlformats.org/presentationml/2006/main">
+  <p:cSld>
+    <p:spTree>
+      <p:nvGrpSpPr>
+        <p:cNvPr id="1" name=""/>
+        <p:cNvGrpSpPr/>
+        <p:nvPr/>
+      </p:nvGrpSpPr>
+      <p:grpSpPr>
+        <a:xfrm>
+          <a:off x="0" y="0"/>
+          <a:ext cx="0" cy="0"/>
+          <a:chOff x="0" y="0"/>
+          <a:chExt cx="0" cy="0"/>
+        </a:xfrm>
+      </p:grpSpPr>
+      <p:sp>
+        <p:nvSpPr>
+          <p:cNvPr id="2" name="Объект 1"/>
+          <p:cNvSpPr>
+            <a:spLocks noGrp="1"/>
+          </p:cNvSpPr>
+          <p:nvPr>
+            <p:ph idx="1"/>
+          </p:nvPr>
+        </p:nvSpPr>
+        <p:spPr/>
+        <p:txBody>
+          <a:bodyPr>
+            <a:normAutofit/>
+          </a:bodyPr>
+          <a:lstStyle/>
+          <a:p>
+            <a:pPr>
+              <a:lnSpc>
+                <a:spcPct val="160000"/>
+              </a:lnSpc>
+            </a:pPr>
+            <a:r>
+              <a:rPr lang="en-US" sz="1400" dirty="0" smtClean="0">
+                <a:hlinkClick r:id="rId2"/>
+              </a:rPr>
+              <a:t>Signal-to-noise ratio</a:t>
+            </a:r>
+            <a:endParaRPr lang="en-US" sz="1400" dirty="0" smtClean="0"/>
+          </a:p>
+          <a:p>
+            <a:pPr>
+              <a:lnSpc>
+                <a:spcPct val="160000"/>
+              </a:lnSpc>
+            </a:pPr>
+            <a:r>
+              <a:rPr lang="en-US" sz="1400" dirty="0" smtClean="0">
+                <a:hlinkClick r:id="rId3"/>
+              </a:rPr>
+              <a:t>RSSI </a:t>
+            </a:r>
+            <a:r>
+              <a:rPr lang="en-US" sz="1400" dirty="0" err="1" smtClean="0">
+                <a:hlinkClick r:id="rId3"/>
+              </a:rPr>
+              <a:t>vs</a:t>
+            </a:r>
+            <a:r>
+              <a:rPr lang="en-US" sz="1400" dirty="0" smtClean="0">
+                <a:hlinkClick r:id="rId3"/>
+              </a:rPr>
+              <a:t> Data rates</a:t>
+            </a:r>
+            <a:endParaRPr lang="en-US" sz="1400" dirty="0" smtClean="0"/>
+          </a:p>
+          <a:p>
+            <a:pPr>
+              <a:lnSpc>
+                <a:spcPct val="160000"/>
+              </a:lnSpc>
+            </a:pPr>
+            <a:r>
+              <a:rPr lang="en-US" sz="1400" dirty="0" smtClean="0">
+                <a:hlinkClick r:id="rId4"/>
+              </a:rPr>
+              <a:t>Configure 802.11n on the WLC</a:t>
+            </a:r>
+            <a:endParaRPr lang="en-US" sz="1400" dirty="0" smtClean="0"/>
+          </a:p>
+          <a:p>
+            <a:pPr>
+              <a:lnSpc>
+                <a:spcPct val="160000"/>
+              </a:lnSpc>
+            </a:pPr>
+            <a:r>
+              <a:rPr lang="en-US" sz="1400" dirty="0" smtClean="0">
+                <a:hlinkClick r:id="rId5"/>
+              </a:rPr>
+              <a:t>Coverage or Capacity - Making the best use of 802.11N</a:t>
+            </a:r>
+            <a:r>
+              <a:rPr lang="en-US" sz="1400" dirty="0" smtClean="0"/>
+              <a:t> </a:t>
+            </a:r>
+            <a:endParaRPr lang="en-US" sz="1400" dirty="0"/>
+          </a:p>
+          <a:p>
+            <a:pPr>
+              <a:lnSpc>
+                <a:spcPct val="160000"/>
+              </a:lnSpc>
+            </a:pPr>
+            <a:endParaRPr lang="en-US" dirty="0"/>
+          </a:p>
+          <a:p>
+            <a:endParaRPr lang="ru-RU" dirty="0"/>
+          </a:p>
+        </p:txBody>
+      </p:sp>
+      <p:sp>
+        <p:nvSpPr>
+          <p:cNvPr id="3" name="Заголовок 2"/>
+          <p:cNvSpPr>
+            <a:spLocks noGrp="1"/>
+          </p:cNvSpPr>
+          <p:nvPr>
+            <p:ph type="title"/>
+          </p:nvPr>
+        </p:nvSpPr>
+        <p:spPr/>
+        <p:txBody>
+          <a:bodyPr/>
+          <a:lstStyle/>
+          <a:p>
+            <a:r>
+              <a:rPr lang="en-US" dirty="0"/>
+              <a:t>Bibliography</a:t>
+            </a:r>
+            <a:endParaRPr lang="ru-RU" dirty="0"/>
+          </a:p>
+        </p:txBody>
+      </p:sp>
+    </p:spTree>
+    <p:extLst>
+      <p:ext uri="{BB962C8B-B14F-4D97-AF65-F5344CB8AC3E}">
+        <p14:creationId xmlns:p14="http://schemas.microsoft.com/office/powerpoint/2010/main" val="3627255615"/>
       </p:ext>
     </p:extLst>
   </p:cSld>
@@ -12230,11 +12349,7 @@
             <a:pPr algn="l"/>
             <a:r>
               <a:rPr lang="en-US" dirty="0" smtClean="0"/>
-              <a:t>Medium infrastructure</a:t>
-            </a:r>
-            <a:r>
-              <a:rPr lang="en-US" dirty="0" smtClean="0"/>
-              <a:t>.</a:t>
+              <a:t>Medium infrastructure.</a:t>
             </a:r>
           </a:p>
           <a:p>
@@ -12249,7 +12364,6 @@
               <a:rPr lang="en-US" dirty="0" smtClean="0"/>
               <a:t>RF devices </a:t>
             </a:r>
-            <a:endParaRPr lang="en-US" dirty="0" smtClean="0"/>
           </a:p>
           <a:p>
             <a:pPr marL="0" indent="0" algn="l">
@@ -12263,7 +12377,6 @@
               <a:rPr lang="en-US" dirty="0" smtClean="0"/>
               <a:t>Packets </a:t>
             </a:r>
-            <a:endParaRPr lang="en-US" dirty="0" smtClean="0"/>
           </a:p>
           <a:p>
             <a:pPr algn="l"/>
@@ -12275,7 +12388,6 @@
               <a:rPr lang="en-US" dirty="0" smtClean="0"/>
               <a:t>GUI</a:t>
             </a:r>
-            <a:endParaRPr lang="en-US" dirty="0" smtClean="0"/>
           </a:p>
           <a:p>
             <a:pPr marL="0" indent="0" algn="l">
@@ -12287,11 +12399,7 @@
             <a:pPr algn="l"/>
             <a:r>
               <a:rPr lang="en-US" dirty="0" smtClean="0"/>
-              <a:t>Support of two different data links</a:t>
-            </a:r>
-            <a:r>
-              <a:rPr lang="en-US" dirty="0" smtClean="0"/>
-              <a:t>:</a:t>
+              <a:t>Support of two different data links:</a:t>
             </a:r>
           </a:p>
           <a:p>
@@ -12420,7 +12528,7 @@
           <a:graphicData uri="http://schemas.openxmlformats.org/presentationml/2006/ole">
             <mc:AlternateContent xmlns:mc="http://schemas.openxmlformats.org/markup-compatibility/2006">
               <mc:Choice xmlns:v="urn:schemas-microsoft-com:vml" Requires="v">
-                <p:oleObj spid="_x0000_s1133" name="Visio" r:id="rId3" imgW="9147060" imgH="7289860" progId="Visio.Drawing.11">
+                <p:oleObj spid="_x0000_s1136" name="Visio" r:id="rId3" imgW="9147060" imgH="7289860" progId="Visio.Drawing.11">
                   <p:embed/>
                 </p:oleObj>
               </mc:Choice>
@@ -13063,26 +13171,14 @@
             <a:pPr algn="l"/>
             <a:r>
               <a:rPr lang="en-US" sz="1050" strike="sngStrike" dirty="0" smtClean="0"/>
-              <a:t>Easy </a:t>
-            </a:r>
+              <a:t>Easy access to get all simulated information </a:t>
+            </a:r>
+          </a:p>
+          <a:p>
+            <a:pPr algn="l"/>
             <a:r>
               <a:rPr lang="en-US" sz="1050" strike="sngStrike" dirty="0" smtClean="0"/>
-              <a:t>access to get all simulated information </a:t>
-            </a:r>
-          </a:p>
-          <a:p>
-            <a:pPr algn="l"/>
-            <a:r>
-              <a:rPr lang="en-US" sz="1050" strike="sngStrike" dirty="0" smtClean="0"/>
-              <a:t>Ability to move objects on </a:t>
-            </a:r>
-            <a:r>
-              <a:rPr lang="en-US" sz="1050" strike="sngStrike" dirty="0" smtClean="0"/>
-              <a:t>board - Drag </a:t>
-            </a:r>
-            <a:r>
-              <a:rPr lang="en-US" sz="1050" strike="sngStrike" dirty="0" smtClean="0"/>
-              <a:t>&amp; Drop</a:t>
+              <a:t>Ability to move objects on board - Drag &amp; Drop</a:t>
             </a:r>
           </a:p>
           <a:p>
@@ -13172,13 +13268,8 @@
             <a:pPr algn="l"/>
             <a:r>
               <a:rPr lang="en-US" sz="1050" strike="sngStrike" dirty="0" smtClean="0"/>
-              <a:t>Saving and Load current simulation into </a:t>
-            </a:r>
-            <a:r>
-              <a:rPr lang="en-US" sz="1050" strike="sngStrike" dirty="0" smtClean="0"/>
-              <a:t>file</a:t>
-            </a:r>
-            <a:endParaRPr lang="en-US" sz="1050" strike="sngStrike" dirty="0" smtClean="0"/>
+              <a:t>Saving and Load current simulation into file</a:t>
+            </a:r>
           </a:p>
           <a:p>
             <a:pPr algn="l"/>
@@ -13190,7 +13281,6 @@
               <a:rPr lang="en-US" dirty="0" smtClean="0"/>
               <a:t>Here we will show the bullets mentioned above on the real Program. </a:t>
             </a:r>
-            <a:endParaRPr lang="en-US" dirty="0" smtClean="0"/>
           </a:p>
           <a:p>
             <a:pPr algn="l"/>

</xml_diff>